<commit_message>
Edits in email language
</commit_message>
<xml_diff>
--- a/Supplemental/Stakeholder Visuals.pptx
+++ b/Supplemental/Stakeholder Visuals.pptx
@@ -118,7 +118,7 @@
 <file path=ppt/revisionInfo.xml><?xml version="1.0" encoding="utf-8"?>
 <p1510:revInfo xmlns:a="http://schemas.openxmlformats.org/drawingml/2006/main" xmlns:r="http://schemas.openxmlformats.org/officeDocument/2006/relationships" xmlns:p1510="http://schemas.microsoft.com/office/powerpoint/2015/10/main">
   <p1510:revLst>
-    <p1510:client id="{176DFD19-9071-4B24-AA88-5DC23F609659}" v="1056" dt="2022-11-08T05:29:39.214"/>
+    <p1510:client id="{176DFD19-9071-4B24-AA88-5DC23F609659}" v="4166" dt="2022-11-19T03:27:19.622"/>
   </p1510:revLst>
 </p1510:revInfo>
 </file>
@@ -128,17 +128,25 @@
   <pc:docChgLst>
     <pc:chgData name="Selvyn Yovany Martinez Barahona" userId="3ccf779dc7355a40" providerId="LiveId" clId="{176DFD19-9071-4B24-AA88-5DC23F609659}"/>
     <pc:docChg chg="undo custSel modSld replTag">
-      <pc:chgData name="Selvyn Yovany Martinez Barahona" userId="3ccf779dc7355a40" providerId="LiveId" clId="{176DFD19-9071-4B24-AA88-5DC23F609659}" dt="2022-11-08T05:29:39.214" v="2838"/>
+      <pc:chgData name="Selvyn Yovany Martinez Barahona" userId="3ccf779dc7355a40" providerId="LiveId" clId="{176DFD19-9071-4B24-AA88-5DC23F609659}" dt="2022-11-19T03:27:19.622" v="8222"/>
       <pc:docMkLst>
         <pc:docMk/>
       </pc:docMkLst>
       <pc:sldChg chg="addSp delSp modSp mod">
-        <pc:chgData name="Selvyn Yovany Martinez Barahona" userId="3ccf779dc7355a40" providerId="LiveId" clId="{176DFD19-9071-4B24-AA88-5DC23F609659}" dt="2022-11-08T05:29:39.214" v="2838"/>
+        <pc:chgData name="Selvyn Yovany Martinez Barahona" userId="3ccf779dc7355a40" providerId="LiveId" clId="{176DFD19-9071-4B24-AA88-5DC23F609659}" dt="2022-11-19T03:27:19.622" v="8222"/>
         <pc:sldMkLst>
           <pc:docMk/>
           <pc:sldMk cId="849266544" sldId="256"/>
         </pc:sldMkLst>
         <pc:spChg chg="add del mod modVis">
+          <ac:chgData name="Selvyn Yovany Martinez Barahona" userId="3ccf779dc7355a40" providerId="LiveId" clId="{176DFD19-9071-4B24-AA88-5DC23F609659}" dt="2022-11-19T03:20:00.569" v="3026"/>
+          <ac:spMkLst>
+            <pc:docMk/>
+            <pc:sldMk cId="849266544" sldId="256"/>
+            <ac:spMk id="2" creationId="{0C94FFEE-B61F-F0F5-26C1-9FAC96E2B601}"/>
+          </ac:spMkLst>
+        </pc:spChg>
+        <pc:spChg chg="add del mod modVis">
           <ac:chgData name="Selvyn Yovany Martinez Barahona" userId="3ccf779dc7355a40" providerId="LiveId" clId="{176DFD19-9071-4B24-AA88-5DC23F609659}" dt="2022-11-08T05:29:39.210" v="2836"/>
           <ac:spMkLst>
             <pc:docMk/>
@@ -146,8 +154,48 @@
             <ac:spMk id="2" creationId="{142B63F9-4705-DEFE-E463-E546F7705356}"/>
           </ac:spMkLst>
         </pc:spChg>
+        <pc:spChg chg="add del mod modVis">
+          <ac:chgData name="Selvyn Yovany Martinez Barahona" userId="3ccf779dc7355a40" providerId="LiveId" clId="{176DFD19-9071-4B24-AA88-5DC23F609659}" dt="2022-11-19T03:20:05.420" v="3246"/>
+          <ac:spMkLst>
+            <pc:docMk/>
+            <pc:sldMk cId="849266544" sldId="256"/>
+            <ac:spMk id="5" creationId="{2D821C52-5A1B-7358-0CF4-D394009C308D}"/>
+          </ac:spMkLst>
+        </pc:spChg>
+        <pc:spChg chg="add del mod modVis">
+          <ac:chgData name="Selvyn Yovany Martinez Barahona" userId="3ccf779dc7355a40" providerId="LiveId" clId="{176DFD19-9071-4B24-AA88-5DC23F609659}" dt="2022-11-19T03:26:21.158" v="6807"/>
+          <ac:spMkLst>
+            <pc:docMk/>
+            <pc:sldMk cId="849266544" sldId="256"/>
+            <ac:spMk id="57" creationId="{B47714E9-0F25-BE72-31CE-185206AE05BE}"/>
+          </ac:spMkLst>
+        </pc:spChg>
+        <pc:spChg chg="add del mod modVis">
+          <ac:chgData name="Selvyn Yovany Martinez Barahona" userId="3ccf779dc7355a40" providerId="LiveId" clId="{176DFD19-9071-4B24-AA88-5DC23F609659}" dt="2022-11-19T03:26:25.617" v="7224"/>
+          <ac:spMkLst>
+            <pc:docMk/>
+            <pc:sldMk cId="849266544" sldId="256"/>
+            <ac:spMk id="58" creationId="{2FCF5A2B-D680-8058-52AC-6C0D7836A0AC}"/>
+          </ac:spMkLst>
+        </pc:spChg>
+        <pc:spChg chg="add del mod modVis">
+          <ac:chgData name="Selvyn Yovany Martinez Barahona" userId="3ccf779dc7355a40" providerId="LiveId" clId="{176DFD19-9071-4B24-AA88-5DC23F609659}" dt="2022-11-19T03:26:40.382" v="7269"/>
+          <ac:spMkLst>
+            <pc:docMk/>
+            <pc:sldMk cId="849266544" sldId="256"/>
+            <ac:spMk id="61" creationId="{E6E62093-958B-DA75-D397-2895F03C6F60}"/>
+          </ac:spMkLst>
+        </pc:spChg>
+        <pc:spChg chg="add del mod modVis">
+          <ac:chgData name="Selvyn Yovany Martinez Barahona" userId="3ccf779dc7355a40" providerId="LiveId" clId="{176DFD19-9071-4B24-AA88-5DC23F609659}" dt="2022-11-19T03:26:40.758" v="7507"/>
+          <ac:spMkLst>
+            <pc:docMk/>
+            <pc:sldMk cId="849266544" sldId="256"/>
+            <ac:spMk id="62" creationId="{E7BE51FB-E21E-50FD-2D38-B9845BE039B6}"/>
+          </ac:spMkLst>
+        </pc:spChg>
         <pc:spChg chg="mod">
-          <ac:chgData name="Selvyn Yovany Martinez Barahona" userId="3ccf779dc7355a40" providerId="LiveId" clId="{176DFD19-9071-4B24-AA88-5DC23F609659}" dt="2022-11-08T05:29:39.203" v="2801"/>
+          <ac:chgData name="Selvyn Yovany Martinez Barahona" userId="3ccf779dc7355a40" providerId="LiveId" clId="{176DFD19-9071-4B24-AA88-5DC23F609659}" dt="2022-11-19T03:27:19.602" v="8206"/>
           <ac:spMkLst>
             <pc:docMk/>
             <pc:sldMk cId="849266544" sldId="256"/>
@@ -155,7 +203,7 @@
           </ac:spMkLst>
         </pc:spChg>
         <pc:spChg chg="mod">
-          <ac:chgData name="Selvyn Yovany Martinez Barahona" userId="3ccf779dc7355a40" providerId="LiveId" clId="{176DFD19-9071-4B24-AA88-5DC23F609659}" dt="2022-11-08T05:29:39.202" v="2797"/>
+          <ac:chgData name="Selvyn Yovany Martinez Barahona" userId="3ccf779dc7355a40" providerId="LiveId" clId="{176DFD19-9071-4B24-AA88-5DC23F609659}" dt="2022-11-19T03:27:19.603" v="8207"/>
           <ac:spMkLst>
             <pc:docMk/>
             <pc:sldMk cId="849266544" sldId="256"/>
@@ -163,7 +211,7 @@
           </ac:spMkLst>
         </pc:spChg>
         <pc:spChg chg="mod">
-          <ac:chgData name="Selvyn Yovany Martinez Barahona" userId="3ccf779dc7355a40" providerId="LiveId" clId="{176DFD19-9071-4B24-AA88-5DC23F609659}" dt="2022-11-08T05:29:39.202" v="2798"/>
+          <ac:chgData name="Selvyn Yovany Martinez Barahona" userId="3ccf779dc7355a40" providerId="LiveId" clId="{176DFD19-9071-4B24-AA88-5DC23F609659}" dt="2022-11-19T03:27:19.602" v="8205"/>
           <ac:spMkLst>
             <pc:docMk/>
             <pc:sldMk cId="849266544" sldId="256"/>
@@ -171,7 +219,7 @@
           </ac:spMkLst>
         </pc:spChg>
         <pc:spChg chg="mod">
-          <ac:chgData name="Selvyn Yovany Martinez Barahona" userId="3ccf779dc7355a40" providerId="LiveId" clId="{176DFD19-9071-4B24-AA88-5DC23F609659}" dt="2022-11-08T05:29:39.203" v="2802"/>
+          <ac:chgData name="Selvyn Yovany Martinez Barahona" userId="3ccf779dc7355a40" providerId="LiveId" clId="{176DFD19-9071-4B24-AA88-5DC23F609659}" dt="2022-11-19T03:27:19.604" v="8208"/>
           <ac:spMkLst>
             <pc:docMk/>
             <pc:sldMk cId="849266544" sldId="256"/>
@@ -179,7 +227,7 @@
           </ac:spMkLst>
         </pc:spChg>
         <pc:spChg chg="mod">
-          <ac:chgData name="Selvyn Yovany Martinez Barahona" userId="3ccf779dc7355a40" providerId="LiveId" clId="{176DFD19-9071-4B24-AA88-5DC23F609659}" dt="2022-11-08T05:29:39.203" v="2800"/>
+          <ac:chgData name="Selvyn Yovany Martinez Barahona" userId="3ccf779dc7355a40" providerId="LiveId" clId="{176DFD19-9071-4B24-AA88-5DC23F609659}" dt="2022-11-19T03:27:19.604" v="8209"/>
           <ac:spMkLst>
             <pc:docMk/>
             <pc:sldMk cId="849266544" sldId="256"/>
@@ -187,7 +235,7 @@
           </ac:spMkLst>
         </pc:spChg>
         <pc:spChg chg="mod">
-          <ac:chgData name="Selvyn Yovany Martinez Barahona" userId="3ccf779dc7355a40" providerId="LiveId" clId="{176DFD19-9071-4B24-AA88-5DC23F609659}" dt="2022-11-08T05:29:39.203" v="2799"/>
+          <ac:chgData name="Selvyn Yovany Martinez Barahona" userId="3ccf779dc7355a40" providerId="LiveId" clId="{176DFD19-9071-4B24-AA88-5DC23F609659}" dt="2022-11-19T03:27:19.605" v="8210"/>
           <ac:spMkLst>
             <pc:docMk/>
             <pc:sldMk cId="849266544" sldId="256"/>
@@ -235,7 +283,7 @@
           </ac:spMkLst>
         </pc:spChg>
         <pc:spChg chg="mod">
-          <ac:chgData name="Selvyn Yovany Martinez Barahona" userId="3ccf779dc7355a40" providerId="LiveId" clId="{176DFD19-9071-4B24-AA88-5DC23F609659}" dt="2022-11-08T05:29:39.201" v="2789"/>
+          <ac:chgData name="Selvyn Yovany Martinez Barahona" userId="3ccf779dc7355a40" providerId="LiveId" clId="{176DFD19-9071-4B24-AA88-5DC23F609659}" dt="2022-11-19T03:27:19.609" v="8217"/>
           <ac:spMkLst>
             <pc:docMk/>
             <pc:sldMk cId="849266544" sldId="256"/>
@@ -243,7 +291,7 @@
           </ac:spMkLst>
         </pc:spChg>
         <pc:spChg chg="mod">
-          <ac:chgData name="Selvyn Yovany Martinez Barahona" userId="3ccf779dc7355a40" providerId="LiveId" clId="{176DFD19-9071-4B24-AA88-5DC23F609659}" dt="2022-11-08T05:29:39.201" v="2791"/>
+          <ac:chgData name="Selvyn Yovany Martinez Barahona" userId="3ccf779dc7355a40" providerId="LiveId" clId="{176DFD19-9071-4B24-AA88-5DC23F609659}" dt="2022-11-19T03:27:16.999" v="8159"/>
           <ac:spMkLst>
             <pc:docMk/>
             <pc:sldMk cId="849266544" sldId="256"/>
@@ -251,7 +299,7 @@
           </ac:spMkLst>
         </pc:spChg>
         <pc:spChg chg="mod ord">
-          <ac:chgData name="Selvyn Yovany Martinez Barahona" userId="3ccf779dc7355a40" providerId="LiveId" clId="{176DFD19-9071-4B24-AA88-5DC23F609659}" dt="2022-11-08T05:29:39.202" v="2794"/>
+          <ac:chgData name="Selvyn Yovany Martinez Barahona" userId="3ccf779dc7355a40" providerId="LiveId" clId="{176DFD19-9071-4B24-AA88-5DC23F609659}" dt="2022-11-19T03:27:16.999" v="8161"/>
           <ac:spMkLst>
             <pc:docMk/>
             <pc:sldMk cId="849266544" sldId="256"/>
@@ -259,7 +307,7 @@
           </ac:spMkLst>
         </pc:spChg>
         <pc:spChg chg="mod">
-          <ac:chgData name="Selvyn Yovany Martinez Barahona" userId="3ccf779dc7355a40" providerId="LiveId" clId="{176DFD19-9071-4B24-AA88-5DC23F609659}" dt="2022-11-08T05:29:39.201" v="2790"/>
+          <ac:chgData name="Selvyn Yovany Martinez Barahona" userId="3ccf779dc7355a40" providerId="LiveId" clId="{176DFD19-9071-4B24-AA88-5DC23F609659}" dt="2022-11-19T03:27:17" v="8162"/>
           <ac:spMkLst>
             <pc:docMk/>
             <pc:sldMk cId="849266544" sldId="256"/>
@@ -267,7 +315,7 @@
           </ac:spMkLst>
         </pc:spChg>
         <pc:spChg chg="mod">
-          <ac:chgData name="Selvyn Yovany Martinez Barahona" userId="3ccf779dc7355a40" providerId="LiveId" clId="{176DFD19-9071-4B24-AA88-5DC23F609659}" dt="2022-11-08T05:29:39.201" v="2792"/>
+          <ac:chgData name="Selvyn Yovany Martinez Barahona" userId="3ccf779dc7355a40" providerId="LiveId" clId="{176DFD19-9071-4B24-AA88-5DC23F609659}" dt="2022-11-19T03:27:16.998" v="8158"/>
           <ac:spMkLst>
             <pc:docMk/>
             <pc:sldMk cId="849266544" sldId="256"/>
@@ -275,7 +323,7 @@
           </ac:spMkLst>
         </pc:spChg>
         <pc:spChg chg="mod">
-          <ac:chgData name="Selvyn Yovany Martinez Barahona" userId="3ccf779dc7355a40" providerId="LiveId" clId="{176DFD19-9071-4B24-AA88-5DC23F609659}" dt="2022-11-08T05:29:39.202" v="2795"/>
+          <ac:chgData name="Selvyn Yovany Martinez Barahona" userId="3ccf779dc7355a40" providerId="LiveId" clId="{176DFD19-9071-4B24-AA88-5DC23F609659}" dt="2022-11-19T03:27:17" v="8163"/>
           <ac:spMkLst>
             <pc:docMk/>
             <pc:sldMk cId="849266544" sldId="256"/>
@@ -283,7 +331,7 @@
           </ac:spMkLst>
         </pc:spChg>
         <pc:spChg chg="mod">
-          <ac:chgData name="Selvyn Yovany Martinez Barahona" userId="3ccf779dc7355a40" providerId="LiveId" clId="{176DFD19-9071-4B24-AA88-5DC23F609659}" dt="2022-11-08T05:29:39.202" v="2796"/>
+          <ac:chgData name="Selvyn Yovany Martinez Barahona" userId="3ccf779dc7355a40" providerId="LiveId" clId="{176DFD19-9071-4B24-AA88-5DC23F609659}" dt="2022-11-19T03:27:17.001" v="8164"/>
           <ac:spMkLst>
             <pc:docMk/>
             <pc:sldMk cId="849266544" sldId="256"/>
@@ -291,7 +339,7 @@
           </ac:spMkLst>
         </pc:spChg>
         <pc:spChg chg="mod ord">
-          <ac:chgData name="Selvyn Yovany Martinez Barahona" userId="3ccf779dc7355a40" providerId="LiveId" clId="{176DFD19-9071-4B24-AA88-5DC23F609659}" dt="2022-11-08T05:29:39.204" v="2804"/>
+          <ac:chgData name="Selvyn Yovany Martinez Barahona" userId="3ccf779dc7355a40" providerId="LiveId" clId="{176DFD19-9071-4B24-AA88-5DC23F609659}" dt="2022-11-19T03:27:17.004" v="8172"/>
           <ac:spMkLst>
             <pc:docMk/>
             <pc:sldMk cId="849266544" sldId="256"/>
@@ -299,7 +347,7 @@
           </ac:spMkLst>
         </pc:spChg>
         <pc:spChg chg="mod ord">
-          <ac:chgData name="Selvyn Yovany Martinez Barahona" userId="3ccf779dc7355a40" providerId="LiveId" clId="{176DFD19-9071-4B24-AA88-5DC23F609659}" dt="2022-11-08T05:29:39.204" v="2806"/>
+          <ac:chgData name="Selvyn Yovany Martinez Barahona" userId="3ccf779dc7355a40" providerId="LiveId" clId="{176DFD19-9071-4B24-AA88-5DC23F609659}" dt="2022-11-19T03:27:17.004" v="8174"/>
           <ac:spMkLst>
             <pc:docMk/>
             <pc:sldMk cId="849266544" sldId="256"/>
@@ -307,7 +355,7 @@
           </ac:spMkLst>
         </pc:spChg>
         <pc:spChg chg="mod ord">
-          <ac:chgData name="Selvyn Yovany Martinez Barahona" userId="3ccf779dc7355a40" providerId="LiveId" clId="{176DFD19-9071-4B24-AA88-5DC23F609659}" dt="2022-11-08T05:29:39.205" v="2810"/>
+          <ac:chgData name="Selvyn Yovany Martinez Barahona" userId="3ccf779dc7355a40" providerId="LiveId" clId="{176DFD19-9071-4B24-AA88-5DC23F609659}" dt="2022-11-19T03:27:17.005" v="8178"/>
           <ac:spMkLst>
             <pc:docMk/>
             <pc:sldMk cId="849266544" sldId="256"/>
@@ -315,7 +363,7 @@
           </ac:spMkLst>
         </pc:spChg>
         <pc:spChg chg="mod ord">
-          <ac:chgData name="Selvyn Yovany Martinez Barahona" userId="3ccf779dc7355a40" providerId="LiveId" clId="{176DFD19-9071-4B24-AA88-5DC23F609659}" dt="2022-11-08T05:29:39.205" v="2812"/>
+          <ac:chgData name="Selvyn Yovany Martinez Barahona" userId="3ccf779dc7355a40" providerId="LiveId" clId="{176DFD19-9071-4B24-AA88-5DC23F609659}" dt="2022-11-19T03:27:17.006" v="8182"/>
           <ac:spMkLst>
             <pc:docMk/>
             <pc:sldMk cId="849266544" sldId="256"/>
@@ -323,7 +371,7 @@
           </ac:spMkLst>
         </pc:spChg>
         <pc:spChg chg="mod ord">
-          <ac:chgData name="Selvyn Yovany Martinez Barahona" userId="3ccf779dc7355a40" providerId="LiveId" clId="{176DFD19-9071-4B24-AA88-5DC23F609659}" dt="2022-11-08T05:29:39.205" v="2814"/>
+          <ac:chgData name="Selvyn Yovany Martinez Barahona" userId="3ccf779dc7355a40" providerId="LiveId" clId="{176DFD19-9071-4B24-AA88-5DC23F609659}" dt="2022-11-19T03:27:17.007" v="8186"/>
           <ac:spMkLst>
             <pc:docMk/>
             <pc:sldMk cId="849266544" sldId="256"/>
@@ -331,7 +379,7 @@
           </ac:spMkLst>
         </pc:spChg>
         <pc:spChg chg="mod ord">
-          <ac:chgData name="Selvyn Yovany Martinez Barahona" userId="3ccf779dc7355a40" providerId="LiveId" clId="{176DFD19-9071-4B24-AA88-5DC23F609659}" dt="2022-11-08T05:29:39.206" v="2816"/>
+          <ac:chgData name="Selvyn Yovany Martinez Barahona" userId="3ccf779dc7355a40" providerId="LiveId" clId="{176DFD19-9071-4B24-AA88-5DC23F609659}" dt="2022-11-19T03:27:17.006" v="8180"/>
           <ac:spMkLst>
             <pc:docMk/>
             <pc:sldMk cId="849266544" sldId="256"/>
@@ -339,7 +387,7 @@
           </ac:spMkLst>
         </pc:spChg>
         <pc:spChg chg="mod ord">
-          <ac:chgData name="Selvyn Yovany Martinez Barahona" userId="3ccf779dc7355a40" providerId="LiveId" clId="{176DFD19-9071-4B24-AA88-5DC23F609659}" dt="2022-11-08T05:29:39.206" v="2818"/>
+          <ac:chgData name="Selvyn Yovany Martinez Barahona" userId="3ccf779dc7355a40" providerId="LiveId" clId="{176DFD19-9071-4B24-AA88-5DC23F609659}" dt="2022-11-19T03:27:17.007" v="8184"/>
           <ac:spMkLst>
             <pc:docMk/>
             <pc:sldMk cId="849266544" sldId="256"/>
@@ -347,7 +395,7 @@
           </ac:spMkLst>
         </pc:spChg>
         <pc:spChg chg="mod">
-          <ac:chgData name="Selvyn Yovany Martinez Barahona" userId="3ccf779dc7355a40" providerId="LiveId" clId="{176DFD19-9071-4B24-AA88-5DC23F609659}" dt="2022-11-08T05:29:39.207" v="2820"/>
+          <ac:chgData name="Selvyn Yovany Martinez Barahona" userId="3ccf779dc7355a40" providerId="LiveId" clId="{176DFD19-9071-4B24-AA88-5DC23F609659}" dt="2022-11-19T03:27:17.008" v="8189"/>
           <ac:spMkLst>
             <pc:docMk/>
             <pc:sldMk cId="849266544" sldId="256"/>
@@ -355,7 +403,7 @@
           </ac:spMkLst>
         </pc:spChg>
         <pc:spChg chg="mod ord">
-          <ac:chgData name="Selvyn Yovany Martinez Barahona" userId="3ccf779dc7355a40" providerId="LiveId" clId="{176DFD19-9071-4B24-AA88-5DC23F609659}" dt="2022-11-08T05:29:39.207" v="2822"/>
+          <ac:chgData name="Selvyn Yovany Martinez Barahona" userId="3ccf779dc7355a40" providerId="LiveId" clId="{176DFD19-9071-4B24-AA88-5DC23F609659}" dt="2022-11-19T03:27:17.008" v="8188"/>
           <ac:spMkLst>
             <pc:docMk/>
             <pc:sldMk cId="849266544" sldId="256"/>
@@ -363,7 +411,7 @@
           </ac:spMkLst>
         </pc:spChg>
         <pc:spChg chg="mod">
-          <ac:chgData name="Selvyn Yovany Martinez Barahona" userId="3ccf779dc7355a40" providerId="LiveId" clId="{176DFD19-9071-4B24-AA88-5DC23F609659}" dt="2022-11-08T05:29:39.206" v="2819"/>
+          <ac:chgData name="Selvyn Yovany Martinez Barahona" userId="3ccf779dc7355a40" providerId="LiveId" clId="{176DFD19-9071-4B24-AA88-5DC23F609659}" dt="2022-11-19T03:27:17.009" v="8190"/>
           <ac:spMkLst>
             <pc:docMk/>
             <pc:sldMk cId="849266544" sldId="256"/>
@@ -371,7 +419,7 @@
           </ac:spMkLst>
         </pc:spChg>
         <pc:spChg chg="mod">
-          <ac:chgData name="Selvyn Yovany Martinez Barahona" userId="3ccf779dc7355a40" providerId="LiveId" clId="{176DFD19-9071-4B24-AA88-5DC23F609659}" dt="2022-11-08T05:29:39.207" v="2823"/>
+          <ac:chgData name="Selvyn Yovany Martinez Barahona" userId="3ccf779dc7355a40" providerId="LiveId" clId="{176DFD19-9071-4B24-AA88-5DC23F609659}" dt="2022-11-19T03:27:17.009" v="8191"/>
           <ac:spMkLst>
             <pc:docMk/>
             <pc:sldMk cId="849266544" sldId="256"/>
@@ -379,7 +427,7 @@
           </ac:spMkLst>
         </pc:spChg>
         <pc:spChg chg="mod">
-          <ac:chgData name="Selvyn Yovany Martinez Barahona" userId="3ccf779dc7355a40" providerId="LiveId" clId="{176DFD19-9071-4B24-AA88-5DC23F609659}" dt="2022-11-08T05:29:39.207" v="2824"/>
+          <ac:chgData name="Selvyn Yovany Martinez Barahona" userId="3ccf779dc7355a40" providerId="LiveId" clId="{176DFD19-9071-4B24-AA88-5DC23F609659}" dt="2022-11-19T03:27:17.009" v="8192"/>
           <ac:spMkLst>
             <pc:docMk/>
             <pc:sldMk cId="849266544" sldId="256"/>
@@ -387,7 +435,7 @@
           </ac:spMkLst>
         </pc:spChg>
         <pc:spChg chg="mod">
-          <ac:chgData name="Selvyn Yovany Martinez Barahona" userId="3ccf779dc7355a40" providerId="LiveId" clId="{176DFD19-9071-4B24-AA88-5DC23F609659}" dt="2022-11-08T05:29:39.208" v="2825"/>
+          <ac:chgData name="Selvyn Yovany Martinez Barahona" userId="3ccf779dc7355a40" providerId="LiveId" clId="{176DFD19-9071-4B24-AA88-5DC23F609659}" dt="2022-11-19T03:27:17.010" v="8193"/>
           <ac:spMkLst>
             <pc:docMk/>
             <pc:sldMk cId="849266544" sldId="256"/>
@@ -395,7 +443,7 @@
           </ac:spMkLst>
         </pc:spChg>
         <pc:spChg chg="mod">
-          <ac:chgData name="Selvyn Yovany Martinez Barahona" userId="3ccf779dc7355a40" providerId="LiveId" clId="{176DFD19-9071-4B24-AA88-5DC23F609659}" dt="2022-11-08T05:29:39.208" v="2826"/>
+          <ac:chgData name="Selvyn Yovany Martinez Barahona" userId="3ccf779dc7355a40" providerId="LiveId" clId="{176DFD19-9071-4B24-AA88-5DC23F609659}" dt="2022-11-19T03:27:19.606" v="8211"/>
           <ac:spMkLst>
             <pc:docMk/>
             <pc:sldMk cId="849266544" sldId="256"/>
@@ -403,7 +451,7 @@
           </ac:spMkLst>
         </pc:spChg>
         <pc:spChg chg="mod">
-          <ac:chgData name="Selvyn Yovany Martinez Barahona" userId="3ccf779dc7355a40" providerId="LiveId" clId="{176DFD19-9071-4B24-AA88-5DC23F609659}" dt="2022-11-08T05:29:39.209" v="2830"/>
+          <ac:chgData name="Selvyn Yovany Martinez Barahona" userId="3ccf779dc7355a40" providerId="LiveId" clId="{176DFD19-9071-4B24-AA88-5DC23F609659}" dt="2022-11-19T03:27:19.607" v="8215"/>
           <ac:spMkLst>
             <pc:docMk/>
             <pc:sldMk cId="849266544" sldId="256"/>
@@ -411,7 +459,7 @@
           </ac:spMkLst>
         </pc:spChg>
         <pc:spChg chg="mod">
-          <ac:chgData name="Selvyn Yovany Martinez Barahona" userId="3ccf779dc7355a40" providerId="LiveId" clId="{176DFD19-9071-4B24-AA88-5DC23F609659}" dt="2022-11-08T05:29:39.208" v="2827"/>
+          <ac:chgData name="Selvyn Yovany Martinez Barahona" userId="3ccf779dc7355a40" providerId="LiveId" clId="{176DFD19-9071-4B24-AA88-5DC23F609659}" dt="2022-11-19T03:27:19.606" v="8212"/>
           <ac:spMkLst>
             <pc:docMk/>
             <pc:sldMk cId="849266544" sldId="256"/>
@@ -419,7 +467,7 @@
           </ac:spMkLst>
         </pc:spChg>
         <pc:spChg chg="mod">
-          <ac:chgData name="Selvyn Yovany Martinez Barahona" userId="3ccf779dc7355a40" providerId="LiveId" clId="{176DFD19-9071-4B24-AA88-5DC23F609659}" dt="2022-11-08T05:29:39.208" v="2829"/>
+          <ac:chgData name="Selvyn Yovany Martinez Barahona" userId="3ccf779dc7355a40" providerId="LiveId" clId="{176DFD19-9071-4B24-AA88-5DC23F609659}" dt="2022-11-19T03:27:19.607" v="8214"/>
           <ac:spMkLst>
             <pc:docMk/>
             <pc:sldMk cId="849266544" sldId="256"/>
@@ -427,7 +475,7 @@
           </ac:spMkLst>
         </pc:spChg>
         <pc:spChg chg="mod">
-          <ac:chgData name="Selvyn Yovany Martinez Barahona" userId="3ccf779dc7355a40" providerId="LiveId" clId="{176DFD19-9071-4B24-AA88-5DC23F609659}" dt="2022-11-08T05:29:39.208" v="2828"/>
+          <ac:chgData name="Selvyn Yovany Martinez Barahona" userId="3ccf779dc7355a40" providerId="LiveId" clId="{176DFD19-9071-4B24-AA88-5DC23F609659}" dt="2022-11-19T03:27:19.607" v="8213"/>
           <ac:spMkLst>
             <pc:docMk/>
             <pc:sldMk cId="849266544" sldId="256"/>
@@ -435,7 +483,7 @@
           </ac:spMkLst>
         </pc:spChg>
         <pc:spChg chg="mod">
-          <ac:chgData name="Selvyn Yovany Martinez Barahona" userId="3ccf779dc7355a40" providerId="LiveId" clId="{176DFD19-9071-4B24-AA88-5DC23F609659}" dt="2022-11-08T05:29:39.209" v="2831"/>
+          <ac:chgData name="Selvyn Yovany Martinez Barahona" userId="3ccf779dc7355a40" providerId="LiveId" clId="{176DFD19-9071-4B24-AA88-5DC23F609659}" dt="2022-11-19T03:27:19.608" v="8216"/>
           <ac:spMkLst>
             <pc:docMk/>
             <pc:sldMk cId="849266544" sldId="256"/>
@@ -443,7 +491,7 @@
           </ac:spMkLst>
         </pc:spChg>
         <pc:spChg chg="mod">
-          <ac:chgData name="Selvyn Yovany Martinez Barahona" userId="3ccf779dc7355a40" providerId="LiveId" clId="{176DFD19-9071-4B24-AA88-5DC23F609659}" dt="2022-11-08T05:29:39.209" v="2832"/>
+          <ac:chgData name="Selvyn Yovany Martinez Barahona" userId="3ccf779dc7355a40" providerId="LiveId" clId="{176DFD19-9071-4B24-AA88-5DC23F609659}" dt="2022-11-19T03:27:19.610" v="8218"/>
           <ac:spMkLst>
             <pc:docMk/>
             <pc:sldMk cId="849266544" sldId="256"/>
@@ -483,7 +531,7 @@
           </ac:spMkLst>
         </pc:spChg>
         <pc:spChg chg="add del mod ord replST">
-          <ac:chgData name="Selvyn Yovany Martinez Barahona" userId="3ccf779dc7355a40" providerId="LiveId" clId="{176DFD19-9071-4B24-AA88-5DC23F609659}" dt="2022-11-08T05:29:39.199" v="2780"/>
+          <ac:chgData name="Selvyn Yovany Martinez Barahona" userId="3ccf779dc7355a40" providerId="LiveId" clId="{176DFD19-9071-4B24-AA88-5DC23F609659}" dt="2022-11-19T03:27:16.995" v="8150"/>
           <ac:spMkLst>
             <pc:docMk/>
             <pc:sldMk cId="849266544" sldId="256"/>
@@ -491,7 +539,7 @@
           </ac:spMkLst>
         </pc:spChg>
         <pc:spChg chg="add del mod ord replST">
-          <ac:chgData name="Selvyn Yovany Martinez Barahona" userId="3ccf779dc7355a40" providerId="LiveId" clId="{176DFD19-9071-4B24-AA88-5DC23F609659}" dt="2022-11-08T05:29:39.200" v="2784"/>
+          <ac:chgData name="Selvyn Yovany Martinez Barahona" userId="3ccf779dc7355a40" providerId="LiveId" clId="{176DFD19-9071-4B24-AA88-5DC23F609659}" dt="2022-11-19T03:27:16.996" v="8152"/>
           <ac:spMkLst>
             <pc:docMk/>
             <pc:sldMk cId="849266544" sldId="256"/>
@@ -499,7 +547,7 @@
           </ac:spMkLst>
         </pc:spChg>
         <pc:spChg chg="add del mod ord replST">
-          <ac:chgData name="Selvyn Yovany Martinez Barahona" userId="3ccf779dc7355a40" providerId="LiveId" clId="{176DFD19-9071-4B24-AA88-5DC23F609659}" dt="2022-11-08T05:29:39.200" v="2786"/>
+          <ac:chgData name="Selvyn Yovany Martinez Barahona" userId="3ccf779dc7355a40" providerId="LiveId" clId="{176DFD19-9071-4B24-AA88-5DC23F609659}" dt="2022-11-19T03:27:16.997" v="8154"/>
           <ac:spMkLst>
             <pc:docMk/>
             <pc:sldMk cId="849266544" sldId="256"/>
@@ -507,7 +555,7 @@
           </ac:spMkLst>
         </pc:spChg>
         <pc:spChg chg="add del mod ord replST">
-          <ac:chgData name="Selvyn Yovany Martinez Barahona" userId="3ccf779dc7355a40" providerId="LiveId" clId="{176DFD19-9071-4B24-AA88-5DC23F609659}" dt="2022-11-08T05:29:39.200" v="2788"/>
+          <ac:chgData name="Selvyn Yovany Martinez Barahona" userId="3ccf779dc7355a40" providerId="LiveId" clId="{176DFD19-9071-4B24-AA88-5DC23F609659}" dt="2022-11-19T03:27:16.997" v="8156"/>
           <ac:spMkLst>
             <pc:docMk/>
             <pc:sldMk cId="849266544" sldId="256"/>
@@ -515,7 +563,7 @@
           </ac:spMkLst>
         </pc:spChg>
         <pc:spChg chg="add del mod ord replST">
-          <ac:chgData name="Selvyn Yovany Martinez Barahona" userId="3ccf779dc7355a40" providerId="LiveId" clId="{176DFD19-9071-4B24-AA88-5DC23F609659}" dt="2022-11-08T05:29:39.199" v="2782"/>
+          <ac:chgData name="Selvyn Yovany Martinez Barahona" userId="3ccf779dc7355a40" providerId="LiveId" clId="{176DFD19-9071-4B24-AA88-5DC23F609659}" dt="2022-11-19T03:27:16.995" v="8148"/>
           <ac:spMkLst>
             <pc:docMk/>
             <pc:sldMk cId="849266544" sldId="256"/>
@@ -570,20 +618,452 @@
             <ac:spMk id="474" creationId="{12BDC72C-847B-096B-F025-BF3A4D463DD0}"/>
           </ac:spMkLst>
         </pc:spChg>
-        <pc:graphicFrameChg chg="add mod ord replST">
-          <ac:chgData name="Selvyn Yovany Martinez Barahona" userId="3ccf779dc7355a40" providerId="LiveId" clId="{176DFD19-9071-4B24-AA88-5DC23F609659}" dt="2022-11-08T05:29:39.204" v="2808"/>
+        <pc:graphicFrameChg chg="add del mod ord replST">
+          <ac:chgData name="Selvyn Yovany Martinez Barahona" userId="3ccf779dc7355a40" providerId="LiveId" clId="{176DFD19-9071-4B24-AA88-5DC23F609659}" dt="2022-11-19T03:20:00.522" v="2960"/>
           <ac:graphicFrameMkLst>
             <pc:docMk/>
             <pc:sldMk cId="849266544" sldId="256"/>
             <ac:graphicFrameMk id="3" creationId="{D2E8DBCA-E70C-D175-5372-A226706F5712}"/>
           </ac:graphicFrameMkLst>
         </pc:graphicFrameChg>
+        <pc:graphicFrameChg chg="add del mod ord replST">
+          <ac:chgData name="Selvyn Yovany Martinez Barahona" userId="3ccf779dc7355a40" providerId="LiveId" clId="{176DFD19-9071-4B24-AA88-5DC23F609659}" dt="2022-11-19T03:20:05.389" v="3174"/>
+          <ac:graphicFrameMkLst>
+            <pc:docMk/>
+            <pc:sldMk cId="849266544" sldId="256"/>
+            <ac:graphicFrameMk id="4" creationId="{10278C6B-1D83-1D57-F46B-9D8A94D75795}"/>
+          </ac:graphicFrameMkLst>
+        </pc:graphicFrameChg>
+        <pc:graphicFrameChg chg="add del mod ord replST">
+          <ac:chgData name="Selvyn Yovany Martinez Barahona" userId="3ccf779dc7355a40" providerId="LiveId" clId="{176DFD19-9071-4B24-AA88-5DC23F609659}" dt="2022-11-19T03:20:08.433" v="3269"/>
+          <ac:graphicFrameMkLst>
+            <pc:docMk/>
+            <pc:sldMk cId="849266544" sldId="256"/>
+            <ac:graphicFrameMk id="6" creationId="{9E537AE7-5A24-85CD-A329-E58B7048CB73}"/>
+          </ac:graphicFrameMkLst>
+        </pc:graphicFrameChg>
+        <pc:graphicFrameChg chg="add del mod ord replST">
+          <ac:chgData name="Selvyn Yovany Martinez Barahona" userId="3ccf779dc7355a40" providerId="LiveId" clId="{176DFD19-9071-4B24-AA88-5DC23F609659}" dt="2022-11-19T03:20:08.475" v="3330"/>
+          <ac:graphicFrameMkLst>
+            <pc:docMk/>
+            <pc:sldMk cId="849266544" sldId="256"/>
+            <ac:graphicFrameMk id="7" creationId="{416E0771-0770-B183-47C7-0F2F7BFACA70}"/>
+          </ac:graphicFrameMkLst>
+        </pc:graphicFrameChg>
+        <pc:graphicFrameChg chg="add del mod ord replST">
+          <ac:chgData name="Selvyn Yovany Martinez Barahona" userId="3ccf779dc7355a40" providerId="LiveId" clId="{176DFD19-9071-4B24-AA88-5DC23F609659}" dt="2022-11-19T03:20:10.207" v="3419"/>
+          <ac:graphicFrameMkLst>
+            <pc:docMk/>
+            <pc:sldMk cId="849266544" sldId="256"/>
+            <ac:graphicFrameMk id="8" creationId="{7209EADE-AAA4-3A32-7350-67F4CDE6B1E2}"/>
+          </ac:graphicFrameMkLst>
+        </pc:graphicFrameChg>
         <pc:graphicFrameChg chg="mod">
-          <ac:chgData name="Selvyn Yovany Martinez Barahona" userId="3ccf779dc7355a40" providerId="LiveId" clId="{176DFD19-9071-4B24-AA88-5DC23F609659}" dt="2022-11-08T05:29:39.214" v="2838"/>
+          <ac:chgData name="Selvyn Yovany Martinez Barahona" userId="3ccf779dc7355a40" providerId="LiveId" clId="{176DFD19-9071-4B24-AA88-5DC23F609659}" dt="2022-11-19T03:27:19.622" v="8222"/>
           <ac:graphicFrameMkLst>
             <pc:docMk/>
             <pc:sldMk cId="849266544" sldId="256"/>
             <ac:graphicFrameMk id="9" creationId="{94F6DDB2-4988-6D60-A3BC-07C92A74F16B}"/>
+          </ac:graphicFrameMkLst>
+        </pc:graphicFrameChg>
+        <pc:graphicFrameChg chg="add del mod ord replST">
+          <ac:chgData name="Selvyn Yovany Martinez Barahona" userId="3ccf779dc7355a40" providerId="LiveId" clId="{176DFD19-9071-4B24-AA88-5DC23F609659}" dt="2022-11-19T03:20:10.239" v="3454"/>
+          <ac:graphicFrameMkLst>
+            <pc:docMk/>
+            <pc:sldMk cId="849266544" sldId="256"/>
+            <ac:graphicFrameMk id="10" creationId="{95CBBE71-0858-FFBC-2BB1-90AD6B346B72}"/>
+          </ac:graphicFrameMkLst>
+        </pc:graphicFrameChg>
+        <pc:graphicFrameChg chg="add del mod ord replST">
+          <ac:chgData name="Selvyn Yovany Martinez Barahona" userId="3ccf779dc7355a40" providerId="LiveId" clId="{176DFD19-9071-4B24-AA88-5DC23F609659}" dt="2022-11-19T03:20:14.190" v="3543"/>
+          <ac:graphicFrameMkLst>
+            <pc:docMk/>
+            <pc:sldMk cId="849266544" sldId="256"/>
+            <ac:graphicFrameMk id="11" creationId="{8B0767A3-C378-5577-EC7B-D3ACFEBAE88C}"/>
+          </ac:graphicFrameMkLst>
+        </pc:graphicFrameChg>
+        <pc:graphicFrameChg chg="add del mod ord replST">
+          <ac:chgData name="Selvyn Yovany Martinez Barahona" userId="3ccf779dc7355a40" providerId="LiveId" clId="{176DFD19-9071-4B24-AA88-5DC23F609659}" dt="2022-11-19T03:20:14.234" v="3604"/>
+          <ac:graphicFrameMkLst>
+            <pc:docMk/>
+            <pc:sldMk cId="849266544" sldId="256"/>
+            <ac:graphicFrameMk id="12" creationId="{92D3DA75-A56B-979B-31A0-5BA1BB3FFAAB}"/>
+          </ac:graphicFrameMkLst>
+        </pc:graphicFrameChg>
+        <pc:graphicFrameChg chg="add del mod ord replST">
+          <ac:chgData name="Selvyn Yovany Martinez Barahona" userId="3ccf779dc7355a40" providerId="LiveId" clId="{176DFD19-9071-4B24-AA88-5DC23F609659}" dt="2022-11-19T03:20:17.553" v="3693"/>
+          <ac:graphicFrameMkLst>
+            <pc:docMk/>
+            <pc:sldMk cId="849266544" sldId="256"/>
+            <ac:graphicFrameMk id="13" creationId="{964C4D50-A7E0-C433-5562-ED1EF614725E}"/>
+          </ac:graphicFrameMkLst>
+        </pc:graphicFrameChg>
+        <pc:graphicFrameChg chg="add del mod ord replST">
+          <ac:chgData name="Selvyn Yovany Martinez Barahona" userId="3ccf779dc7355a40" providerId="LiveId" clId="{176DFD19-9071-4B24-AA88-5DC23F609659}" dt="2022-11-19T03:20:17.593" v="3754"/>
+          <ac:graphicFrameMkLst>
+            <pc:docMk/>
+            <pc:sldMk cId="849266544" sldId="256"/>
+            <ac:graphicFrameMk id="14" creationId="{07F1C259-7432-4C18-E60E-ED298D628AA1}"/>
+          </ac:graphicFrameMkLst>
+        </pc:graphicFrameChg>
+        <pc:graphicFrameChg chg="add del mod ord replST">
+          <ac:chgData name="Selvyn Yovany Martinez Barahona" userId="3ccf779dc7355a40" providerId="LiveId" clId="{176DFD19-9071-4B24-AA88-5DC23F609659}" dt="2022-11-19T03:20:19.679" v="3843"/>
+          <ac:graphicFrameMkLst>
+            <pc:docMk/>
+            <pc:sldMk cId="849266544" sldId="256"/>
+            <ac:graphicFrameMk id="15" creationId="{4B57CAFC-7C43-BB84-C3C0-8B202DC8C136}"/>
+          </ac:graphicFrameMkLst>
+        </pc:graphicFrameChg>
+        <pc:graphicFrameChg chg="add del mod ord replST">
+          <ac:chgData name="Selvyn Yovany Martinez Barahona" userId="3ccf779dc7355a40" providerId="LiveId" clId="{176DFD19-9071-4B24-AA88-5DC23F609659}" dt="2022-11-19T03:20:19.727" v="3904"/>
+          <ac:graphicFrameMkLst>
+            <pc:docMk/>
+            <pc:sldMk cId="849266544" sldId="256"/>
+            <ac:graphicFrameMk id="16" creationId="{D534D00F-7FAF-80C8-7D90-1386AD7CBDC5}"/>
+          </ac:graphicFrameMkLst>
+        </pc:graphicFrameChg>
+        <pc:graphicFrameChg chg="add del mod ord replST">
+          <ac:chgData name="Selvyn Yovany Martinez Barahona" userId="3ccf779dc7355a40" providerId="LiveId" clId="{176DFD19-9071-4B24-AA88-5DC23F609659}" dt="2022-11-19T03:20:32.340" v="3993"/>
+          <ac:graphicFrameMkLst>
+            <pc:docMk/>
+            <pc:sldMk cId="849266544" sldId="256"/>
+            <ac:graphicFrameMk id="17" creationId="{49582835-FF71-4216-F7D6-44C9FCD96AF4}"/>
+          </ac:graphicFrameMkLst>
+        </pc:graphicFrameChg>
+        <pc:graphicFrameChg chg="add del mod ord replST">
+          <ac:chgData name="Selvyn Yovany Martinez Barahona" userId="3ccf779dc7355a40" providerId="LiveId" clId="{176DFD19-9071-4B24-AA88-5DC23F609659}" dt="2022-11-19T03:20:32.385" v="4058"/>
+          <ac:graphicFrameMkLst>
+            <pc:docMk/>
+            <pc:sldMk cId="849266544" sldId="256"/>
+            <ac:graphicFrameMk id="18" creationId="{D6E3F8EC-9E37-B119-7748-3E3A9BD034DE}"/>
+          </ac:graphicFrameMkLst>
+        </pc:graphicFrameChg>
+        <pc:graphicFrameChg chg="add del mod ord replST">
+          <ac:chgData name="Selvyn Yovany Martinez Barahona" userId="3ccf779dc7355a40" providerId="LiveId" clId="{176DFD19-9071-4B24-AA88-5DC23F609659}" dt="2022-11-19T03:20:44.418" v="4151"/>
+          <ac:graphicFrameMkLst>
+            <pc:docMk/>
+            <pc:sldMk cId="849266544" sldId="256"/>
+            <ac:graphicFrameMk id="19" creationId="{7E8EAAC4-1B6C-6BFC-3924-FD59C66EC602}"/>
+          </ac:graphicFrameMkLst>
+        </pc:graphicFrameChg>
+        <pc:graphicFrameChg chg="add del mod ord replST">
+          <ac:chgData name="Selvyn Yovany Martinez Barahona" userId="3ccf779dc7355a40" providerId="LiveId" clId="{176DFD19-9071-4B24-AA88-5DC23F609659}" dt="2022-11-19T03:20:44.454" v="4190"/>
+          <ac:graphicFrameMkLst>
+            <pc:docMk/>
+            <pc:sldMk cId="849266544" sldId="256"/>
+            <ac:graphicFrameMk id="20" creationId="{CA415FB2-8369-03FC-D916-3D07A06857CE}"/>
+          </ac:graphicFrameMkLst>
+        </pc:graphicFrameChg>
+        <pc:graphicFrameChg chg="add del mod ord replST">
+          <ac:chgData name="Selvyn Yovany Martinez Barahona" userId="3ccf779dc7355a40" providerId="LiveId" clId="{176DFD19-9071-4B24-AA88-5DC23F609659}" dt="2022-11-19T03:20:56.338" v="4401"/>
+          <ac:graphicFrameMkLst>
+            <pc:docMk/>
+            <pc:sldMk cId="849266544" sldId="256"/>
+            <ac:graphicFrameMk id="21" creationId="{910A2FC8-357C-C22A-0986-C82E28EC10E3}"/>
+          </ac:graphicFrameMkLst>
+        </pc:graphicFrameChg>
+        <pc:graphicFrameChg chg="add del mod ord replST">
+          <ac:chgData name="Selvyn Yovany Martinez Barahona" userId="3ccf779dc7355a40" providerId="LiveId" clId="{176DFD19-9071-4B24-AA88-5DC23F609659}" dt="2022-11-19T03:20:56.366" v="4418"/>
+          <ac:graphicFrameMkLst>
+            <pc:docMk/>
+            <pc:sldMk cId="849266544" sldId="256"/>
+            <ac:graphicFrameMk id="22" creationId="{E3DA1DF7-CC80-88B7-3C5B-DFE7A46990CF}"/>
+          </ac:graphicFrameMkLst>
+        </pc:graphicFrameChg>
+        <pc:graphicFrameChg chg="add del mod ord replST">
+          <ac:chgData name="Selvyn Yovany Martinez Barahona" userId="3ccf779dc7355a40" providerId="LiveId" clId="{176DFD19-9071-4B24-AA88-5DC23F609659}" dt="2022-11-19T03:20:59.608" v="4511"/>
+          <ac:graphicFrameMkLst>
+            <pc:docMk/>
+            <pc:sldMk cId="849266544" sldId="256"/>
+            <ac:graphicFrameMk id="23" creationId="{FAD68086-A7FC-6A9D-101B-43701C182804}"/>
+          </ac:graphicFrameMkLst>
+        </pc:graphicFrameChg>
+        <pc:graphicFrameChg chg="add del mod ord replST">
+          <ac:chgData name="Selvyn Yovany Martinez Barahona" userId="3ccf779dc7355a40" providerId="LiveId" clId="{176DFD19-9071-4B24-AA88-5DC23F609659}" dt="2022-11-19T03:20:59.633" v="4524"/>
+          <ac:graphicFrameMkLst>
+            <pc:docMk/>
+            <pc:sldMk cId="849266544" sldId="256"/>
+            <ac:graphicFrameMk id="24" creationId="{499739CB-30B2-A7B9-813E-510715478E1B}"/>
+          </ac:graphicFrameMkLst>
+        </pc:graphicFrameChg>
+        <pc:graphicFrameChg chg="add del mod ord replST">
+          <ac:chgData name="Selvyn Yovany Martinez Barahona" userId="3ccf779dc7355a40" providerId="LiveId" clId="{176DFD19-9071-4B24-AA88-5DC23F609659}" dt="2022-11-19T03:21:08.359" v="4611"/>
+          <ac:graphicFrameMkLst>
+            <pc:docMk/>
+            <pc:sldMk cId="849266544" sldId="256"/>
+            <ac:graphicFrameMk id="25" creationId="{E69633D2-86DD-40A5-B3DB-49D5B6940E02}"/>
+          </ac:graphicFrameMkLst>
+        </pc:graphicFrameChg>
+        <pc:graphicFrameChg chg="add del mod ord replST">
+          <ac:chgData name="Selvyn Yovany Martinez Barahona" userId="3ccf779dc7355a40" providerId="LiveId" clId="{176DFD19-9071-4B24-AA88-5DC23F609659}" dt="2022-11-19T03:21:08.384" v="4628"/>
+          <ac:graphicFrameMkLst>
+            <pc:docMk/>
+            <pc:sldMk cId="849266544" sldId="256"/>
+            <ac:graphicFrameMk id="26" creationId="{F73456C1-36A8-FB8D-424B-AE8FB6E672CD}"/>
+          </ac:graphicFrameMkLst>
+        </pc:graphicFrameChg>
+        <pc:graphicFrameChg chg="add del mod ord replST">
+          <ac:chgData name="Selvyn Yovany Martinez Barahona" userId="3ccf779dc7355a40" providerId="LiveId" clId="{176DFD19-9071-4B24-AA88-5DC23F609659}" dt="2022-11-19T03:21:14.253" v="4745"/>
+          <ac:graphicFrameMkLst>
+            <pc:docMk/>
+            <pc:sldMk cId="849266544" sldId="256"/>
+            <ac:graphicFrameMk id="27" creationId="{E1EF9030-A26C-AC12-B9A4-535491E47D0F}"/>
+          </ac:graphicFrameMkLst>
+        </pc:graphicFrameChg>
+        <pc:graphicFrameChg chg="add del mod ord replST">
+          <ac:chgData name="Selvyn Yovany Martinez Barahona" userId="3ccf779dc7355a40" providerId="LiveId" clId="{176DFD19-9071-4B24-AA88-5DC23F609659}" dt="2022-11-19T03:21:14.288" v="4800"/>
+          <ac:graphicFrameMkLst>
+            <pc:docMk/>
+            <pc:sldMk cId="849266544" sldId="256"/>
+            <ac:graphicFrameMk id="28" creationId="{827BA7AA-2938-AE51-B475-A5D635E30790}"/>
+          </ac:graphicFrameMkLst>
+        </pc:graphicFrameChg>
+        <pc:graphicFrameChg chg="add del mod ord replST">
+          <ac:chgData name="Selvyn Yovany Martinez Barahona" userId="3ccf779dc7355a40" providerId="LiveId" clId="{176DFD19-9071-4B24-AA88-5DC23F609659}" dt="2022-11-19T03:21:22.671" v="4893"/>
+          <ac:graphicFrameMkLst>
+            <pc:docMk/>
+            <pc:sldMk cId="849266544" sldId="256"/>
+            <ac:graphicFrameMk id="29" creationId="{66E469EE-0A39-FA51-AD4F-0268E0665117}"/>
+          </ac:graphicFrameMkLst>
+        </pc:graphicFrameChg>
+        <pc:graphicFrameChg chg="add del mod ord replST">
+          <ac:chgData name="Selvyn Yovany Martinez Barahona" userId="3ccf779dc7355a40" providerId="LiveId" clId="{176DFD19-9071-4B24-AA88-5DC23F609659}" dt="2022-11-19T03:21:22.694" v="4906"/>
+          <ac:graphicFrameMkLst>
+            <pc:docMk/>
+            <pc:sldMk cId="849266544" sldId="256"/>
+            <ac:graphicFrameMk id="30" creationId="{C48CD50D-C055-453E-F5E2-861781AB6C39}"/>
+          </ac:graphicFrameMkLst>
+        </pc:graphicFrameChg>
+        <pc:graphicFrameChg chg="add del mod ord replST">
+          <ac:chgData name="Selvyn Yovany Martinez Barahona" userId="3ccf779dc7355a40" providerId="LiveId" clId="{176DFD19-9071-4B24-AA88-5DC23F609659}" dt="2022-11-19T03:25:00.010" v="5019"/>
+          <ac:graphicFrameMkLst>
+            <pc:docMk/>
+            <pc:sldMk cId="849266544" sldId="256"/>
+            <ac:graphicFrameMk id="31" creationId="{02EF4456-ED62-AF2F-9752-E4E82B83B089}"/>
+          </ac:graphicFrameMkLst>
+        </pc:graphicFrameChg>
+        <pc:graphicFrameChg chg="add del mod ord replST">
+          <ac:chgData name="Selvyn Yovany Martinez Barahona" userId="3ccf779dc7355a40" providerId="LiveId" clId="{176DFD19-9071-4B24-AA88-5DC23F609659}" dt="2022-11-19T03:25:00.053" v="5076"/>
+          <ac:graphicFrameMkLst>
+            <pc:docMk/>
+            <pc:sldMk cId="849266544" sldId="256"/>
+            <ac:graphicFrameMk id="32" creationId="{D5B01CAB-F785-15DD-C548-A37922663161}"/>
+          </ac:graphicFrameMkLst>
+        </pc:graphicFrameChg>
+        <pc:graphicFrameChg chg="add del mod ord replST">
+          <ac:chgData name="Selvyn Yovany Martinez Barahona" userId="3ccf779dc7355a40" providerId="LiveId" clId="{176DFD19-9071-4B24-AA88-5DC23F609659}" dt="2022-11-19T03:25:04.862" v="5167"/>
+          <ac:graphicFrameMkLst>
+            <pc:docMk/>
+            <pc:sldMk cId="849266544" sldId="256"/>
+            <ac:graphicFrameMk id="33" creationId="{A95C019E-7EF8-AD8E-4F74-62DC33BE8AA4}"/>
+          </ac:graphicFrameMkLst>
+        </pc:graphicFrameChg>
+        <pc:graphicFrameChg chg="add del mod ord replST">
+          <ac:chgData name="Selvyn Yovany Martinez Barahona" userId="3ccf779dc7355a40" providerId="LiveId" clId="{176DFD19-9071-4B24-AA88-5DC23F609659}" dt="2022-11-19T03:25:04.894" v="5200"/>
+          <ac:graphicFrameMkLst>
+            <pc:docMk/>
+            <pc:sldMk cId="849266544" sldId="256"/>
+            <ac:graphicFrameMk id="34" creationId="{0DBA75F6-EFAC-1D0D-C421-7DAA3328D82E}"/>
+          </ac:graphicFrameMkLst>
+        </pc:graphicFrameChg>
+        <pc:graphicFrameChg chg="add del mod ord replST">
+          <ac:chgData name="Selvyn Yovany Martinez Barahona" userId="3ccf779dc7355a40" providerId="LiveId" clId="{176DFD19-9071-4B24-AA88-5DC23F609659}" dt="2022-11-19T03:25:08.431" v="5291"/>
+          <ac:graphicFrameMkLst>
+            <pc:docMk/>
+            <pc:sldMk cId="849266544" sldId="256"/>
+            <ac:graphicFrameMk id="35" creationId="{B8F0B766-2611-0A62-AB06-13071C4F6013}"/>
+          </ac:graphicFrameMkLst>
+        </pc:graphicFrameChg>
+        <pc:graphicFrameChg chg="add del mod ord replST">
+          <ac:chgData name="Selvyn Yovany Martinez Barahona" userId="3ccf779dc7355a40" providerId="LiveId" clId="{176DFD19-9071-4B24-AA88-5DC23F609659}" dt="2022-11-19T03:25:08.464" v="5328"/>
+          <ac:graphicFrameMkLst>
+            <pc:docMk/>
+            <pc:sldMk cId="849266544" sldId="256"/>
+            <ac:graphicFrameMk id="36" creationId="{4A6CD39E-5F3A-0D5C-8CA9-01E05D398656}"/>
+          </ac:graphicFrameMkLst>
+        </pc:graphicFrameChg>
+        <pc:graphicFrameChg chg="add del mod ord replST">
+          <ac:chgData name="Selvyn Yovany Martinez Barahona" userId="3ccf779dc7355a40" providerId="LiveId" clId="{176DFD19-9071-4B24-AA88-5DC23F609659}" dt="2022-11-19T03:25:10.067" v="5421"/>
+          <ac:graphicFrameMkLst>
+            <pc:docMk/>
+            <pc:sldMk cId="849266544" sldId="256"/>
+            <ac:graphicFrameMk id="37" creationId="{7AEC5B8F-C055-12E5-EB0C-5E6A7CE1B19F}"/>
+          </ac:graphicFrameMkLst>
+        </pc:graphicFrameChg>
+        <pc:graphicFrameChg chg="add del mod ord replST">
+          <ac:chgData name="Selvyn Yovany Martinez Barahona" userId="3ccf779dc7355a40" providerId="LiveId" clId="{176DFD19-9071-4B24-AA88-5DC23F609659}" dt="2022-11-19T03:25:10.101" v="5458"/>
+          <ac:graphicFrameMkLst>
+            <pc:docMk/>
+            <pc:sldMk cId="849266544" sldId="256"/>
+            <ac:graphicFrameMk id="38" creationId="{B951F857-80EE-2D8D-DC48-50BA9FB5F957}"/>
+          </ac:graphicFrameMkLst>
+        </pc:graphicFrameChg>
+        <pc:graphicFrameChg chg="add del mod ord replST">
+          <ac:chgData name="Selvyn Yovany Martinez Barahona" userId="3ccf779dc7355a40" providerId="LiveId" clId="{176DFD19-9071-4B24-AA88-5DC23F609659}" dt="2022-11-19T03:25:12.967" v="5551"/>
+          <ac:graphicFrameMkLst>
+            <pc:docMk/>
+            <pc:sldMk cId="849266544" sldId="256"/>
+            <ac:graphicFrameMk id="39" creationId="{3ABAF718-F084-7B7E-1E77-3FCC074D40C0}"/>
+          </ac:graphicFrameMkLst>
+        </pc:graphicFrameChg>
+        <pc:graphicFrameChg chg="add del mod ord replST">
+          <ac:chgData name="Selvyn Yovany Martinez Barahona" userId="3ccf779dc7355a40" providerId="LiveId" clId="{176DFD19-9071-4B24-AA88-5DC23F609659}" dt="2022-11-19T03:25:13.015" v="5614"/>
+          <ac:graphicFrameMkLst>
+            <pc:docMk/>
+            <pc:sldMk cId="849266544" sldId="256"/>
+            <ac:graphicFrameMk id="40" creationId="{17913FCB-5911-33E6-3964-FF11F03E9297}"/>
+          </ac:graphicFrameMkLst>
+        </pc:graphicFrameChg>
+        <pc:graphicFrameChg chg="add del mod ord replST">
+          <ac:chgData name="Selvyn Yovany Martinez Barahona" userId="3ccf779dc7355a40" providerId="LiveId" clId="{176DFD19-9071-4B24-AA88-5DC23F609659}" dt="2022-11-19T03:25:14.554" v="5707"/>
+          <ac:graphicFrameMkLst>
+            <pc:docMk/>
+            <pc:sldMk cId="849266544" sldId="256"/>
+            <ac:graphicFrameMk id="41" creationId="{611A52EA-4C20-B889-B1C7-71DEB4ADD9A6}"/>
+          </ac:graphicFrameMkLst>
+        </pc:graphicFrameChg>
+        <pc:graphicFrameChg chg="add del mod ord replST">
+          <ac:chgData name="Selvyn Yovany Martinez Barahona" userId="3ccf779dc7355a40" providerId="LiveId" clId="{176DFD19-9071-4B24-AA88-5DC23F609659}" dt="2022-11-19T03:25:14.602" v="5770"/>
+          <ac:graphicFrameMkLst>
+            <pc:docMk/>
+            <pc:sldMk cId="849266544" sldId="256"/>
+            <ac:graphicFrameMk id="42" creationId="{23BF523D-ACE5-2C6C-B898-B7ED54ABC1EE}"/>
+          </ac:graphicFrameMkLst>
+        </pc:graphicFrameChg>
+        <pc:graphicFrameChg chg="add del mod ord replST">
+          <ac:chgData name="Selvyn Yovany Martinez Barahona" userId="3ccf779dc7355a40" providerId="LiveId" clId="{176DFD19-9071-4B24-AA88-5DC23F609659}" dt="2022-11-19T03:25:16.894" v="5863"/>
+          <ac:graphicFrameMkLst>
+            <pc:docMk/>
+            <pc:sldMk cId="849266544" sldId="256"/>
+            <ac:graphicFrameMk id="43" creationId="{6AA2F400-F146-A6CB-74D1-86383F4E8495}"/>
+          </ac:graphicFrameMkLst>
+        </pc:graphicFrameChg>
+        <pc:graphicFrameChg chg="add del mod ord replST">
+          <ac:chgData name="Selvyn Yovany Martinez Barahona" userId="3ccf779dc7355a40" providerId="LiveId" clId="{176DFD19-9071-4B24-AA88-5DC23F609659}" dt="2022-11-19T03:25:16.923" v="5896"/>
+          <ac:graphicFrameMkLst>
+            <pc:docMk/>
+            <pc:sldMk cId="849266544" sldId="256"/>
+            <ac:graphicFrameMk id="44" creationId="{7555B252-5EF8-1282-458E-B9A5D0BE6A86}"/>
+          </ac:graphicFrameMkLst>
+        </pc:graphicFrameChg>
+        <pc:graphicFrameChg chg="add del mod ord replST">
+          <ac:chgData name="Selvyn Yovany Martinez Barahona" userId="3ccf779dc7355a40" providerId="LiveId" clId="{176DFD19-9071-4B24-AA88-5DC23F609659}" dt="2022-11-19T03:25:19.225" v="5987"/>
+          <ac:graphicFrameMkLst>
+            <pc:docMk/>
+            <pc:sldMk cId="849266544" sldId="256"/>
+            <ac:graphicFrameMk id="45" creationId="{27A4A471-5649-28EB-433C-0D1A7ED06D2B}"/>
+          </ac:graphicFrameMkLst>
+        </pc:graphicFrameChg>
+        <pc:graphicFrameChg chg="add del mod ord replST">
+          <ac:chgData name="Selvyn Yovany Martinez Barahona" userId="3ccf779dc7355a40" providerId="LiveId" clId="{176DFD19-9071-4B24-AA88-5DC23F609659}" dt="2022-11-19T03:25:19.254" v="6020"/>
+          <ac:graphicFrameMkLst>
+            <pc:docMk/>
+            <pc:sldMk cId="849266544" sldId="256"/>
+            <ac:graphicFrameMk id="46" creationId="{739A2F37-3CCF-97A1-C119-755F39607E82}"/>
+          </ac:graphicFrameMkLst>
+        </pc:graphicFrameChg>
+        <pc:graphicFrameChg chg="add del mod ord replST">
+          <ac:chgData name="Selvyn Yovany Martinez Barahona" userId="3ccf779dc7355a40" providerId="LiveId" clId="{176DFD19-9071-4B24-AA88-5DC23F609659}" dt="2022-11-19T03:25:32.634" v="6149"/>
+          <ac:graphicFrameMkLst>
+            <pc:docMk/>
+            <pc:sldMk cId="849266544" sldId="256"/>
+            <ac:graphicFrameMk id="47" creationId="{8ACEEAFB-869D-B827-46F3-E254D4F53CBC}"/>
+          </ac:graphicFrameMkLst>
+        </pc:graphicFrameChg>
+        <pc:graphicFrameChg chg="add del mod ord replST">
+          <ac:chgData name="Selvyn Yovany Martinez Barahona" userId="3ccf779dc7355a40" providerId="LiveId" clId="{176DFD19-9071-4B24-AA88-5DC23F609659}" dt="2022-11-19T03:25:32.658" v="6164"/>
+          <ac:graphicFrameMkLst>
+            <pc:docMk/>
+            <pc:sldMk cId="849266544" sldId="256"/>
+            <ac:graphicFrameMk id="48" creationId="{6F0DCCB7-1866-8481-9202-2BB522C5D15D}"/>
+          </ac:graphicFrameMkLst>
+        </pc:graphicFrameChg>
+        <pc:graphicFrameChg chg="add del mod ord replST">
+          <ac:chgData name="Selvyn Yovany Martinez Barahona" userId="3ccf779dc7355a40" providerId="LiveId" clId="{176DFD19-9071-4B24-AA88-5DC23F609659}" dt="2022-11-19T03:25:47.212" v="6300"/>
+          <ac:graphicFrameMkLst>
+            <pc:docMk/>
+            <pc:sldMk cId="849266544" sldId="256"/>
+            <ac:graphicFrameMk id="49" creationId="{8D1D6577-21A2-FC61-BDA9-44919FE67F00}"/>
+          </ac:graphicFrameMkLst>
+        </pc:graphicFrameChg>
+        <pc:graphicFrameChg chg="add del mod ord replST">
+          <ac:chgData name="Selvyn Yovany Martinez Barahona" userId="3ccf779dc7355a40" providerId="LiveId" clId="{176DFD19-9071-4B24-AA88-5DC23F609659}" dt="2022-11-19T03:25:47.237" v="6313"/>
+          <ac:graphicFrameMkLst>
+            <pc:docMk/>
+            <pc:sldMk cId="849266544" sldId="256"/>
+            <ac:graphicFrameMk id="50" creationId="{6612326E-FAF0-5488-064E-D83ABF6675F0}"/>
+          </ac:graphicFrameMkLst>
+        </pc:graphicFrameChg>
+        <pc:graphicFrameChg chg="add del mod ord replST">
+          <ac:chgData name="Selvyn Yovany Martinez Barahona" userId="3ccf779dc7355a40" providerId="LiveId" clId="{176DFD19-9071-4B24-AA88-5DC23F609659}" dt="2022-11-19T03:26:40.635" v="7387"/>
+          <ac:graphicFrameMkLst>
+            <pc:docMk/>
+            <pc:sldMk cId="849266544" sldId="256"/>
+            <ac:graphicFrameMk id="51" creationId="{E553924D-7DA8-15C0-529A-E315771DBE66}"/>
+          </ac:graphicFrameMkLst>
+        </pc:graphicFrameChg>
+        <pc:graphicFrameChg chg="add del mod ord replST">
+          <ac:chgData name="Selvyn Yovany Martinez Barahona" userId="3ccf779dc7355a40" providerId="LiveId" clId="{176DFD19-9071-4B24-AA88-5DC23F609659}" dt="2022-11-19T03:26:40.720" v="7438"/>
+          <ac:graphicFrameMkLst>
+            <pc:docMk/>
+            <pc:sldMk cId="849266544" sldId="256"/>
+            <ac:graphicFrameMk id="52" creationId="{D8784020-BF09-EC5E-43F7-D2A70B7B876F}"/>
+          </ac:graphicFrameMkLst>
+        </pc:graphicFrameChg>
+        <pc:graphicFrameChg chg="add del mod ord replST delST">
+          <ac:chgData name="Selvyn Yovany Martinez Barahona" userId="3ccf779dc7355a40" providerId="LiveId" clId="{176DFD19-9071-4B24-AA88-5DC23F609659}" dt="2022-11-19T03:26:14.359" v="6762"/>
+          <ac:graphicFrameMkLst>
+            <pc:docMk/>
+            <pc:sldMk cId="849266544" sldId="256"/>
+            <ac:graphicFrameMk id="53" creationId="{D82F98DD-E9B8-8AC8-AF5C-EA1CFAF0EA5D}"/>
+          </ac:graphicFrameMkLst>
+        </pc:graphicFrameChg>
+        <pc:graphicFrameChg chg="add del mod ord replST delST">
+          <ac:chgData name="Selvyn Yovany Martinez Barahona" userId="3ccf779dc7355a40" providerId="LiveId" clId="{176DFD19-9071-4B24-AA88-5DC23F609659}" dt="2022-11-19T03:26:14.359" v="6762"/>
+          <ac:graphicFrameMkLst>
+            <pc:docMk/>
+            <pc:sldMk cId="849266544" sldId="256"/>
+            <ac:graphicFrameMk id="54" creationId="{BC7E3DC2-758F-98E2-66F7-DA95C7B1F357}"/>
+          </ac:graphicFrameMkLst>
+        </pc:graphicFrameChg>
+        <pc:graphicFrameChg chg="add mod ord replST delST">
+          <ac:chgData name="Selvyn Yovany Martinez Barahona" userId="3ccf779dc7355a40" providerId="LiveId" clId="{176DFD19-9071-4B24-AA88-5DC23F609659}" dt="2022-11-19T03:26:13.495" v="6711"/>
+          <ac:graphicFrameMkLst>
+            <pc:docMk/>
+            <pc:sldMk cId="849266544" sldId="256"/>
+            <ac:graphicFrameMk id="55" creationId="{EB49AA64-62AC-B6D1-191A-B2994478409C}"/>
+          </ac:graphicFrameMkLst>
+        </pc:graphicFrameChg>
+        <pc:graphicFrameChg chg="add mod ord replST delST">
+          <ac:chgData name="Selvyn Yovany Martinez Barahona" userId="3ccf779dc7355a40" providerId="LiveId" clId="{176DFD19-9071-4B24-AA88-5DC23F609659}" dt="2022-11-19T03:26:13.495" v="6711"/>
+          <ac:graphicFrameMkLst>
+            <pc:docMk/>
+            <pc:sldMk cId="849266544" sldId="256"/>
+            <ac:graphicFrameMk id="56" creationId="{859BF745-175C-C2D7-0510-20DD329CA736}"/>
+          </ac:graphicFrameMkLst>
+        </pc:graphicFrameChg>
+        <pc:graphicFrameChg chg="add mod ord replST delST">
+          <ac:chgData name="Selvyn Yovany Martinez Barahona" userId="3ccf779dc7355a40" providerId="LiveId" clId="{176DFD19-9071-4B24-AA88-5DC23F609659}" dt="2022-11-19T03:26:25.617" v="7224"/>
+          <ac:graphicFrameMkLst>
+            <pc:docMk/>
+            <pc:sldMk cId="849266544" sldId="256"/>
+            <ac:graphicFrameMk id="59" creationId="{D0A59F42-3243-25BC-6BD1-561FFB2BDBD9}"/>
+          </ac:graphicFrameMkLst>
+        </pc:graphicFrameChg>
+        <pc:graphicFrameChg chg="add mod ord replST delST">
+          <ac:chgData name="Selvyn Yovany Martinez Barahona" userId="3ccf779dc7355a40" providerId="LiveId" clId="{176DFD19-9071-4B24-AA88-5DC23F609659}" dt="2022-11-19T03:26:25.617" v="7224"/>
+          <ac:graphicFrameMkLst>
+            <pc:docMk/>
+            <pc:sldMk cId="849266544" sldId="256"/>
+            <ac:graphicFrameMk id="60" creationId="{C688A959-3172-3AB2-EFEE-E62986C46ABA}"/>
+          </ac:graphicFrameMkLst>
+        </pc:graphicFrameChg>
+        <pc:graphicFrameChg chg="add del mod ord replST">
+          <ac:chgData name="Selvyn Yovany Martinez Barahona" userId="3ccf779dc7355a40" providerId="LiveId" clId="{176DFD19-9071-4B24-AA88-5DC23F609659}" dt="2022-11-19T03:26:42.326" v="7532"/>
+          <ac:graphicFrameMkLst>
+            <pc:docMk/>
+            <pc:sldMk cId="849266544" sldId="256"/>
+            <ac:graphicFrameMk id="63" creationId="{1BEC7C37-833F-964E-FF43-1C088BF9E3D8}"/>
           </ac:graphicFrameMkLst>
         </pc:graphicFrameChg>
         <pc:graphicFrameChg chg="del">
@@ -611,6 +1091,22 @@
           </ac:graphicFrameMkLst>
         </pc:graphicFrameChg>
         <pc:graphicFrameChg chg="add del mod ord replST">
+          <ac:chgData name="Selvyn Yovany Martinez Barahona" userId="3ccf779dc7355a40" providerId="LiveId" clId="{176DFD19-9071-4B24-AA88-5DC23F609659}" dt="2022-11-19T03:26:42.353" v="7545"/>
+          <ac:graphicFrameMkLst>
+            <pc:docMk/>
+            <pc:sldMk cId="849266544" sldId="256"/>
+            <ac:graphicFrameMk id="448" creationId="{36989CB9-BC05-9169-6B55-F1B2F8C8F6C9}"/>
+          </ac:graphicFrameMkLst>
+        </pc:graphicFrameChg>
+        <pc:graphicFrameChg chg="add del mod ord replST">
+          <ac:chgData name="Selvyn Yovany Martinez Barahona" userId="3ccf779dc7355a40" providerId="LiveId" clId="{176DFD19-9071-4B24-AA88-5DC23F609659}" dt="2022-11-19T03:26:47.084" v="7635"/>
+          <ac:graphicFrameMkLst>
+            <pc:docMk/>
+            <pc:sldMk cId="849266544" sldId="256"/>
+            <ac:graphicFrameMk id="449" creationId="{087353B7-D309-CA92-A7DE-E3B126004DBC}"/>
+          </ac:graphicFrameMkLst>
+        </pc:graphicFrameChg>
+        <pc:graphicFrameChg chg="add del mod ord replST">
           <ac:chgData name="Selvyn Yovany Martinez Barahona" userId="3ccf779dc7355a40" providerId="LiveId" clId="{176DFD19-9071-4B24-AA88-5DC23F609659}" dt="2022-11-08T00:30:44.639" v="1202"/>
           <ac:graphicFrameMkLst>
             <pc:docMk/>
@@ -627,11 +1123,43 @@
           </ac:graphicFrameMkLst>
         </pc:graphicFrameChg>
         <pc:graphicFrameChg chg="add del mod ord replST">
+          <ac:chgData name="Selvyn Yovany Martinez Barahona" userId="3ccf779dc7355a40" providerId="LiveId" clId="{176DFD19-9071-4B24-AA88-5DC23F609659}" dt="2022-11-19T03:26:47.127" v="7688"/>
+          <ac:graphicFrameMkLst>
+            <pc:docMk/>
+            <pc:sldMk cId="849266544" sldId="256"/>
+            <ac:graphicFrameMk id="450" creationId="{90205274-D1BE-44EB-99B3-3D37E68FA1D2}"/>
+          </ac:graphicFrameMkLst>
+        </pc:graphicFrameChg>
+        <pc:graphicFrameChg chg="add del mod ord replST">
+          <ac:chgData name="Selvyn Yovany Martinez Barahona" userId="3ccf779dc7355a40" providerId="LiveId" clId="{176DFD19-9071-4B24-AA88-5DC23F609659}" dt="2022-11-19T03:26:55.182" v="7777"/>
+          <ac:graphicFrameMkLst>
+            <pc:docMk/>
+            <pc:sldMk cId="849266544" sldId="256"/>
+            <ac:graphicFrameMk id="451" creationId="{176E0BB6-0507-7147-9F4E-B033527BBD41}"/>
+          </ac:graphicFrameMkLst>
+        </pc:graphicFrameChg>
+        <pc:graphicFrameChg chg="add del mod ord replST">
+          <ac:chgData name="Selvyn Yovany Martinez Barahona" userId="3ccf779dc7355a40" providerId="LiveId" clId="{176DFD19-9071-4B24-AA88-5DC23F609659}" dt="2022-11-19T03:26:55.212" v="7794"/>
+          <ac:graphicFrameMkLst>
+            <pc:docMk/>
+            <pc:sldMk cId="849266544" sldId="256"/>
+            <ac:graphicFrameMk id="452" creationId="{1FCFA108-8B04-E534-7C47-9C23C9ED2667}"/>
+          </ac:graphicFrameMkLst>
+        </pc:graphicFrameChg>
+        <pc:graphicFrameChg chg="add del mod ord replST">
           <ac:chgData name="Selvyn Yovany Martinez Barahona" userId="3ccf779dc7355a40" providerId="LiveId" clId="{176DFD19-9071-4B24-AA88-5DC23F609659}" dt="2022-11-08T00:30:37.632" v="529"/>
           <ac:graphicFrameMkLst>
             <pc:docMk/>
             <pc:sldMk cId="849266544" sldId="256"/>
             <ac:graphicFrameMk id="452" creationId="{7F3FF725-2A47-BE20-1B08-92318A058139}"/>
+          </ac:graphicFrameMkLst>
+        </pc:graphicFrameChg>
+        <pc:graphicFrameChg chg="add del mod ord replST">
+          <ac:chgData name="Selvyn Yovany Martinez Barahona" userId="3ccf779dc7355a40" providerId="LiveId" clId="{176DFD19-9071-4B24-AA88-5DC23F609659}" dt="2022-11-19T03:27:02.058" v="7885"/>
+          <ac:graphicFrameMkLst>
+            <pc:docMk/>
+            <pc:sldMk cId="849266544" sldId="256"/>
+            <ac:graphicFrameMk id="453" creationId="{16115563-F5DE-CB1D-60AF-AD5A5D597A1E}"/>
           </ac:graphicFrameMkLst>
         </pc:graphicFrameChg>
         <pc:graphicFrameChg chg="add del mod ord replST">
@@ -643,6 +1171,14 @@
           </ac:graphicFrameMkLst>
         </pc:graphicFrameChg>
         <pc:graphicFrameChg chg="add del mod ord replST">
+          <ac:chgData name="Selvyn Yovany Martinez Barahona" userId="3ccf779dc7355a40" providerId="LiveId" clId="{176DFD19-9071-4B24-AA88-5DC23F609659}" dt="2022-11-19T03:27:02.087" v="7902"/>
+          <ac:graphicFrameMkLst>
+            <pc:docMk/>
+            <pc:sldMk cId="849266544" sldId="256"/>
+            <ac:graphicFrameMk id="454" creationId="{F3E053AE-71C5-A8B0-2C5D-189B0197D6FC}"/>
+          </ac:graphicFrameMkLst>
+        </pc:graphicFrameChg>
+        <pc:graphicFrameChg chg="add del mod ord replST">
           <ac:chgData name="Selvyn Yovany Martinez Barahona" userId="3ccf779dc7355a40" providerId="LiveId" clId="{176DFD19-9071-4B24-AA88-5DC23F609659}" dt="2022-11-08T00:30:44.627" v="1187"/>
           <ac:graphicFrameMkLst>
             <pc:docMk/>
@@ -651,7 +1187,23 @@
           </ac:graphicFrameMkLst>
         </pc:graphicFrameChg>
         <pc:graphicFrameChg chg="add del mod ord replST">
-          <ac:chgData name="Selvyn Yovany Martinez Barahona" userId="3ccf779dc7355a40" providerId="LiveId" clId="{176DFD19-9071-4B24-AA88-5DC23F609659}" dt="2022-11-08T05:29:39.198" v="2778"/>
+          <ac:chgData name="Selvyn Yovany Martinez Barahona" userId="3ccf779dc7355a40" providerId="LiveId" clId="{176DFD19-9071-4B24-AA88-5DC23F609659}" dt="2022-11-19T03:27:07.614" v="7991"/>
+          <ac:graphicFrameMkLst>
+            <pc:docMk/>
+            <pc:sldMk cId="849266544" sldId="256"/>
+            <ac:graphicFrameMk id="455" creationId="{A43D170B-85CA-D239-A40E-128C5E53E024}"/>
+          </ac:graphicFrameMkLst>
+        </pc:graphicFrameChg>
+        <pc:graphicFrameChg chg="add del mod ord replST">
+          <ac:chgData name="Selvyn Yovany Martinez Barahona" userId="3ccf779dc7355a40" providerId="LiveId" clId="{176DFD19-9071-4B24-AA88-5DC23F609659}" dt="2022-11-19T03:27:07.642" v="8008"/>
+          <ac:graphicFrameMkLst>
+            <pc:docMk/>
+            <pc:sldMk cId="849266544" sldId="256"/>
+            <ac:graphicFrameMk id="456" creationId="{688040C7-8ABC-180B-4585-5FD5B8F8CA84}"/>
+          </ac:graphicFrameMkLst>
+        </pc:graphicFrameChg>
+        <pc:graphicFrameChg chg="add del mod ord replST">
+          <ac:chgData name="Selvyn Yovany Martinez Barahona" userId="3ccf779dc7355a40" providerId="LiveId" clId="{176DFD19-9071-4B24-AA88-5DC23F609659}" dt="2022-11-19T03:20:05.333" v="3109"/>
           <ac:graphicFrameMkLst>
             <pc:docMk/>
             <pc:sldMk cId="849266544" sldId="256"/>
@@ -666,12 +1218,44 @@
             <ac:graphicFrameMk id="463" creationId="{3A984127-996E-BA42-FDDD-4539A83BB14B}"/>
           </ac:graphicFrameMkLst>
         </pc:graphicFrameChg>
+        <pc:graphicFrameChg chg="add del mod ord replST">
+          <ac:chgData name="Selvyn Yovany Martinez Barahona" userId="3ccf779dc7355a40" providerId="LiveId" clId="{176DFD19-9071-4B24-AA88-5DC23F609659}" dt="2022-11-19T03:27:16.937" v="8099"/>
+          <ac:graphicFrameMkLst>
+            <pc:docMk/>
+            <pc:sldMk cId="849266544" sldId="256"/>
+            <ac:graphicFrameMk id="463" creationId="{3C7AE72C-4023-2E6E-A9F7-C1F225E365BD}"/>
+          </ac:graphicFrameMkLst>
+        </pc:graphicFrameChg>
+        <pc:graphicFrameChg chg="add del mod ord replST">
+          <ac:chgData name="Selvyn Yovany Martinez Barahona" userId="3ccf779dc7355a40" providerId="LiveId" clId="{176DFD19-9071-4B24-AA88-5DC23F609659}" dt="2022-11-19T03:27:16.966" v="8112"/>
+          <ac:graphicFrameMkLst>
+            <pc:docMk/>
+            <pc:sldMk cId="849266544" sldId="256"/>
+            <ac:graphicFrameMk id="464" creationId="{4FED833C-C698-F701-A34D-CD78B9EA7FCB}"/>
+          </ac:graphicFrameMkLst>
+        </pc:graphicFrameChg>
         <pc:graphicFrameChg chg="add del mod ord replST delST">
           <ac:chgData name="Selvyn Yovany Martinez Barahona" userId="3ccf779dc7355a40" providerId="LiveId" clId="{176DFD19-9071-4B24-AA88-5DC23F609659}" dt="2022-11-08T00:33:47.002" v="2499" actId="1076"/>
           <ac:graphicFrameMkLst>
             <pc:docMk/>
             <pc:sldMk cId="849266544" sldId="256"/>
             <ac:graphicFrameMk id="465" creationId="{E80F7508-93FE-C19F-C6AE-87DE146340DC}"/>
+          </ac:graphicFrameMkLst>
+        </pc:graphicFrameChg>
+        <pc:graphicFrameChg chg="add mod ord replST">
+          <ac:chgData name="Selvyn Yovany Martinez Barahona" userId="3ccf779dc7355a40" providerId="LiveId" clId="{176DFD19-9071-4B24-AA88-5DC23F609659}" dt="2022-11-19T03:27:16.994" v="8146"/>
+          <ac:graphicFrameMkLst>
+            <pc:docMk/>
+            <pc:sldMk cId="849266544" sldId="256"/>
+            <ac:graphicFrameMk id="465" creationId="{F65BFDD9-B94A-5DF0-B040-89637F8D1BD7}"/>
+          </ac:graphicFrameMkLst>
+        </pc:graphicFrameChg>
+        <pc:graphicFrameChg chg="add mod ord replST">
+          <ac:chgData name="Selvyn Yovany Martinez Barahona" userId="3ccf779dc7355a40" providerId="LiveId" clId="{176DFD19-9071-4B24-AA88-5DC23F609659}" dt="2022-11-19T03:27:17.005" v="8176"/>
+          <ac:graphicFrameMkLst>
+            <pc:docMk/>
+            <pc:sldMk cId="849266544" sldId="256"/>
+            <ac:graphicFrameMk id="466" creationId="{3E3198C3-C4F8-578B-8084-83A2A65F0F82}"/>
           </ac:graphicFrameMkLst>
         </pc:graphicFrameChg>
         <pc:graphicFrameChg chg="add mod ord replST delST">
@@ -773,7 +1357,7 @@
             </c:spPr>
             <c:extLst>
               <c:ext xmlns:c16="http://schemas.microsoft.com/office/drawing/2014/chart" uri="{C3380CC4-5D6E-409C-BE32-E72D297353CC}">
-                <c16:uniqueId val="{00000000-26CD-48A0-83D0-4F2AED668977}"/>
+                <c16:uniqueId val="{00000000-62C2-42CB-800E-4BB1DAD5CFE7}"/>
               </c:ext>
             </c:extLst>
           </c:dPt>
@@ -790,7 +1374,7 @@
             </c:spPr>
             <c:extLst>
               <c:ext xmlns:c16="http://schemas.microsoft.com/office/drawing/2014/chart" uri="{C3380CC4-5D6E-409C-BE32-E72D297353CC}">
-                <c16:uniqueId val="{00000001-26CD-48A0-83D0-4F2AED668977}"/>
+                <c16:uniqueId val="{00000001-62C2-42CB-800E-4BB1DAD5CFE7}"/>
               </c:ext>
             </c:extLst>
           </c:dPt>
@@ -807,7 +1391,7 @@
             </c:spPr>
             <c:extLst>
               <c:ext xmlns:c16="http://schemas.microsoft.com/office/drawing/2014/chart" uri="{C3380CC4-5D6E-409C-BE32-E72D297353CC}">
-                <c16:uniqueId val="{00000002-26CD-48A0-83D0-4F2AED668977}"/>
+                <c16:uniqueId val="{00000002-62C2-42CB-800E-4BB1DAD5CFE7}"/>
               </c:ext>
             </c:extLst>
           </c:dPt>
@@ -824,7 +1408,7 @@
             </c:spPr>
             <c:extLst>
               <c:ext xmlns:c16="http://schemas.microsoft.com/office/drawing/2014/chart" uri="{C3380CC4-5D6E-409C-BE32-E72D297353CC}">
-                <c16:uniqueId val="{00000003-26CD-48A0-83D0-4F2AED668977}"/>
+                <c16:uniqueId val="{00000003-62C2-42CB-800E-4BB1DAD5CFE7}"/>
               </c:ext>
             </c:extLst>
           </c:dPt>
@@ -841,7 +1425,7 @@
             </c:spPr>
             <c:extLst>
               <c:ext xmlns:c16="http://schemas.microsoft.com/office/drawing/2014/chart" uri="{C3380CC4-5D6E-409C-BE32-E72D297353CC}">
-                <c16:uniqueId val="{00000004-26CD-48A0-83D0-4F2AED668977}"/>
+                <c16:uniqueId val="{00000004-62C2-42CB-800E-4BB1DAD5CFE7}"/>
               </c:ext>
             </c:extLst>
           </c:dPt>
@@ -858,7 +1442,7 @@
             </c:spPr>
             <c:extLst>
               <c:ext xmlns:c16="http://schemas.microsoft.com/office/drawing/2014/chart" uri="{C3380CC4-5D6E-409C-BE32-E72D297353CC}">
-                <c16:uniqueId val="{00000005-26CD-48A0-83D0-4F2AED668977}"/>
+                <c16:uniqueId val="{00000005-62C2-42CB-800E-4BB1DAD5CFE7}"/>
               </c:ext>
             </c:extLst>
           </c:dPt>
@@ -910,7 +1494,7 @@
                   </c15:spPr>
                 </c:ext>
                 <c:ext xmlns:c16="http://schemas.microsoft.com/office/drawing/2014/chart" uri="{C3380CC4-5D6E-409C-BE32-E72D297353CC}">
-                  <c16:uniqueId val="{00000000-26CD-48A0-83D0-4F2AED668977}"/>
+                  <c16:uniqueId val="{00000000-62C2-42CB-800E-4BB1DAD5CFE7}"/>
                 </c:ext>
               </c:extLst>
             </c:dLbl>
@@ -960,7 +1544,7 @@
           </c:val>
           <c:extLst>
             <c:ext xmlns:c16="http://schemas.microsoft.com/office/drawing/2014/chart" uri="{C3380CC4-5D6E-409C-BE32-E72D297353CC}">
-              <c16:uniqueId val="{00000006-26CD-48A0-83D0-4F2AED668977}"/>
+              <c16:uniqueId val="{00000006-62C2-42CB-800E-4BB1DAD5CFE7}"/>
             </c:ext>
           </c:extLst>
         </c:ser>
@@ -971,7 +1555,7 @@
           <c:showSerName val="0"/>
           <c:showPercent val="0"/>
           <c:showBubbleSize val="0"/>
-          <c:showLeaderLines val="1"/>
+          <c:showLeaderLines val="0"/>
         </c:dLbls>
         <c:firstSliceAng val="0"/>
         <c:holeSize val="50"/>
@@ -1032,7 +1616,7 @@
             </c:spPr>
             <c:extLst>
               <c:ext xmlns:c16="http://schemas.microsoft.com/office/drawing/2014/chart" uri="{C3380CC4-5D6E-409C-BE32-E72D297353CC}">
-                <c16:uniqueId val="{00000000-717F-4ED5-8C37-B6E2B63010D7}"/>
+                <c16:uniqueId val="{00000000-F793-4CD7-9880-F204275D3AD4}"/>
               </c:ext>
             </c:extLst>
           </c:dPt>
@@ -1049,7 +1633,7 @@
             </c:spPr>
             <c:extLst>
               <c:ext xmlns:c16="http://schemas.microsoft.com/office/drawing/2014/chart" uri="{C3380CC4-5D6E-409C-BE32-E72D297353CC}">
-                <c16:uniqueId val="{00000001-717F-4ED5-8C37-B6E2B63010D7}"/>
+                <c16:uniqueId val="{00000001-F793-4CD7-9880-F204275D3AD4}"/>
               </c:ext>
             </c:extLst>
           </c:dPt>
@@ -1066,7 +1650,7 @@
             </c:spPr>
             <c:extLst>
               <c:ext xmlns:c16="http://schemas.microsoft.com/office/drawing/2014/chart" uri="{C3380CC4-5D6E-409C-BE32-E72D297353CC}">
-                <c16:uniqueId val="{00000002-717F-4ED5-8C37-B6E2B63010D7}"/>
+                <c16:uniqueId val="{00000002-F793-4CD7-9880-F204275D3AD4}"/>
               </c:ext>
             </c:extLst>
           </c:dPt>
@@ -1083,7 +1667,7 @@
             </c:spPr>
             <c:extLst>
               <c:ext xmlns:c16="http://schemas.microsoft.com/office/drawing/2014/chart" uri="{C3380CC4-5D6E-409C-BE32-E72D297353CC}">
-                <c16:uniqueId val="{00000003-717F-4ED5-8C37-B6E2B63010D7}"/>
+                <c16:uniqueId val="{00000003-F793-4CD7-9880-F204275D3AD4}"/>
               </c:ext>
             </c:extLst>
           </c:dPt>
@@ -1100,7 +1684,7 @@
             </c:spPr>
             <c:extLst>
               <c:ext xmlns:c16="http://schemas.microsoft.com/office/drawing/2014/chart" uri="{C3380CC4-5D6E-409C-BE32-E72D297353CC}">
-                <c16:uniqueId val="{00000004-717F-4ED5-8C37-B6E2B63010D7}"/>
+                <c16:uniqueId val="{00000004-F793-4CD7-9880-F204275D3AD4}"/>
               </c:ext>
             </c:extLst>
           </c:dPt>
@@ -1117,7 +1701,7 @@
             </c:spPr>
             <c:extLst>
               <c:ext xmlns:c16="http://schemas.microsoft.com/office/drawing/2014/chart" uri="{C3380CC4-5D6E-409C-BE32-E72D297353CC}">
-                <c16:uniqueId val="{00000005-717F-4ED5-8C37-B6E2B63010D7}"/>
+                <c16:uniqueId val="{00000005-F793-4CD7-9880-F204275D3AD4}"/>
               </c:ext>
             </c:extLst>
           </c:dPt>
@@ -1169,7 +1753,7 @@
                   </c15:spPr>
                 </c:ext>
                 <c:ext xmlns:c16="http://schemas.microsoft.com/office/drawing/2014/chart" uri="{C3380CC4-5D6E-409C-BE32-E72D297353CC}">
-                  <c16:uniqueId val="{00000000-717F-4ED5-8C37-B6E2B63010D7}"/>
+                  <c16:uniqueId val="{00000000-F793-4CD7-9880-F204275D3AD4}"/>
                 </c:ext>
               </c:extLst>
             </c:dLbl>
@@ -1219,7 +1803,7 @@
           </c:val>
           <c:extLst>
             <c:ext xmlns:c16="http://schemas.microsoft.com/office/drawing/2014/chart" uri="{C3380CC4-5D6E-409C-BE32-E72D297353CC}">
-              <c16:uniqueId val="{00000006-717F-4ED5-8C37-B6E2B63010D7}"/>
+              <c16:uniqueId val="{00000006-F793-4CD7-9880-F204275D3AD4}"/>
             </c:ext>
           </c:extLst>
         </c:ser>
@@ -1393,7 +1977,7 @@
           <a:p>
             <a:fld id="{6E4A95F8-A962-462E-B5CA-65B478895019}" type="datetimeFigureOut">
               <a:rPr lang="en-US" smtClean="0"/>
-              <a:t>11/7/2022</a:t>
+              <a:t>11/18/2022</a:t>
             </a:fld>
             <a:endParaRPr lang="en-US"/>
           </a:p>
@@ -1591,7 +2175,7 @@
           <a:p>
             <a:fld id="{6E4A95F8-A962-462E-B5CA-65B478895019}" type="datetimeFigureOut">
               <a:rPr lang="en-US" smtClean="0"/>
-              <a:t>11/7/2022</a:t>
+              <a:t>11/18/2022</a:t>
             </a:fld>
             <a:endParaRPr lang="en-US"/>
           </a:p>
@@ -1799,7 +2383,7 @@
           <a:p>
             <a:fld id="{6E4A95F8-A962-462E-B5CA-65B478895019}" type="datetimeFigureOut">
               <a:rPr lang="en-US" smtClean="0"/>
-              <a:t>11/7/2022</a:t>
+              <a:t>11/18/2022</a:t>
             </a:fld>
             <a:endParaRPr lang="en-US"/>
           </a:p>
@@ -1997,7 +2581,7 @@
           <a:p>
             <a:fld id="{6E4A95F8-A962-462E-B5CA-65B478895019}" type="datetimeFigureOut">
               <a:rPr lang="en-US" smtClean="0"/>
-              <a:t>11/7/2022</a:t>
+              <a:t>11/18/2022</a:t>
             </a:fld>
             <a:endParaRPr lang="en-US"/>
           </a:p>
@@ -2272,7 +2856,7 @@
           <a:p>
             <a:fld id="{6E4A95F8-A962-462E-B5CA-65B478895019}" type="datetimeFigureOut">
               <a:rPr lang="en-US" smtClean="0"/>
-              <a:t>11/7/2022</a:t>
+              <a:t>11/18/2022</a:t>
             </a:fld>
             <a:endParaRPr lang="en-US"/>
           </a:p>
@@ -2537,7 +3121,7 @@
           <a:p>
             <a:fld id="{6E4A95F8-A962-462E-B5CA-65B478895019}" type="datetimeFigureOut">
               <a:rPr lang="en-US" smtClean="0"/>
-              <a:t>11/7/2022</a:t>
+              <a:t>11/18/2022</a:t>
             </a:fld>
             <a:endParaRPr lang="en-US"/>
           </a:p>
@@ -2949,7 +3533,7 @@
           <a:p>
             <a:fld id="{6E4A95F8-A962-462E-B5CA-65B478895019}" type="datetimeFigureOut">
               <a:rPr lang="en-US" smtClean="0"/>
-              <a:t>11/7/2022</a:t>
+              <a:t>11/18/2022</a:t>
             </a:fld>
             <a:endParaRPr lang="en-US"/>
           </a:p>
@@ -3090,7 +3674,7 @@
           <a:p>
             <a:fld id="{6E4A95F8-A962-462E-B5CA-65B478895019}" type="datetimeFigureOut">
               <a:rPr lang="en-US" smtClean="0"/>
-              <a:t>11/7/2022</a:t>
+              <a:t>11/18/2022</a:t>
             </a:fld>
             <a:endParaRPr lang="en-US"/>
           </a:p>
@@ -3203,7 +3787,7 @@
           <a:p>
             <a:fld id="{6E4A95F8-A962-462E-B5CA-65B478895019}" type="datetimeFigureOut">
               <a:rPr lang="en-US" smtClean="0"/>
-              <a:t>11/7/2022</a:t>
+              <a:t>11/18/2022</a:t>
             </a:fld>
             <a:endParaRPr lang="en-US"/>
           </a:p>
@@ -3514,7 +4098,7 @@
           <a:p>
             <a:fld id="{6E4A95F8-A962-462E-B5CA-65B478895019}" type="datetimeFigureOut">
               <a:rPr lang="en-US" smtClean="0"/>
-              <a:t>11/7/2022</a:t>
+              <a:t>11/18/2022</a:t>
             </a:fld>
             <a:endParaRPr lang="en-US"/>
           </a:p>
@@ -3802,7 +4386,7 @@
           <a:p>
             <a:fld id="{6E4A95F8-A962-462E-B5CA-65B478895019}" type="datetimeFigureOut">
               <a:rPr lang="en-US" smtClean="0"/>
-              <a:t>11/7/2022</a:t>
+              <a:t>11/18/2022</a:t>
             </a:fld>
             <a:endParaRPr lang="en-US"/>
           </a:p>
@@ -4115,7 +4699,7 @@
           <a:p>
             <a:fld id="{6E4A95F8-A962-462E-B5CA-65B478895019}" type="datetimeFigureOut">
               <a:rPr lang="en-US" smtClean="0"/>
-              <a:t>11/7/2022</a:t>
+              <a:t>11/18/2022</a:t>
             </a:fld>
             <a:endParaRPr lang="en-US"/>
           </a:p>
@@ -4550,7 +5134,7 @@
             </p:custDataLst>
             <p:extLst>
               <p:ext uri="{D42A27DB-BD31-4B8C-83A1-F6EECF244321}">
-                <p14:modId xmlns:p14="http://schemas.microsoft.com/office/powerpoint/2010/main" val="2410412473"/>
+                <p14:modId xmlns:p14="http://schemas.microsoft.com/office/powerpoint/2010/main" val="4039996030"/>
               </p:ext>
             </p:extLst>
           </p:nvPr>
@@ -4606,10 +5190,10 @@
       </p:graphicFrame>
       <p:graphicFrame>
         <p:nvGraphicFramePr>
-          <p:cNvPr id="462" name="Chart 461">
+          <p:cNvPr id="465" name="Chart 464">
             <a:extLst>
               <a:ext uri="{FF2B5EF4-FFF2-40B4-BE49-F238E27FC236}">
-                <a16:creationId xmlns:a16="http://schemas.microsoft.com/office/drawing/2014/main" id="{FE7E016F-660B-7432-CC61-F44D24B69DED}"/>
+                <a16:creationId xmlns:a16="http://schemas.microsoft.com/office/drawing/2014/main" id="{F65BFDD9-B94A-5DF0-B040-89637F8D1BD7}"/>
               </a:ext>
             </a:extLst>
           </p:cNvPr>
@@ -4620,7 +5204,7 @@
             </p:custDataLst>
             <p:extLst>
               <p:ext uri="{D42A27DB-BD31-4B8C-83A1-F6EECF244321}">
-                <p14:modId xmlns:p14="http://schemas.microsoft.com/office/powerpoint/2010/main" val="1171780040"/>
+                <p14:modId xmlns:p14="http://schemas.microsoft.com/office/powerpoint/2010/main" val="895636549"/>
               </p:ext>
             </p:extLst>
           </p:nvPr>
@@ -4637,6 +5221,244 @@
       </p:graphicFrame>
       <p:sp>
         <p:nvSpPr>
+          <p:cNvPr id="461" name="Text Placeholder 2">
+            <a:extLst>
+              <a:ext uri="{FF2B5EF4-FFF2-40B4-BE49-F238E27FC236}">
+                <a16:creationId xmlns:a16="http://schemas.microsoft.com/office/drawing/2014/main" id="{F01B8698-9294-F532-DDB4-2EE198CBAA21}"/>
+              </a:ext>
+            </a:extLst>
+          </p:cNvPr>
+          <p:cNvSpPr>
+            <a:spLocks noGrp="1"/>
+          </p:cNvSpPr>
+          <p:nvPr>
+            <p:custDataLst>
+              <p:tags r:id="rId3"/>
+            </p:custDataLst>
+          </p:nvPr>
+        </p:nvSpPr>
+        <p:spPr bwMode="gray">
+          <a:xfrm>
+            <a:off x="1585913" y="2109788"/>
+            <a:ext cx="403225" cy="192088"/>
+          </a:xfrm>
+          <a:prstGeom prst="rect">
+            <a:avLst/>
+          </a:prstGeom>
+          <a:solidFill>
+            <a:schemeClr val="accent6"/>
+          </a:solidFill>
+          <a:ln>
+            <a:noFill/>
+          </a:ln>
+          <a:effectLst/>
+        </p:spPr>
+        <p:txBody>
+          <a:bodyPr vert="horz" wrap="none" lIns="25400" tIns="0" rIns="25400" bIns="0" numCol="1" spcCol="0" rtlCol="0" anchor="ctr" anchorCtr="0">
+            <a:noAutofit/>
+          </a:bodyPr>
+          <a:lstStyle>
+            <a:lvl1pPr marL="228600" indent="-228600" algn="l" defTabSz="914400" rtl="0" eaLnBrk="1" latinLnBrk="0" hangingPunct="1">
+              <a:lnSpc>
+                <a:spcPct val="90000"/>
+              </a:lnSpc>
+              <a:spcBef>
+                <a:spcPts val="1000"/>
+              </a:spcBef>
+              <a:buFont typeface="Arial" panose="020B0604020202020204" pitchFamily="34" charset="0"/>
+              <a:buChar char="•"/>
+              <a:defRPr sz="2800" kern="1200">
+                <a:solidFill>
+                  <a:schemeClr val="tx1"/>
+                </a:solidFill>
+                <a:latin typeface="+mn-lt"/>
+                <a:ea typeface="+mn-ea"/>
+                <a:cs typeface="+mn-cs"/>
+              </a:defRPr>
+            </a:lvl1pPr>
+            <a:lvl2pPr marL="685800" indent="-228600" algn="l" defTabSz="914400" rtl="0" eaLnBrk="1" latinLnBrk="0" hangingPunct="1">
+              <a:lnSpc>
+                <a:spcPct val="90000"/>
+              </a:lnSpc>
+              <a:spcBef>
+                <a:spcPts val="500"/>
+              </a:spcBef>
+              <a:buFont typeface="Arial" panose="020B0604020202020204" pitchFamily="34" charset="0"/>
+              <a:buChar char="•"/>
+              <a:defRPr sz="2400" kern="1200">
+                <a:solidFill>
+                  <a:schemeClr val="tx1"/>
+                </a:solidFill>
+                <a:latin typeface="+mn-lt"/>
+                <a:ea typeface="+mn-ea"/>
+                <a:cs typeface="+mn-cs"/>
+              </a:defRPr>
+            </a:lvl2pPr>
+            <a:lvl3pPr marL="1143000" indent="-228600" algn="l" defTabSz="914400" rtl="0" eaLnBrk="1" latinLnBrk="0" hangingPunct="1">
+              <a:lnSpc>
+                <a:spcPct val="90000"/>
+              </a:lnSpc>
+              <a:spcBef>
+                <a:spcPts val="500"/>
+              </a:spcBef>
+              <a:buFont typeface="Arial" panose="020B0604020202020204" pitchFamily="34" charset="0"/>
+              <a:buChar char="•"/>
+              <a:defRPr sz="2000" kern="1200">
+                <a:solidFill>
+                  <a:schemeClr val="tx1"/>
+                </a:solidFill>
+                <a:latin typeface="+mn-lt"/>
+                <a:ea typeface="+mn-ea"/>
+                <a:cs typeface="+mn-cs"/>
+              </a:defRPr>
+            </a:lvl3pPr>
+            <a:lvl4pPr marL="1600200" indent="-228600" algn="l" defTabSz="914400" rtl="0" eaLnBrk="1" latinLnBrk="0" hangingPunct="1">
+              <a:lnSpc>
+                <a:spcPct val="90000"/>
+              </a:lnSpc>
+              <a:spcBef>
+                <a:spcPts val="500"/>
+              </a:spcBef>
+              <a:buFont typeface="Arial" panose="020B0604020202020204" pitchFamily="34" charset="0"/>
+              <a:buChar char="•"/>
+              <a:defRPr sz="1800" kern="1200">
+                <a:solidFill>
+                  <a:schemeClr val="tx1"/>
+                </a:solidFill>
+                <a:latin typeface="+mn-lt"/>
+                <a:ea typeface="+mn-ea"/>
+                <a:cs typeface="+mn-cs"/>
+              </a:defRPr>
+            </a:lvl4pPr>
+            <a:lvl5pPr marL="2057400" indent="-228600" algn="l" defTabSz="914400" rtl="0" eaLnBrk="1" latinLnBrk="0" hangingPunct="1">
+              <a:lnSpc>
+                <a:spcPct val="90000"/>
+              </a:lnSpc>
+              <a:spcBef>
+                <a:spcPts val="500"/>
+              </a:spcBef>
+              <a:buFont typeface="Arial" panose="020B0604020202020204" pitchFamily="34" charset="0"/>
+              <a:buChar char="•"/>
+              <a:defRPr sz="1800" kern="1200">
+                <a:solidFill>
+                  <a:schemeClr val="tx1"/>
+                </a:solidFill>
+                <a:latin typeface="+mn-lt"/>
+                <a:ea typeface="+mn-ea"/>
+                <a:cs typeface="+mn-cs"/>
+              </a:defRPr>
+            </a:lvl5pPr>
+            <a:lvl6pPr marL="2514600" indent="-228600" algn="l" defTabSz="914400" rtl="0" eaLnBrk="1" latinLnBrk="0" hangingPunct="1">
+              <a:lnSpc>
+                <a:spcPct val="90000"/>
+              </a:lnSpc>
+              <a:spcBef>
+                <a:spcPts val="500"/>
+              </a:spcBef>
+              <a:buFont typeface="Arial" panose="020B0604020202020204" pitchFamily="34" charset="0"/>
+              <a:buChar char="•"/>
+              <a:defRPr sz="1800" kern="1200">
+                <a:solidFill>
+                  <a:schemeClr val="tx1"/>
+                </a:solidFill>
+                <a:latin typeface="+mn-lt"/>
+                <a:ea typeface="+mn-ea"/>
+                <a:cs typeface="+mn-cs"/>
+              </a:defRPr>
+            </a:lvl6pPr>
+            <a:lvl7pPr marL="2971800" indent="-228600" algn="l" defTabSz="914400" rtl="0" eaLnBrk="1" latinLnBrk="0" hangingPunct="1">
+              <a:lnSpc>
+                <a:spcPct val="90000"/>
+              </a:lnSpc>
+              <a:spcBef>
+                <a:spcPts val="500"/>
+              </a:spcBef>
+              <a:buFont typeface="Arial" panose="020B0604020202020204" pitchFamily="34" charset="0"/>
+              <a:buChar char="•"/>
+              <a:defRPr sz="1800" kern="1200">
+                <a:solidFill>
+                  <a:schemeClr val="tx1"/>
+                </a:solidFill>
+                <a:latin typeface="+mn-lt"/>
+                <a:ea typeface="+mn-ea"/>
+                <a:cs typeface="+mn-cs"/>
+              </a:defRPr>
+            </a:lvl7pPr>
+            <a:lvl8pPr marL="3429000" indent="-228600" algn="l" defTabSz="914400" rtl="0" eaLnBrk="1" latinLnBrk="0" hangingPunct="1">
+              <a:lnSpc>
+                <a:spcPct val="90000"/>
+              </a:lnSpc>
+              <a:spcBef>
+                <a:spcPts val="500"/>
+              </a:spcBef>
+              <a:buFont typeface="Arial" panose="020B0604020202020204" pitchFamily="34" charset="0"/>
+              <a:buChar char="•"/>
+              <a:defRPr sz="1800" kern="1200">
+                <a:solidFill>
+                  <a:schemeClr val="tx1"/>
+                </a:solidFill>
+                <a:latin typeface="+mn-lt"/>
+                <a:ea typeface="+mn-ea"/>
+                <a:cs typeface="+mn-cs"/>
+              </a:defRPr>
+            </a:lvl8pPr>
+            <a:lvl9pPr marL="3886200" indent="-228600" algn="l" defTabSz="914400" rtl="0" eaLnBrk="1" latinLnBrk="0" hangingPunct="1">
+              <a:lnSpc>
+                <a:spcPct val="90000"/>
+              </a:lnSpc>
+              <a:spcBef>
+                <a:spcPts val="500"/>
+              </a:spcBef>
+              <a:buFont typeface="Arial" panose="020B0604020202020204" pitchFamily="34" charset="0"/>
+              <a:buChar char="•"/>
+              <a:defRPr sz="1800" kern="1200">
+                <a:solidFill>
+                  <a:schemeClr val="tx1"/>
+                </a:solidFill>
+                <a:latin typeface="+mn-lt"/>
+                <a:ea typeface="+mn-ea"/>
+                <a:cs typeface="+mn-cs"/>
+              </a:defRPr>
+            </a:lvl9pPr>
+          </a:lstStyle>
+          <a:p>
+            <a:pPr marL="0" indent="0" algn="ctr">
+              <a:spcBef>
+                <a:spcPct val="0"/>
+              </a:spcBef>
+              <a:spcAft>
+                <a:spcPct val="0"/>
+              </a:spcAft>
+              <a:buNone/>
+            </a:pPr>
+            <a:fld id="{DCE7AF03-DA7E-4BE6-81D2-EE2DA761436B}" type="datetime'''''''''''''''''1''.''''''''''''''''''''5''''''''''''''%'''''">
+              <a:rPr lang="en-US" altLang="en-US" sz="1400" smtClean="0">
+                <a:solidFill>
+                  <a:schemeClr val="bg1"/>
+                </a:solidFill>
+                <a:effectLst/>
+              </a:rPr>
+              <a:pPr marL="0" indent="0" algn="ctr">
+                <a:spcBef>
+                  <a:spcPct val="0"/>
+                </a:spcBef>
+                <a:spcAft>
+                  <a:spcPct val="0"/>
+                </a:spcAft>
+                <a:buNone/>
+              </a:pPr>
+              <a:t>1.5%</a:t>
+            </a:fld>
+            <a:endParaRPr lang="en-US" sz="1400" dirty="0">
+              <a:solidFill>
+                <a:schemeClr val="bg1"/>
+              </a:solidFill>
+            </a:endParaRPr>
+          </a:p>
+        </p:txBody>
+      </p:sp>
+      <p:sp>
+        <p:nvSpPr>
           <p:cNvPr id="457" name="Text Placeholder 2">
             <a:extLst>
               <a:ext uri="{FF2B5EF4-FFF2-40B4-BE49-F238E27FC236}">
@@ -4649,7 +5471,7 @@
           </p:cNvSpPr>
           <p:nvPr>
             <p:custDataLst>
-              <p:tags r:id="rId3"/>
+              <p:tags r:id="rId4"/>
             </p:custDataLst>
           </p:nvPr>
         </p:nvSpPr>
@@ -4863,244 +5685,6 @@
               <a:t>1.4%</a:t>
             </a:fld>
             <a:endParaRPr lang="en-US" sz="1400" dirty="0"/>
-          </a:p>
-        </p:txBody>
-      </p:sp>
-      <p:sp>
-        <p:nvSpPr>
-          <p:cNvPr id="461" name="Text Placeholder 2">
-            <a:extLst>
-              <a:ext uri="{FF2B5EF4-FFF2-40B4-BE49-F238E27FC236}">
-                <a16:creationId xmlns:a16="http://schemas.microsoft.com/office/drawing/2014/main" id="{F01B8698-9294-F532-DDB4-2EE198CBAA21}"/>
-              </a:ext>
-            </a:extLst>
-          </p:cNvPr>
-          <p:cNvSpPr>
-            <a:spLocks noGrp="1"/>
-          </p:cNvSpPr>
-          <p:nvPr>
-            <p:custDataLst>
-              <p:tags r:id="rId4"/>
-            </p:custDataLst>
-          </p:nvPr>
-        </p:nvSpPr>
-        <p:spPr bwMode="gray">
-          <a:xfrm>
-            <a:off x="1585913" y="2109788"/>
-            <a:ext cx="403225" cy="192088"/>
-          </a:xfrm>
-          <a:prstGeom prst="rect">
-            <a:avLst/>
-          </a:prstGeom>
-          <a:solidFill>
-            <a:schemeClr val="accent6"/>
-          </a:solidFill>
-          <a:ln>
-            <a:noFill/>
-          </a:ln>
-          <a:effectLst/>
-        </p:spPr>
-        <p:txBody>
-          <a:bodyPr vert="horz" wrap="none" lIns="25400" tIns="0" rIns="25400" bIns="0" numCol="1" spcCol="0" rtlCol="0" anchor="ctr" anchorCtr="0">
-            <a:noAutofit/>
-          </a:bodyPr>
-          <a:lstStyle>
-            <a:lvl1pPr marL="228600" indent="-228600" algn="l" defTabSz="914400" rtl="0" eaLnBrk="1" latinLnBrk="0" hangingPunct="1">
-              <a:lnSpc>
-                <a:spcPct val="90000"/>
-              </a:lnSpc>
-              <a:spcBef>
-                <a:spcPts val="1000"/>
-              </a:spcBef>
-              <a:buFont typeface="Arial" panose="020B0604020202020204" pitchFamily="34" charset="0"/>
-              <a:buChar char="•"/>
-              <a:defRPr sz="2800" kern="1200">
-                <a:solidFill>
-                  <a:schemeClr val="tx1"/>
-                </a:solidFill>
-                <a:latin typeface="+mn-lt"/>
-                <a:ea typeface="+mn-ea"/>
-                <a:cs typeface="+mn-cs"/>
-              </a:defRPr>
-            </a:lvl1pPr>
-            <a:lvl2pPr marL="685800" indent="-228600" algn="l" defTabSz="914400" rtl="0" eaLnBrk="1" latinLnBrk="0" hangingPunct="1">
-              <a:lnSpc>
-                <a:spcPct val="90000"/>
-              </a:lnSpc>
-              <a:spcBef>
-                <a:spcPts val="500"/>
-              </a:spcBef>
-              <a:buFont typeface="Arial" panose="020B0604020202020204" pitchFamily="34" charset="0"/>
-              <a:buChar char="•"/>
-              <a:defRPr sz="2400" kern="1200">
-                <a:solidFill>
-                  <a:schemeClr val="tx1"/>
-                </a:solidFill>
-                <a:latin typeface="+mn-lt"/>
-                <a:ea typeface="+mn-ea"/>
-                <a:cs typeface="+mn-cs"/>
-              </a:defRPr>
-            </a:lvl2pPr>
-            <a:lvl3pPr marL="1143000" indent="-228600" algn="l" defTabSz="914400" rtl="0" eaLnBrk="1" latinLnBrk="0" hangingPunct="1">
-              <a:lnSpc>
-                <a:spcPct val="90000"/>
-              </a:lnSpc>
-              <a:spcBef>
-                <a:spcPts val="500"/>
-              </a:spcBef>
-              <a:buFont typeface="Arial" panose="020B0604020202020204" pitchFamily="34" charset="0"/>
-              <a:buChar char="•"/>
-              <a:defRPr sz="2000" kern="1200">
-                <a:solidFill>
-                  <a:schemeClr val="tx1"/>
-                </a:solidFill>
-                <a:latin typeface="+mn-lt"/>
-                <a:ea typeface="+mn-ea"/>
-                <a:cs typeface="+mn-cs"/>
-              </a:defRPr>
-            </a:lvl3pPr>
-            <a:lvl4pPr marL="1600200" indent="-228600" algn="l" defTabSz="914400" rtl="0" eaLnBrk="1" latinLnBrk="0" hangingPunct="1">
-              <a:lnSpc>
-                <a:spcPct val="90000"/>
-              </a:lnSpc>
-              <a:spcBef>
-                <a:spcPts val="500"/>
-              </a:spcBef>
-              <a:buFont typeface="Arial" panose="020B0604020202020204" pitchFamily="34" charset="0"/>
-              <a:buChar char="•"/>
-              <a:defRPr sz="1800" kern="1200">
-                <a:solidFill>
-                  <a:schemeClr val="tx1"/>
-                </a:solidFill>
-                <a:latin typeface="+mn-lt"/>
-                <a:ea typeface="+mn-ea"/>
-                <a:cs typeface="+mn-cs"/>
-              </a:defRPr>
-            </a:lvl4pPr>
-            <a:lvl5pPr marL="2057400" indent="-228600" algn="l" defTabSz="914400" rtl="0" eaLnBrk="1" latinLnBrk="0" hangingPunct="1">
-              <a:lnSpc>
-                <a:spcPct val="90000"/>
-              </a:lnSpc>
-              <a:spcBef>
-                <a:spcPts val="500"/>
-              </a:spcBef>
-              <a:buFont typeface="Arial" panose="020B0604020202020204" pitchFamily="34" charset="0"/>
-              <a:buChar char="•"/>
-              <a:defRPr sz="1800" kern="1200">
-                <a:solidFill>
-                  <a:schemeClr val="tx1"/>
-                </a:solidFill>
-                <a:latin typeface="+mn-lt"/>
-                <a:ea typeface="+mn-ea"/>
-                <a:cs typeface="+mn-cs"/>
-              </a:defRPr>
-            </a:lvl5pPr>
-            <a:lvl6pPr marL="2514600" indent="-228600" algn="l" defTabSz="914400" rtl="0" eaLnBrk="1" latinLnBrk="0" hangingPunct="1">
-              <a:lnSpc>
-                <a:spcPct val="90000"/>
-              </a:lnSpc>
-              <a:spcBef>
-                <a:spcPts val="500"/>
-              </a:spcBef>
-              <a:buFont typeface="Arial" panose="020B0604020202020204" pitchFamily="34" charset="0"/>
-              <a:buChar char="•"/>
-              <a:defRPr sz="1800" kern="1200">
-                <a:solidFill>
-                  <a:schemeClr val="tx1"/>
-                </a:solidFill>
-                <a:latin typeface="+mn-lt"/>
-                <a:ea typeface="+mn-ea"/>
-                <a:cs typeface="+mn-cs"/>
-              </a:defRPr>
-            </a:lvl6pPr>
-            <a:lvl7pPr marL="2971800" indent="-228600" algn="l" defTabSz="914400" rtl="0" eaLnBrk="1" latinLnBrk="0" hangingPunct="1">
-              <a:lnSpc>
-                <a:spcPct val="90000"/>
-              </a:lnSpc>
-              <a:spcBef>
-                <a:spcPts val="500"/>
-              </a:spcBef>
-              <a:buFont typeface="Arial" panose="020B0604020202020204" pitchFamily="34" charset="0"/>
-              <a:buChar char="•"/>
-              <a:defRPr sz="1800" kern="1200">
-                <a:solidFill>
-                  <a:schemeClr val="tx1"/>
-                </a:solidFill>
-                <a:latin typeface="+mn-lt"/>
-                <a:ea typeface="+mn-ea"/>
-                <a:cs typeface="+mn-cs"/>
-              </a:defRPr>
-            </a:lvl7pPr>
-            <a:lvl8pPr marL="3429000" indent="-228600" algn="l" defTabSz="914400" rtl="0" eaLnBrk="1" latinLnBrk="0" hangingPunct="1">
-              <a:lnSpc>
-                <a:spcPct val="90000"/>
-              </a:lnSpc>
-              <a:spcBef>
-                <a:spcPts val="500"/>
-              </a:spcBef>
-              <a:buFont typeface="Arial" panose="020B0604020202020204" pitchFamily="34" charset="0"/>
-              <a:buChar char="•"/>
-              <a:defRPr sz="1800" kern="1200">
-                <a:solidFill>
-                  <a:schemeClr val="tx1"/>
-                </a:solidFill>
-                <a:latin typeface="+mn-lt"/>
-                <a:ea typeface="+mn-ea"/>
-                <a:cs typeface="+mn-cs"/>
-              </a:defRPr>
-            </a:lvl8pPr>
-            <a:lvl9pPr marL="3886200" indent="-228600" algn="l" defTabSz="914400" rtl="0" eaLnBrk="1" latinLnBrk="0" hangingPunct="1">
-              <a:lnSpc>
-                <a:spcPct val="90000"/>
-              </a:lnSpc>
-              <a:spcBef>
-                <a:spcPts val="500"/>
-              </a:spcBef>
-              <a:buFont typeface="Arial" panose="020B0604020202020204" pitchFamily="34" charset="0"/>
-              <a:buChar char="•"/>
-              <a:defRPr sz="1800" kern="1200">
-                <a:solidFill>
-                  <a:schemeClr val="tx1"/>
-                </a:solidFill>
-                <a:latin typeface="+mn-lt"/>
-                <a:ea typeface="+mn-ea"/>
-                <a:cs typeface="+mn-cs"/>
-              </a:defRPr>
-            </a:lvl9pPr>
-          </a:lstStyle>
-          <a:p>
-            <a:pPr marL="0" indent="0" algn="ctr">
-              <a:spcBef>
-                <a:spcPct val="0"/>
-              </a:spcBef>
-              <a:spcAft>
-                <a:spcPct val="0"/>
-              </a:spcAft>
-              <a:buNone/>
-            </a:pPr>
-            <a:fld id="{DCE7AF03-DA7E-4BE6-81D2-EE2DA761436B}" type="datetime'''''''''''''''''1''.''''''''''''''''''''5''''''''''''''%'''''">
-              <a:rPr lang="en-US" altLang="en-US" sz="1400" smtClean="0">
-                <a:solidFill>
-                  <a:schemeClr val="bg1"/>
-                </a:solidFill>
-                <a:effectLst/>
-              </a:rPr>
-              <a:pPr marL="0" indent="0" algn="ctr">
-                <a:spcBef>
-                  <a:spcPct val="0"/>
-                </a:spcBef>
-                <a:spcAft>
-                  <a:spcPct val="0"/>
-                </a:spcAft>
-                <a:buNone/>
-              </a:pPr>
-              <a:t>1.5%</a:t>
-            </a:fld>
-            <a:endParaRPr lang="en-US" sz="1400" dirty="0">
-              <a:solidFill>
-                <a:schemeClr val="bg1"/>
-              </a:solidFill>
-            </a:endParaRPr>
           </a:p>
         </p:txBody>
       </p:sp>
@@ -6034,10 +6618,10 @@
       </p:sp>
       <p:sp>
         <p:nvSpPr>
-          <p:cNvPr id="211" name="Rectangle 210">
+          <p:cNvPr id="212" name="Rectangle 211">
             <a:extLst>
               <a:ext uri="{FF2B5EF4-FFF2-40B4-BE49-F238E27FC236}">
-                <a16:creationId xmlns:a16="http://schemas.microsoft.com/office/drawing/2014/main" id="{ACB5FA66-420A-A81B-9515-200E417A7614}"/>
+                <a16:creationId xmlns:a16="http://schemas.microsoft.com/office/drawing/2014/main" id="{CFE16A47-45D9-1330-227A-6FA04AF148BD}"/>
               </a:ext>
             </a:extLst>
           </p:cNvPr>
@@ -6050,14 +6634,14 @@
         </p:nvSpPr>
         <p:spPr bwMode="auto">
           <a:xfrm>
-            <a:off x="3721100" y="1906588"/>
+            <a:off x="3721100" y="2160588"/>
             <a:ext cx="250825" cy="187325"/>
           </a:xfrm>
           <a:prstGeom prst="rect">
             <a:avLst/>
           </a:prstGeom>
           <a:solidFill>
-            <a:schemeClr val="accent4"/>
+            <a:schemeClr val="accent3"/>
           </a:solidFill>
           <a:ln w="12700" cap="flat" cmpd="sng" algn="ctr">
             <a:noFill/>
@@ -6186,82 +6770,6 @@
       </p:sp>
       <p:sp>
         <p:nvSpPr>
-          <p:cNvPr id="212" name="Rectangle 211">
-            <a:extLst>
-              <a:ext uri="{FF2B5EF4-FFF2-40B4-BE49-F238E27FC236}">
-                <a16:creationId xmlns:a16="http://schemas.microsoft.com/office/drawing/2014/main" id="{CFE16A47-45D9-1330-227A-6FA04AF148BD}"/>
-              </a:ext>
-            </a:extLst>
-          </p:cNvPr>
-          <p:cNvSpPr/>
-          <p:nvPr>
-            <p:custDataLst>
-              <p:tags r:id="rId11"/>
-            </p:custDataLst>
-          </p:nvPr>
-        </p:nvSpPr>
-        <p:spPr bwMode="auto">
-          <a:xfrm>
-            <a:off x="3721100" y="2160588"/>
-            <a:ext cx="250825" cy="187325"/>
-          </a:xfrm>
-          <a:prstGeom prst="rect">
-            <a:avLst/>
-          </a:prstGeom>
-          <a:solidFill>
-            <a:schemeClr val="accent3"/>
-          </a:solidFill>
-          <a:ln w="12700" cap="flat" cmpd="sng" algn="ctr">
-            <a:noFill/>
-            <a:prstDash val="solid"/>
-            <a:miter lim="800000"/>
-            <a:headEnd type="none" w="med" len="med"/>
-            <a:tailEnd type="none" w="med" len="med"/>
-          </a:ln>
-          <a:effectLst/>
-          <a:extLst>
-            <a:ext uri="{91240B29-F687-4F45-9708-019B960494DF}">
-              <a14:hiddenLine xmlns:a14="http://schemas.microsoft.com/office/drawing/2010/main" w="12700" cap="flat" cmpd="sng" algn="ctr">
-                <a:solidFill>
-                  <a:schemeClr val="accent1">
-                    <a:shade val="50000"/>
-                  </a:schemeClr>
-                </a:solidFill>
-                <a:prstDash val="solid"/>
-                <a:miter lim="800000"/>
-                <a:headEnd type="none" w="med" len="med"/>
-                <a:tailEnd type="none" w="med" len="med"/>
-              </a14:hiddenLine>
-            </a:ext>
-          </a:extLst>
-        </p:spPr>
-        <p:style>
-          <a:lnRef idx="2">
-            <a:schemeClr val="accent1">
-              <a:shade val="50000"/>
-            </a:schemeClr>
-          </a:lnRef>
-          <a:fillRef idx="1">
-            <a:schemeClr val="accent1"/>
-          </a:fillRef>
-          <a:effectRef idx="0">
-            <a:schemeClr val="accent1"/>
-          </a:effectRef>
-          <a:fontRef idx="minor">
-            <a:schemeClr val="lt1"/>
-          </a:fontRef>
-        </p:style>
-        <p:txBody>
-          <a:bodyPr rtlCol="0" anchor="ctr"/>
-          <a:lstStyle/>
-          <a:p>
-            <a:pPr algn="ctr"/>
-            <a:endParaRPr lang="en-US"/>
-          </a:p>
-        </p:txBody>
-      </p:sp>
-      <p:sp>
-        <p:nvSpPr>
           <p:cNvPr id="210" name="Rectangle 209">
             <a:extLst>
               <a:ext uri="{FF2B5EF4-FFF2-40B4-BE49-F238E27FC236}">
@@ -6272,7 +6780,7 @@
           <p:cNvSpPr/>
           <p:nvPr>
             <p:custDataLst>
-              <p:tags r:id="rId12"/>
+              <p:tags r:id="rId11"/>
             </p:custDataLst>
           </p:nvPr>
         </p:nvSpPr>
@@ -6323,6 +6831,82 @@
       </p:sp>
       <p:sp>
         <p:nvSpPr>
+          <p:cNvPr id="211" name="Rectangle 210">
+            <a:extLst>
+              <a:ext uri="{FF2B5EF4-FFF2-40B4-BE49-F238E27FC236}">
+                <a16:creationId xmlns:a16="http://schemas.microsoft.com/office/drawing/2014/main" id="{ACB5FA66-420A-A81B-9515-200E417A7614}"/>
+              </a:ext>
+            </a:extLst>
+          </p:cNvPr>
+          <p:cNvSpPr/>
+          <p:nvPr>
+            <p:custDataLst>
+              <p:tags r:id="rId12"/>
+            </p:custDataLst>
+          </p:nvPr>
+        </p:nvSpPr>
+        <p:spPr bwMode="auto">
+          <a:xfrm>
+            <a:off x="3721100" y="1906588"/>
+            <a:ext cx="250825" cy="187325"/>
+          </a:xfrm>
+          <a:prstGeom prst="rect">
+            <a:avLst/>
+          </a:prstGeom>
+          <a:solidFill>
+            <a:schemeClr val="accent4"/>
+          </a:solidFill>
+          <a:ln w="12700" cap="flat" cmpd="sng" algn="ctr">
+            <a:noFill/>
+            <a:prstDash val="solid"/>
+            <a:miter lim="800000"/>
+            <a:headEnd type="none" w="med" len="med"/>
+            <a:tailEnd type="none" w="med" len="med"/>
+          </a:ln>
+          <a:effectLst/>
+          <a:extLst>
+            <a:ext uri="{91240B29-F687-4F45-9708-019B960494DF}">
+              <a14:hiddenLine xmlns:a14="http://schemas.microsoft.com/office/drawing/2010/main" w="12700" cap="flat" cmpd="sng" algn="ctr">
+                <a:solidFill>
+                  <a:schemeClr val="accent1">
+                    <a:shade val="50000"/>
+                  </a:schemeClr>
+                </a:solidFill>
+                <a:prstDash val="solid"/>
+                <a:miter lim="800000"/>
+                <a:headEnd type="none" w="med" len="med"/>
+                <a:tailEnd type="none" w="med" len="med"/>
+              </a14:hiddenLine>
+            </a:ext>
+          </a:extLst>
+        </p:spPr>
+        <p:style>
+          <a:lnRef idx="2">
+            <a:schemeClr val="accent1">
+              <a:shade val="50000"/>
+            </a:schemeClr>
+          </a:lnRef>
+          <a:fillRef idx="1">
+            <a:schemeClr val="accent1"/>
+          </a:fillRef>
+          <a:effectRef idx="0">
+            <a:schemeClr val="accent1"/>
+          </a:effectRef>
+          <a:fontRef idx="minor">
+            <a:schemeClr val="lt1"/>
+          </a:fontRef>
+        </p:style>
+        <p:txBody>
+          <a:bodyPr rtlCol="0" anchor="ctr"/>
+          <a:lstStyle/>
+          <a:p>
+            <a:pPr algn="ctr"/>
+            <a:endParaRPr lang="en-US"/>
+          </a:p>
+        </p:txBody>
+      </p:sp>
+      <p:sp>
+        <p:nvSpPr>
           <p:cNvPr id="213" name="Rectangle 212">
             <a:extLst>
               <a:ext uri="{FF2B5EF4-FFF2-40B4-BE49-F238E27FC236}">
@@ -6475,10 +7059,10 @@
       </p:sp>
       <p:sp>
         <p:nvSpPr>
-          <p:cNvPr id="169" name="Text Placeholder 2">
+          <p:cNvPr id="191" name="Text Placeholder 2">
             <a:extLst>
               <a:ext uri="{FF2B5EF4-FFF2-40B4-BE49-F238E27FC236}">
-                <a16:creationId xmlns:a16="http://schemas.microsoft.com/office/drawing/2014/main" id="{F01B8698-9294-F532-DDB4-2EE198CBAA21}"/>
+                <a16:creationId xmlns:a16="http://schemas.microsoft.com/office/drawing/2014/main" id="{35BF6085-E56A-8D0E-9B3C-4692F351187A}"/>
               </a:ext>
             </a:extLst>
           </p:cNvPr>
@@ -6493,8 +7077,8 @@
         </p:nvSpPr>
         <p:spPr bwMode="auto">
           <a:xfrm>
-            <a:off x="4022725" y="1917700"/>
-            <a:ext cx="1270000" cy="192088"/>
+            <a:off x="4022725" y="2679700"/>
+            <a:ext cx="2392363" cy="192088"/>
           </a:xfrm>
           <a:prstGeom prst="rect">
             <a:avLst/>
@@ -6692,10 +7276,10 @@
               </a:spcAft>
               <a:buNone/>
             </a:pPr>
-            <a:fld id="{D9CD9367-4C90-4362-9C02-23DADA762573}" type="datetime'Fo''''l''g''e''''r''''s'''' ='' ''$1''''''''''''8'',9''00'">
+            <a:fld id="{BF842435-0263-4D0F-B81A-B2CC55BFBE9E}" type="datetime'''''All'' ''''Ot''her Brand''s = ''''$''1'',20''''2'',629.10'">
               <a:rPr lang="en-US" altLang="en-US" sz="1400" smtClean="0"/>
               <a:pPr/>
-              <a:t>Folgers = $18,900</a:t>
+              <a:t>All Other Brands = $1,202,629.10</a:t>
             </a:fld>
             <a:endParaRPr lang="en-US" sz="1400" dirty="0"/>
           </a:p>
@@ -6931,10 +7515,10 @@
       </p:sp>
       <p:sp>
         <p:nvSpPr>
-          <p:cNvPr id="191" name="Text Placeholder 2">
+          <p:cNvPr id="168" name="Text Placeholder 2">
             <a:extLst>
               <a:ext uri="{FF2B5EF4-FFF2-40B4-BE49-F238E27FC236}">
-                <a16:creationId xmlns:a16="http://schemas.microsoft.com/office/drawing/2014/main" id="{35BF6085-E56A-8D0E-9B3C-4692F351187A}"/>
+                <a16:creationId xmlns:a16="http://schemas.microsoft.com/office/drawing/2014/main" id="{F01B8698-9294-F532-DDB4-2EE198CBAA21}"/>
               </a:ext>
             </a:extLst>
           </p:cNvPr>
@@ -6949,8 +7533,8 @@
         </p:nvSpPr>
         <p:spPr bwMode="auto">
           <a:xfrm>
-            <a:off x="4022725" y="2679700"/>
-            <a:ext cx="2392363" cy="192088"/>
+            <a:off x="4022725" y="1663700"/>
+            <a:ext cx="1362075" cy="192088"/>
           </a:xfrm>
           <a:prstGeom prst="rect">
             <a:avLst/>
@@ -7148,10 +7732,466 @@
               </a:spcAft>
               <a:buNone/>
             </a:pPr>
-            <a:fld id="{BF842435-0263-4D0F-B81A-B2CC55BFBE9E}" type="datetime'''''All'' ''''Ot''her Brand''s = ''''$''1'',20''''2'',629.10'">
+            <a:fld id="{D28F3D5C-6800-4691-A322-E713C2DC232D}" type="datetime'Pep''''''si'' ''''''''''''''= $1''''''9'',''''3''''90''.''60'">
               <a:rPr lang="en-US" altLang="en-US" sz="1400" smtClean="0"/>
               <a:pPr/>
-              <a:t>All Other Brands = $1,202,629.10</a:t>
+              <a:t>Pepsi = $19,390.60</a:t>
+            </a:fld>
+            <a:endParaRPr lang="en-US" sz="1400" dirty="0"/>
+          </a:p>
+        </p:txBody>
+      </p:sp>
+      <p:sp>
+        <p:nvSpPr>
+          <p:cNvPr id="189" name="Text Placeholder 2">
+            <a:extLst>
+              <a:ext uri="{FF2B5EF4-FFF2-40B4-BE49-F238E27FC236}">
+                <a16:creationId xmlns:a16="http://schemas.microsoft.com/office/drawing/2014/main" id="{35BB811B-08DE-AB67-F9FD-C573E1C72AC3}"/>
+              </a:ext>
+            </a:extLst>
+          </p:cNvPr>
+          <p:cNvSpPr>
+            <a:spLocks noGrp="1"/>
+          </p:cNvSpPr>
+          <p:nvPr>
+            <p:custDataLst>
+              <p:tags r:id="rId18"/>
+            </p:custDataLst>
+          </p:nvPr>
+        </p:nvSpPr>
+        <p:spPr bwMode="auto">
+          <a:xfrm>
+            <a:off x="4022725" y="2171700"/>
+            <a:ext cx="1616075" cy="192088"/>
+          </a:xfrm>
+          <a:prstGeom prst="rect">
+            <a:avLst/>
+          </a:prstGeom>
+          <a:noFill/>
+          <a:ln>
+            <a:noFill/>
+          </a:ln>
+          <a:effectLst/>
+          <a:extLst>
+            <a:ext uri="{909E8E84-426E-40DD-AFC4-6F175D3DCCD1}">
+              <a14:hiddenFill xmlns:a14="http://schemas.microsoft.com/office/drawing/2010/main">
+                <a:solidFill>
+                  <a:schemeClr val="accent1"/>
+                </a:solidFill>
+              </a14:hiddenFill>
+            </a:ext>
+          </a:extLst>
+        </p:spPr>
+        <p:txBody>
+          <a:bodyPr vert="horz" wrap="none" lIns="0" tIns="0" rIns="0" bIns="0" numCol="1" spcCol="0" rtlCol="0" anchor="ctr" anchorCtr="0">
+            <a:noAutofit/>
+          </a:bodyPr>
+          <a:lstStyle>
+            <a:lvl1pPr marL="228600" indent="-228600" algn="l" defTabSz="914400" rtl="0" eaLnBrk="1" latinLnBrk="0" hangingPunct="1">
+              <a:lnSpc>
+                <a:spcPct val="90000"/>
+              </a:lnSpc>
+              <a:spcBef>
+                <a:spcPts val="1000"/>
+              </a:spcBef>
+              <a:buFont typeface="Arial" panose="020B0604020202020204" pitchFamily="34" charset="0"/>
+              <a:buChar char="•"/>
+              <a:defRPr sz="2800" kern="1200">
+                <a:solidFill>
+                  <a:schemeClr val="tx1"/>
+                </a:solidFill>
+                <a:latin typeface="+mn-lt"/>
+                <a:ea typeface="+mn-ea"/>
+                <a:cs typeface="+mn-cs"/>
+              </a:defRPr>
+            </a:lvl1pPr>
+            <a:lvl2pPr marL="685800" indent="-228600" algn="l" defTabSz="914400" rtl="0" eaLnBrk="1" latinLnBrk="0" hangingPunct="1">
+              <a:lnSpc>
+                <a:spcPct val="90000"/>
+              </a:lnSpc>
+              <a:spcBef>
+                <a:spcPts val="500"/>
+              </a:spcBef>
+              <a:buFont typeface="Arial" panose="020B0604020202020204" pitchFamily="34" charset="0"/>
+              <a:buChar char="•"/>
+              <a:defRPr sz="2400" kern="1200">
+                <a:solidFill>
+                  <a:schemeClr val="tx1"/>
+                </a:solidFill>
+                <a:latin typeface="+mn-lt"/>
+                <a:ea typeface="+mn-ea"/>
+                <a:cs typeface="+mn-cs"/>
+              </a:defRPr>
+            </a:lvl2pPr>
+            <a:lvl3pPr marL="1143000" indent="-228600" algn="l" defTabSz="914400" rtl="0" eaLnBrk="1" latinLnBrk="0" hangingPunct="1">
+              <a:lnSpc>
+                <a:spcPct val="90000"/>
+              </a:lnSpc>
+              <a:spcBef>
+                <a:spcPts val="500"/>
+              </a:spcBef>
+              <a:buFont typeface="Arial" panose="020B0604020202020204" pitchFamily="34" charset="0"/>
+              <a:buChar char="•"/>
+              <a:defRPr sz="2000" kern="1200">
+                <a:solidFill>
+                  <a:schemeClr val="tx1"/>
+                </a:solidFill>
+                <a:latin typeface="+mn-lt"/>
+                <a:ea typeface="+mn-ea"/>
+                <a:cs typeface="+mn-cs"/>
+              </a:defRPr>
+            </a:lvl3pPr>
+            <a:lvl4pPr marL="1600200" indent="-228600" algn="l" defTabSz="914400" rtl="0" eaLnBrk="1" latinLnBrk="0" hangingPunct="1">
+              <a:lnSpc>
+                <a:spcPct val="90000"/>
+              </a:lnSpc>
+              <a:spcBef>
+                <a:spcPts val="500"/>
+              </a:spcBef>
+              <a:buFont typeface="Arial" panose="020B0604020202020204" pitchFamily="34" charset="0"/>
+              <a:buChar char="•"/>
+              <a:defRPr sz="1800" kern="1200">
+                <a:solidFill>
+                  <a:schemeClr val="tx1"/>
+                </a:solidFill>
+                <a:latin typeface="+mn-lt"/>
+                <a:ea typeface="+mn-ea"/>
+                <a:cs typeface="+mn-cs"/>
+              </a:defRPr>
+            </a:lvl4pPr>
+            <a:lvl5pPr marL="2057400" indent="-228600" algn="l" defTabSz="914400" rtl="0" eaLnBrk="1" latinLnBrk="0" hangingPunct="1">
+              <a:lnSpc>
+                <a:spcPct val="90000"/>
+              </a:lnSpc>
+              <a:spcBef>
+                <a:spcPts val="500"/>
+              </a:spcBef>
+              <a:buFont typeface="Arial" panose="020B0604020202020204" pitchFamily="34" charset="0"/>
+              <a:buChar char="•"/>
+              <a:defRPr sz="1800" kern="1200">
+                <a:solidFill>
+                  <a:schemeClr val="tx1"/>
+                </a:solidFill>
+                <a:latin typeface="+mn-lt"/>
+                <a:ea typeface="+mn-ea"/>
+                <a:cs typeface="+mn-cs"/>
+              </a:defRPr>
+            </a:lvl5pPr>
+            <a:lvl6pPr marL="2514600" indent="-228600" algn="l" defTabSz="914400" rtl="0" eaLnBrk="1" latinLnBrk="0" hangingPunct="1">
+              <a:lnSpc>
+                <a:spcPct val="90000"/>
+              </a:lnSpc>
+              <a:spcBef>
+                <a:spcPts val="500"/>
+              </a:spcBef>
+              <a:buFont typeface="Arial" panose="020B0604020202020204" pitchFamily="34" charset="0"/>
+              <a:buChar char="•"/>
+              <a:defRPr sz="1800" kern="1200">
+                <a:solidFill>
+                  <a:schemeClr val="tx1"/>
+                </a:solidFill>
+                <a:latin typeface="+mn-lt"/>
+                <a:ea typeface="+mn-ea"/>
+                <a:cs typeface="+mn-cs"/>
+              </a:defRPr>
+            </a:lvl6pPr>
+            <a:lvl7pPr marL="2971800" indent="-228600" algn="l" defTabSz="914400" rtl="0" eaLnBrk="1" latinLnBrk="0" hangingPunct="1">
+              <a:lnSpc>
+                <a:spcPct val="90000"/>
+              </a:lnSpc>
+              <a:spcBef>
+                <a:spcPts val="500"/>
+              </a:spcBef>
+              <a:buFont typeface="Arial" panose="020B0604020202020204" pitchFamily="34" charset="0"/>
+              <a:buChar char="•"/>
+              <a:defRPr sz="1800" kern="1200">
+                <a:solidFill>
+                  <a:schemeClr val="tx1"/>
+                </a:solidFill>
+                <a:latin typeface="+mn-lt"/>
+                <a:ea typeface="+mn-ea"/>
+                <a:cs typeface="+mn-cs"/>
+              </a:defRPr>
+            </a:lvl7pPr>
+            <a:lvl8pPr marL="3429000" indent="-228600" algn="l" defTabSz="914400" rtl="0" eaLnBrk="1" latinLnBrk="0" hangingPunct="1">
+              <a:lnSpc>
+                <a:spcPct val="90000"/>
+              </a:lnSpc>
+              <a:spcBef>
+                <a:spcPts val="500"/>
+              </a:spcBef>
+              <a:buFont typeface="Arial" panose="020B0604020202020204" pitchFamily="34" charset="0"/>
+              <a:buChar char="•"/>
+              <a:defRPr sz="1800" kern="1200">
+                <a:solidFill>
+                  <a:schemeClr val="tx1"/>
+                </a:solidFill>
+                <a:latin typeface="+mn-lt"/>
+                <a:ea typeface="+mn-ea"/>
+                <a:cs typeface="+mn-cs"/>
+              </a:defRPr>
+            </a:lvl8pPr>
+            <a:lvl9pPr marL="3886200" indent="-228600" algn="l" defTabSz="914400" rtl="0" eaLnBrk="1" latinLnBrk="0" hangingPunct="1">
+              <a:lnSpc>
+                <a:spcPct val="90000"/>
+              </a:lnSpc>
+              <a:spcBef>
+                <a:spcPts val="500"/>
+              </a:spcBef>
+              <a:buFont typeface="Arial" panose="020B0604020202020204" pitchFamily="34" charset="0"/>
+              <a:buChar char="•"/>
+              <a:defRPr sz="1800" kern="1200">
+                <a:solidFill>
+                  <a:schemeClr val="tx1"/>
+                </a:solidFill>
+                <a:latin typeface="+mn-lt"/>
+                <a:ea typeface="+mn-ea"/>
+                <a:cs typeface="+mn-cs"/>
+              </a:defRPr>
+            </a:lvl9pPr>
+          </a:lstStyle>
+          <a:p>
+            <a:pPr marL="0" indent="0">
+              <a:spcBef>
+                <a:spcPct val="0"/>
+              </a:spcBef>
+              <a:spcAft>
+                <a:spcPct val="0"/>
+              </a:spcAft>
+              <a:buNone/>
+            </a:pPr>
+            <a:fld id="{D731A5A5-500D-4E77-B48A-60B1DF216EF2}" type="datetime'Ke''l''lo''''''gg''''’s'''' = ''''$18'',5''''''55''''.''40'''">
+              <a:rPr lang="en-US" altLang="en-US" sz="1400" smtClean="0"/>
+              <a:pPr/>
+              <a:t>Kellogg’s = $18,555.40</a:t>
+            </a:fld>
+            <a:endParaRPr lang="en-US" sz="1400" dirty="0"/>
+          </a:p>
+        </p:txBody>
+      </p:sp>
+      <p:sp>
+        <p:nvSpPr>
+          <p:cNvPr id="169" name="Text Placeholder 2">
+            <a:extLst>
+              <a:ext uri="{FF2B5EF4-FFF2-40B4-BE49-F238E27FC236}">
+                <a16:creationId xmlns:a16="http://schemas.microsoft.com/office/drawing/2014/main" id="{F01B8698-9294-F532-DDB4-2EE198CBAA21}"/>
+              </a:ext>
+            </a:extLst>
+          </p:cNvPr>
+          <p:cNvSpPr>
+            <a:spLocks noGrp="1"/>
+          </p:cNvSpPr>
+          <p:nvPr>
+            <p:custDataLst>
+              <p:tags r:id="rId19"/>
+            </p:custDataLst>
+          </p:nvPr>
+        </p:nvSpPr>
+        <p:spPr bwMode="auto">
+          <a:xfrm>
+            <a:off x="4022725" y="1917700"/>
+            <a:ext cx="1270000" cy="192088"/>
+          </a:xfrm>
+          <a:prstGeom prst="rect">
+            <a:avLst/>
+          </a:prstGeom>
+          <a:noFill/>
+          <a:ln>
+            <a:noFill/>
+          </a:ln>
+          <a:effectLst/>
+          <a:extLst>
+            <a:ext uri="{909E8E84-426E-40DD-AFC4-6F175D3DCCD1}">
+              <a14:hiddenFill xmlns:a14="http://schemas.microsoft.com/office/drawing/2010/main">
+                <a:solidFill>
+                  <a:schemeClr val="accent1"/>
+                </a:solidFill>
+              </a14:hiddenFill>
+            </a:ext>
+          </a:extLst>
+        </p:spPr>
+        <p:txBody>
+          <a:bodyPr vert="horz" wrap="none" lIns="0" tIns="0" rIns="0" bIns="0" numCol="1" spcCol="0" rtlCol="0" anchor="ctr" anchorCtr="0">
+            <a:noAutofit/>
+          </a:bodyPr>
+          <a:lstStyle>
+            <a:lvl1pPr marL="228600" indent="-228600" algn="l" defTabSz="914400" rtl="0" eaLnBrk="1" latinLnBrk="0" hangingPunct="1">
+              <a:lnSpc>
+                <a:spcPct val="90000"/>
+              </a:lnSpc>
+              <a:spcBef>
+                <a:spcPts val="1000"/>
+              </a:spcBef>
+              <a:buFont typeface="Arial" panose="020B0604020202020204" pitchFamily="34" charset="0"/>
+              <a:buChar char="•"/>
+              <a:defRPr sz="2800" kern="1200">
+                <a:solidFill>
+                  <a:schemeClr val="tx1"/>
+                </a:solidFill>
+                <a:latin typeface="+mn-lt"/>
+                <a:ea typeface="+mn-ea"/>
+                <a:cs typeface="+mn-cs"/>
+              </a:defRPr>
+            </a:lvl1pPr>
+            <a:lvl2pPr marL="685800" indent="-228600" algn="l" defTabSz="914400" rtl="0" eaLnBrk="1" latinLnBrk="0" hangingPunct="1">
+              <a:lnSpc>
+                <a:spcPct val="90000"/>
+              </a:lnSpc>
+              <a:spcBef>
+                <a:spcPts val="500"/>
+              </a:spcBef>
+              <a:buFont typeface="Arial" panose="020B0604020202020204" pitchFamily="34" charset="0"/>
+              <a:buChar char="•"/>
+              <a:defRPr sz="2400" kern="1200">
+                <a:solidFill>
+                  <a:schemeClr val="tx1"/>
+                </a:solidFill>
+                <a:latin typeface="+mn-lt"/>
+                <a:ea typeface="+mn-ea"/>
+                <a:cs typeface="+mn-cs"/>
+              </a:defRPr>
+            </a:lvl2pPr>
+            <a:lvl3pPr marL="1143000" indent="-228600" algn="l" defTabSz="914400" rtl="0" eaLnBrk="1" latinLnBrk="0" hangingPunct="1">
+              <a:lnSpc>
+                <a:spcPct val="90000"/>
+              </a:lnSpc>
+              <a:spcBef>
+                <a:spcPts val="500"/>
+              </a:spcBef>
+              <a:buFont typeface="Arial" panose="020B0604020202020204" pitchFamily="34" charset="0"/>
+              <a:buChar char="•"/>
+              <a:defRPr sz="2000" kern="1200">
+                <a:solidFill>
+                  <a:schemeClr val="tx1"/>
+                </a:solidFill>
+                <a:latin typeface="+mn-lt"/>
+                <a:ea typeface="+mn-ea"/>
+                <a:cs typeface="+mn-cs"/>
+              </a:defRPr>
+            </a:lvl3pPr>
+            <a:lvl4pPr marL="1600200" indent="-228600" algn="l" defTabSz="914400" rtl="0" eaLnBrk="1" latinLnBrk="0" hangingPunct="1">
+              <a:lnSpc>
+                <a:spcPct val="90000"/>
+              </a:lnSpc>
+              <a:spcBef>
+                <a:spcPts val="500"/>
+              </a:spcBef>
+              <a:buFont typeface="Arial" panose="020B0604020202020204" pitchFamily="34" charset="0"/>
+              <a:buChar char="•"/>
+              <a:defRPr sz="1800" kern="1200">
+                <a:solidFill>
+                  <a:schemeClr val="tx1"/>
+                </a:solidFill>
+                <a:latin typeface="+mn-lt"/>
+                <a:ea typeface="+mn-ea"/>
+                <a:cs typeface="+mn-cs"/>
+              </a:defRPr>
+            </a:lvl4pPr>
+            <a:lvl5pPr marL="2057400" indent="-228600" algn="l" defTabSz="914400" rtl="0" eaLnBrk="1" latinLnBrk="0" hangingPunct="1">
+              <a:lnSpc>
+                <a:spcPct val="90000"/>
+              </a:lnSpc>
+              <a:spcBef>
+                <a:spcPts val="500"/>
+              </a:spcBef>
+              <a:buFont typeface="Arial" panose="020B0604020202020204" pitchFamily="34" charset="0"/>
+              <a:buChar char="•"/>
+              <a:defRPr sz="1800" kern="1200">
+                <a:solidFill>
+                  <a:schemeClr val="tx1"/>
+                </a:solidFill>
+                <a:latin typeface="+mn-lt"/>
+                <a:ea typeface="+mn-ea"/>
+                <a:cs typeface="+mn-cs"/>
+              </a:defRPr>
+            </a:lvl5pPr>
+            <a:lvl6pPr marL="2514600" indent="-228600" algn="l" defTabSz="914400" rtl="0" eaLnBrk="1" latinLnBrk="0" hangingPunct="1">
+              <a:lnSpc>
+                <a:spcPct val="90000"/>
+              </a:lnSpc>
+              <a:spcBef>
+                <a:spcPts val="500"/>
+              </a:spcBef>
+              <a:buFont typeface="Arial" panose="020B0604020202020204" pitchFamily="34" charset="0"/>
+              <a:buChar char="•"/>
+              <a:defRPr sz="1800" kern="1200">
+                <a:solidFill>
+                  <a:schemeClr val="tx1"/>
+                </a:solidFill>
+                <a:latin typeface="+mn-lt"/>
+                <a:ea typeface="+mn-ea"/>
+                <a:cs typeface="+mn-cs"/>
+              </a:defRPr>
+            </a:lvl6pPr>
+            <a:lvl7pPr marL="2971800" indent="-228600" algn="l" defTabSz="914400" rtl="0" eaLnBrk="1" latinLnBrk="0" hangingPunct="1">
+              <a:lnSpc>
+                <a:spcPct val="90000"/>
+              </a:lnSpc>
+              <a:spcBef>
+                <a:spcPts val="500"/>
+              </a:spcBef>
+              <a:buFont typeface="Arial" panose="020B0604020202020204" pitchFamily="34" charset="0"/>
+              <a:buChar char="•"/>
+              <a:defRPr sz="1800" kern="1200">
+                <a:solidFill>
+                  <a:schemeClr val="tx1"/>
+                </a:solidFill>
+                <a:latin typeface="+mn-lt"/>
+                <a:ea typeface="+mn-ea"/>
+                <a:cs typeface="+mn-cs"/>
+              </a:defRPr>
+            </a:lvl7pPr>
+            <a:lvl8pPr marL="3429000" indent="-228600" algn="l" defTabSz="914400" rtl="0" eaLnBrk="1" latinLnBrk="0" hangingPunct="1">
+              <a:lnSpc>
+                <a:spcPct val="90000"/>
+              </a:lnSpc>
+              <a:spcBef>
+                <a:spcPts val="500"/>
+              </a:spcBef>
+              <a:buFont typeface="Arial" panose="020B0604020202020204" pitchFamily="34" charset="0"/>
+              <a:buChar char="•"/>
+              <a:defRPr sz="1800" kern="1200">
+                <a:solidFill>
+                  <a:schemeClr val="tx1"/>
+                </a:solidFill>
+                <a:latin typeface="+mn-lt"/>
+                <a:ea typeface="+mn-ea"/>
+                <a:cs typeface="+mn-cs"/>
+              </a:defRPr>
+            </a:lvl8pPr>
+            <a:lvl9pPr marL="3886200" indent="-228600" algn="l" defTabSz="914400" rtl="0" eaLnBrk="1" latinLnBrk="0" hangingPunct="1">
+              <a:lnSpc>
+                <a:spcPct val="90000"/>
+              </a:lnSpc>
+              <a:spcBef>
+                <a:spcPts val="500"/>
+              </a:spcBef>
+              <a:buFont typeface="Arial" panose="020B0604020202020204" pitchFamily="34" charset="0"/>
+              <a:buChar char="•"/>
+              <a:defRPr sz="1800" kern="1200">
+                <a:solidFill>
+                  <a:schemeClr val="tx1"/>
+                </a:solidFill>
+                <a:latin typeface="+mn-lt"/>
+                <a:ea typeface="+mn-ea"/>
+                <a:cs typeface="+mn-cs"/>
+              </a:defRPr>
+            </a:lvl9pPr>
+          </a:lstStyle>
+          <a:p>
+            <a:pPr marL="0" indent="0">
+              <a:spcBef>
+                <a:spcPct val="0"/>
+              </a:spcBef>
+              <a:spcAft>
+                <a:spcPct val="0"/>
+              </a:spcAft>
+              <a:buNone/>
+            </a:pPr>
+            <a:fld id="{D9CD9367-4C90-4362-9C02-23DADA762573}" type="datetime'Fo''''l''g''e''''r''''s'''' ='' ''$1''''''''''''8'',9''00'">
+              <a:rPr lang="en-US" altLang="en-US" sz="1400" smtClean="0"/>
+              <a:pPr/>
+              <a:t>Folgers = $18,900</a:t>
             </a:fld>
             <a:endParaRPr lang="en-US" sz="1400" dirty="0"/>
           </a:p>
@@ -7171,7 +8211,7 @@
           </p:cNvSpPr>
           <p:nvPr>
             <p:custDataLst>
-              <p:tags r:id="rId18"/>
+              <p:tags r:id="rId20"/>
             </p:custDataLst>
           </p:nvPr>
         </p:nvSpPr>
@@ -7380,462 +8420,6 @@
               <a:rPr lang="en-US" altLang="en-US" sz="1400" smtClean="0"/>
               <a:pPr/>
               <a:t>Bigelow = $18,362.70</a:t>
-            </a:fld>
-            <a:endParaRPr lang="en-US" sz="1400" dirty="0"/>
-          </a:p>
-        </p:txBody>
-      </p:sp>
-      <p:sp>
-        <p:nvSpPr>
-          <p:cNvPr id="168" name="Text Placeholder 2">
-            <a:extLst>
-              <a:ext uri="{FF2B5EF4-FFF2-40B4-BE49-F238E27FC236}">
-                <a16:creationId xmlns:a16="http://schemas.microsoft.com/office/drawing/2014/main" id="{F01B8698-9294-F532-DDB4-2EE198CBAA21}"/>
-              </a:ext>
-            </a:extLst>
-          </p:cNvPr>
-          <p:cNvSpPr>
-            <a:spLocks noGrp="1"/>
-          </p:cNvSpPr>
-          <p:nvPr>
-            <p:custDataLst>
-              <p:tags r:id="rId19"/>
-            </p:custDataLst>
-          </p:nvPr>
-        </p:nvSpPr>
-        <p:spPr bwMode="auto">
-          <a:xfrm>
-            <a:off x="4022725" y="1663700"/>
-            <a:ext cx="1362075" cy="192088"/>
-          </a:xfrm>
-          <a:prstGeom prst="rect">
-            <a:avLst/>
-          </a:prstGeom>
-          <a:noFill/>
-          <a:ln>
-            <a:noFill/>
-          </a:ln>
-          <a:effectLst/>
-          <a:extLst>
-            <a:ext uri="{909E8E84-426E-40DD-AFC4-6F175D3DCCD1}">
-              <a14:hiddenFill xmlns:a14="http://schemas.microsoft.com/office/drawing/2010/main">
-                <a:solidFill>
-                  <a:schemeClr val="accent1"/>
-                </a:solidFill>
-              </a14:hiddenFill>
-            </a:ext>
-          </a:extLst>
-        </p:spPr>
-        <p:txBody>
-          <a:bodyPr vert="horz" wrap="none" lIns="0" tIns="0" rIns="0" bIns="0" numCol="1" spcCol="0" rtlCol="0" anchor="ctr" anchorCtr="0">
-            <a:noAutofit/>
-          </a:bodyPr>
-          <a:lstStyle>
-            <a:lvl1pPr marL="228600" indent="-228600" algn="l" defTabSz="914400" rtl="0" eaLnBrk="1" latinLnBrk="0" hangingPunct="1">
-              <a:lnSpc>
-                <a:spcPct val="90000"/>
-              </a:lnSpc>
-              <a:spcBef>
-                <a:spcPts val="1000"/>
-              </a:spcBef>
-              <a:buFont typeface="Arial" panose="020B0604020202020204" pitchFamily="34" charset="0"/>
-              <a:buChar char="•"/>
-              <a:defRPr sz="2800" kern="1200">
-                <a:solidFill>
-                  <a:schemeClr val="tx1"/>
-                </a:solidFill>
-                <a:latin typeface="+mn-lt"/>
-                <a:ea typeface="+mn-ea"/>
-                <a:cs typeface="+mn-cs"/>
-              </a:defRPr>
-            </a:lvl1pPr>
-            <a:lvl2pPr marL="685800" indent="-228600" algn="l" defTabSz="914400" rtl="0" eaLnBrk="1" latinLnBrk="0" hangingPunct="1">
-              <a:lnSpc>
-                <a:spcPct val="90000"/>
-              </a:lnSpc>
-              <a:spcBef>
-                <a:spcPts val="500"/>
-              </a:spcBef>
-              <a:buFont typeface="Arial" panose="020B0604020202020204" pitchFamily="34" charset="0"/>
-              <a:buChar char="•"/>
-              <a:defRPr sz="2400" kern="1200">
-                <a:solidFill>
-                  <a:schemeClr val="tx1"/>
-                </a:solidFill>
-                <a:latin typeface="+mn-lt"/>
-                <a:ea typeface="+mn-ea"/>
-                <a:cs typeface="+mn-cs"/>
-              </a:defRPr>
-            </a:lvl2pPr>
-            <a:lvl3pPr marL="1143000" indent="-228600" algn="l" defTabSz="914400" rtl="0" eaLnBrk="1" latinLnBrk="0" hangingPunct="1">
-              <a:lnSpc>
-                <a:spcPct val="90000"/>
-              </a:lnSpc>
-              <a:spcBef>
-                <a:spcPts val="500"/>
-              </a:spcBef>
-              <a:buFont typeface="Arial" panose="020B0604020202020204" pitchFamily="34" charset="0"/>
-              <a:buChar char="•"/>
-              <a:defRPr sz="2000" kern="1200">
-                <a:solidFill>
-                  <a:schemeClr val="tx1"/>
-                </a:solidFill>
-                <a:latin typeface="+mn-lt"/>
-                <a:ea typeface="+mn-ea"/>
-                <a:cs typeface="+mn-cs"/>
-              </a:defRPr>
-            </a:lvl3pPr>
-            <a:lvl4pPr marL="1600200" indent="-228600" algn="l" defTabSz="914400" rtl="0" eaLnBrk="1" latinLnBrk="0" hangingPunct="1">
-              <a:lnSpc>
-                <a:spcPct val="90000"/>
-              </a:lnSpc>
-              <a:spcBef>
-                <a:spcPts val="500"/>
-              </a:spcBef>
-              <a:buFont typeface="Arial" panose="020B0604020202020204" pitchFamily="34" charset="0"/>
-              <a:buChar char="•"/>
-              <a:defRPr sz="1800" kern="1200">
-                <a:solidFill>
-                  <a:schemeClr val="tx1"/>
-                </a:solidFill>
-                <a:latin typeface="+mn-lt"/>
-                <a:ea typeface="+mn-ea"/>
-                <a:cs typeface="+mn-cs"/>
-              </a:defRPr>
-            </a:lvl4pPr>
-            <a:lvl5pPr marL="2057400" indent="-228600" algn="l" defTabSz="914400" rtl="0" eaLnBrk="1" latinLnBrk="0" hangingPunct="1">
-              <a:lnSpc>
-                <a:spcPct val="90000"/>
-              </a:lnSpc>
-              <a:spcBef>
-                <a:spcPts val="500"/>
-              </a:spcBef>
-              <a:buFont typeface="Arial" panose="020B0604020202020204" pitchFamily="34" charset="0"/>
-              <a:buChar char="•"/>
-              <a:defRPr sz="1800" kern="1200">
-                <a:solidFill>
-                  <a:schemeClr val="tx1"/>
-                </a:solidFill>
-                <a:latin typeface="+mn-lt"/>
-                <a:ea typeface="+mn-ea"/>
-                <a:cs typeface="+mn-cs"/>
-              </a:defRPr>
-            </a:lvl5pPr>
-            <a:lvl6pPr marL="2514600" indent="-228600" algn="l" defTabSz="914400" rtl="0" eaLnBrk="1" latinLnBrk="0" hangingPunct="1">
-              <a:lnSpc>
-                <a:spcPct val="90000"/>
-              </a:lnSpc>
-              <a:spcBef>
-                <a:spcPts val="500"/>
-              </a:spcBef>
-              <a:buFont typeface="Arial" panose="020B0604020202020204" pitchFamily="34" charset="0"/>
-              <a:buChar char="•"/>
-              <a:defRPr sz="1800" kern="1200">
-                <a:solidFill>
-                  <a:schemeClr val="tx1"/>
-                </a:solidFill>
-                <a:latin typeface="+mn-lt"/>
-                <a:ea typeface="+mn-ea"/>
-                <a:cs typeface="+mn-cs"/>
-              </a:defRPr>
-            </a:lvl6pPr>
-            <a:lvl7pPr marL="2971800" indent="-228600" algn="l" defTabSz="914400" rtl="0" eaLnBrk="1" latinLnBrk="0" hangingPunct="1">
-              <a:lnSpc>
-                <a:spcPct val="90000"/>
-              </a:lnSpc>
-              <a:spcBef>
-                <a:spcPts val="500"/>
-              </a:spcBef>
-              <a:buFont typeface="Arial" panose="020B0604020202020204" pitchFamily="34" charset="0"/>
-              <a:buChar char="•"/>
-              <a:defRPr sz="1800" kern="1200">
-                <a:solidFill>
-                  <a:schemeClr val="tx1"/>
-                </a:solidFill>
-                <a:latin typeface="+mn-lt"/>
-                <a:ea typeface="+mn-ea"/>
-                <a:cs typeface="+mn-cs"/>
-              </a:defRPr>
-            </a:lvl7pPr>
-            <a:lvl8pPr marL="3429000" indent="-228600" algn="l" defTabSz="914400" rtl="0" eaLnBrk="1" latinLnBrk="0" hangingPunct="1">
-              <a:lnSpc>
-                <a:spcPct val="90000"/>
-              </a:lnSpc>
-              <a:spcBef>
-                <a:spcPts val="500"/>
-              </a:spcBef>
-              <a:buFont typeface="Arial" panose="020B0604020202020204" pitchFamily="34" charset="0"/>
-              <a:buChar char="•"/>
-              <a:defRPr sz="1800" kern="1200">
-                <a:solidFill>
-                  <a:schemeClr val="tx1"/>
-                </a:solidFill>
-                <a:latin typeface="+mn-lt"/>
-                <a:ea typeface="+mn-ea"/>
-                <a:cs typeface="+mn-cs"/>
-              </a:defRPr>
-            </a:lvl8pPr>
-            <a:lvl9pPr marL="3886200" indent="-228600" algn="l" defTabSz="914400" rtl="0" eaLnBrk="1" latinLnBrk="0" hangingPunct="1">
-              <a:lnSpc>
-                <a:spcPct val="90000"/>
-              </a:lnSpc>
-              <a:spcBef>
-                <a:spcPts val="500"/>
-              </a:spcBef>
-              <a:buFont typeface="Arial" panose="020B0604020202020204" pitchFamily="34" charset="0"/>
-              <a:buChar char="•"/>
-              <a:defRPr sz="1800" kern="1200">
-                <a:solidFill>
-                  <a:schemeClr val="tx1"/>
-                </a:solidFill>
-                <a:latin typeface="+mn-lt"/>
-                <a:ea typeface="+mn-ea"/>
-                <a:cs typeface="+mn-cs"/>
-              </a:defRPr>
-            </a:lvl9pPr>
-          </a:lstStyle>
-          <a:p>
-            <a:pPr marL="0" indent="0">
-              <a:spcBef>
-                <a:spcPct val="0"/>
-              </a:spcBef>
-              <a:spcAft>
-                <a:spcPct val="0"/>
-              </a:spcAft>
-              <a:buNone/>
-            </a:pPr>
-            <a:fld id="{D28F3D5C-6800-4691-A322-E713C2DC232D}" type="datetime'Pep''''''si'' ''''''''''''''= $1''''''9'',''''3''''90''.''60'">
-              <a:rPr lang="en-US" altLang="en-US" sz="1400" smtClean="0"/>
-              <a:pPr/>
-              <a:t>Pepsi = $19,390.60</a:t>
-            </a:fld>
-            <a:endParaRPr lang="en-US" sz="1400" dirty="0"/>
-          </a:p>
-        </p:txBody>
-      </p:sp>
-      <p:sp>
-        <p:nvSpPr>
-          <p:cNvPr id="189" name="Text Placeholder 2">
-            <a:extLst>
-              <a:ext uri="{FF2B5EF4-FFF2-40B4-BE49-F238E27FC236}">
-                <a16:creationId xmlns:a16="http://schemas.microsoft.com/office/drawing/2014/main" id="{35BB811B-08DE-AB67-F9FD-C573E1C72AC3}"/>
-              </a:ext>
-            </a:extLst>
-          </p:cNvPr>
-          <p:cNvSpPr>
-            <a:spLocks noGrp="1"/>
-          </p:cNvSpPr>
-          <p:nvPr>
-            <p:custDataLst>
-              <p:tags r:id="rId20"/>
-            </p:custDataLst>
-          </p:nvPr>
-        </p:nvSpPr>
-        <p:spPr bwMode="auto">
-          <a:xfrm>
-            <a:off x="4022725" y="2171700"/>
-            <a:ext cx="1616075" cy="192088"/>
-          </a:xfrm>
-          <a:prstGeom prst="rect">
-            <a:avLst/>
-          </a:prstGeom>
-          <a:noFill/>
-          <a:ln>
-            <a:noFill/>
-          </a:ln>
-          <a:effectLst/>
-          <a:extLst>
-            <a:ext uri="{909E8E84-426E-40DD-AFC4-6F175D3DCCD1}">
-              <a14:hiddenFill xmlns:a14="http://schemas.microsoft.com/office/drawing/2010/main">
-                <a:solidFill>
-                  <a:schemeClr val="accent1"/>
-                </a:solidFill>
-              </a14:hiddenFill>
-            </a:ext>
-          </a:extLst>
-        </p:spPr>
-        <p:txBody>
-          <a:bodyPr vert="horz" wrap="none" lIns="0" tIns="0" rIns="0" bIns="0" numCol="1" spcCol="0" rtlCol="0" anchor="ctr" anchorCtr="0">
-            <a:noAutofit/>
-          </a:bodyPr>
-          <a:lstStyle>
-            <a:lvl1pPr marL="228600" indent="-228600" algn="l" defTabSz="914400" rtl="0" eaLnBrk="1" latinLnBrk="0" hangingPunct="1">
-              <a:lnSpc>
-                <a:spcPct val="90000"/>
-              </a:lnSpc>
-              <a:spcBef>
-                <a:spcPts val="1000"/>
-              </a:spcBef>
-              <a:buFont typeface="Arial" panose="020B0604020202020204" pitchFamily="34" charset="0"/>
-              <a:buChar char="•"/>
-              <a:defRPr sz="2800" kern="1200">
-                <a:solidFill>
-                  <a:schemeClr val="tx1"/>
-                </a:solidFill>
-                <a:latin typeface="+mn-lt"/>
-                <a:ea typeface="+mn-ea"/>
-                <a:cs typeface="+mn-cs"/>
-              </a:defRPr>
-            </a:lvl1pPr>
-            <a:lvl2pPr marL="685800" indent="-228600" algn="l" defTabSz="914400" rtl="0" eaLnBrk="1" latinLnBrk="0" hangingPunct="1">
-              <a:lnSpc>
-                <a:spcPct val="90000"/>
-              </a:lnSpc>
-              <a:spcBef>
-                <a:spcPts val="500"/>
-              </a:spcBef>
-              <a:buFont typeface="Arial" panose="020B0604020202020204" pitchFamily="34" charset="0"/>
-              <a:buChar char="•"/>
-              <a:defRPr sz="2400" kern="1200">
-                <a:solidFill>
-                  <a:schemeClr val="tx1"/>
-                </a:solidFill>
-                <a:latin typeface="+mn-lt"/>
-                <a:ea typeface="+mn-ea"/>
-                <a:cs typeface="+mn-cs"/>
-              </a:defRPr>
-            </a:lvl2pPr>
-            <a:lvl3pPr marL="1143000" indent="-228600" algn="l" defTabSz="914400" rtl="0" eaLnBrk="1" latinLnBrk="0" hangingPunct="1">
-              <a:lnSpc>
-                <a:spcPct val="90000"/>
-              </a:lnSpc>
-              <a:spcBef>
-                <a:spcPts val="500"/>
-              </a:spcBef>
-              <a:buFont typeface="Arial" panose="020B0604020202020204" pitchFamily="34" charset="0"/>
-              <a:buChar char="•"/>
-              <a:defRPr sz="2000" kern="1200">
-                <a:solidFill>
-                  <a:schemeClr val="tx1"/>
-                </a:solidFill>
-                <a:latin typeface="+mn-lt"/>
-                <a:ea typeface="+mn-ea"/>
-                <a:cs typeface="+mn-cs"/>
-              </a:defRPr>
-            </a:lvl3pPr>
-            <a:lvl4pPr marL="1600200" indent="-228600" algn="l" defTabSz="914400" rtl="0" eaLnBrk="1" latinLnBrk="0" hangingPunct="1">
-              <a:lnSpc>
-                <a:spcPct val="90000"/>
-              </a:lnSpc>
-              <a:spcBef>
-                <a:spcPts val="500"/>
-              </a:spcBef>
-              <a:buFont typeface="Arial" panose="020B0604020202020204" pitchFamily="34" charset="0"/>
-              <a:buChar char="•"/>
-              <a:defRPr sz="1800" kern="1200">
-                <a:solidFill>
-                  <a:schemeClr val="tx1"/>
-                </a:solidFill>
-                <a:latin typeface="+mn-lt"/>
-                <a:ea typeface="+mn-ea"/>
-                <a:cs typeface="+mn-cs"/>
-              </a:defRPr>
-            </a:lvl4pPr>
-            <a:lvl5pPr marL="2057400" indent="-228600" algn="l" defTabSz="914400" rtl="0" eaLnBrk="1" latinLnBrk="0" hangingPunct="1">
-              <a:lnSpc>
-                <a:spcPct val="90000"/>
-              </a:lnSpc>
-              <a:spcBef>
-                <a:spcPts val="500"/>
-              </a:spcBef>
-              <a:buFont typeface="Arial" panose="020B0604020202020204" pitchFamily="34" charset="0"/>
-              <a:buChar char="•"/>
-              <a:defRPr sz="1800" kern="1200">
-                <a:solidFill>
-                  <a:schemeClr val="tx1"/>
-                </a:solidFill>
-                <a:latin typeface="+mn-lt"/>
-                <a:ea typeface="+mn-ea"/>
-                <a:cs typeface="+mn-cs"/>
-              </a:defRPr>
-            </a:lvl5pPr>
-            <a:lvl6pPr marL="2514600" indent="-228600" algn="l" defTabSz="914400" rtl="0" eaLnBrk="1" latinLnBrk="0" hangingPunct="1">
-              <a:lnSpc>
-                <a:spcPct val="90000"/>
-              </a:lnSpc>
-              <a:spcBef>
-                <a:spcPts val="500"/>
-              </a:spcBef>
-              <a:buFont typeface="Arial" panose="020B0604020202020204" pitchFamily="34" charset="0"/>
-              <a:buChar char="•"/>
-              <a:defRPr sz="1800" kern="1200">
-                <a:solidFill>
-                  <a:schemeClr val="tx1"/>
-                </a:solidFill>
-                <a:latin typeface="+mn-lt"/>
-                <a:ea typeface="+mn-ea"/>
-                <a:cs typeface="+mn-cs"/>
-              </a:defRPr>
-            </a:lvl6pPr>
-            <a:lvl7pPr marL="2971800" indent="-228600" algn="l" defTabSz="914400" rtl="0" eaLnBrk="1" latinLnBrk="0" hangingPunct="1">
-              <a:lnSpc>
-                <a:spcPct val="90000"/>
-              </a:lnSpc>
-              <a:spcBef>
-                <a:spcPts val="500"/>
-              </a:spcBef>
-              <a:buFont typeface="Arial" panose="020B0604020202020204" pitchFamily="34" charset="0"/>
-              <a:buChar char="•"/>
-              <a:defRPr sz="1800" kern="1200">
-                <a:solidFill>
-                  <a:schemeClr val="tx1"/>
-                </a:solidFill>
-                <a:latin typeface="+mn-lt"/>
-                <a:ea typeface="+mn-ea"/>
-                <a:cs typeface="+mn-cs"/>
-              </a:defRPr>
-            </a:lvl7pPr>
-            <a:lvl8pPr marL="3429000" indent="-228600" algn="l" defTabSz="914400" rtl="0" eaLnBrk="1" latinLnBrk="0" hangingPunct="1">
-              <a:lnSpc>
-                <a:spcPct val="90000"/>
-              </a:lnSpc>
-              <a:spcBef>
-                <a:spcPts val="500"/>
-              </a:spcBef>
-              <a:buFont typeface="Arial" panose="020B0604020202020204" pitchFamily="34" charset="0"/>
-              <a:buChar char="•"/>
-              <a:defRPr sz="1800" kern="1200">
-                <a:solidFill>
-                  <a:schemeClr val="tx1"/>
-                </a:solidFill>
-                <a:latin typeface="+mn-lt"/>
-                <a:ea typeface="+mn-ea"/>
-                <a:cs typeface="+mn-cs"/>
-              </a:defRPr>
-            </a:lvl8pPr>
-            <a:lvl9pPr marL="3886200" indent="-228600" algn="l" defTabSz="914400" rtl="0" eaLnBrk="1" latinLnBrk="0" hangingPunct="1">
-              <a:lnSpc>
-                <a:spcPct val="90000"/>
-              </a:lnSpc>
-              <a:spcBef>
-                <a:spcPts val="500"/>
-              </a:spcBef>
-              <a:buFont typeface="Arial" panose="020B0604020202020204" pitchFamily="34" charset="0"/>
-              <a:buChar char="•"/>
-              <a:defRPr sz="1800" kern="1200">
-                <a:solidFill>
-                  <a:schemeClr val="tx1"/>
-                </a:solidFill>
-                <a:latin typeface="+mn-lt"/>
-                <a:ea typeface="+mn-ea"/>
-                <a:cs typeface="+mn-cs"/>
-              </a:defRPr>
-            </a:lvl9pPr>
-          </a:lstStyle>
-          <a:p>
-            <a:pPr marL="0" indent="0">
-              <a:spcBef>
-                <a:spcPct val="0"/>
-              </a:spcBef>
-              <a:spcAft>
-                <a:spcPct val="0"/>
-              </a:spcAft>
-              <a:buNone/>
-            </a:pPr>
-            <a:fld id="{D731A5A5-500D-4E77-B48A-60B1DF216EF2}" type="datetime'Ke''l''lo''''''gg''''’s'''' = ''''$18'',5''''''55''''.''40'''">
-              <a:rPr lang="en-US" altLang="en-US" sz="1400" smtClean="0"/>
-              <a:pPr/>
-              <a:t>Kellogg’s = $18,555.40</a:t>
             </a:fld>
             <a:endParaRPr lang="en-US" sz="1400" dirty="0"/>
           </a:p>
@@ -7943,10 +8527,10 @@
       </p:sp>
       <p:graphicFrame>
         <p:nvGraphicFramePr>
-          <p:cNvPr id="3" name="Chart 2">
+          <p:cNvPr id="466" name="Chart 465">
             <a:extLst>
               <a:ext uri="{FF2B5EF4-FFF2-40B4-BE49-F238E27FC236}">
-                <a16:creationId xmlns:a16="http://schemas.microsoft.com/office/drawing/2014/main" id="{D2E8DBCA-E70C-D175-5372-A226706F5712}"/>
+                <a16:creationId xmlns:a16="http://schemas.microsoft.com/office/drawing/2014/main" id="{3E3198C3-C4F8-578B-8084-83A2A65F0F82}"/>
               </a:ext>
             </a:extLst>
           </p:cNvPr>
@@ -7957,13 +8541,13 @@
             </p:custDataLst>
             <p:extLst>
               <p:ext uri="{D42A27DB-BD31-4B8C-83A1-F6EECF244321}">
-                <p14:modId xmlns:p14="http://schemas.microsoft.com/office/powerpoint/2010/main" val="2283266206"/>
+                <p14:modId xmlns:p14="http://schemas.microsoft.com/office/powerpoint/2010/main" val="2102574741"/>
               </p:ext>
             </p:extLst>
           </p:nvPr>
         </p:nvGraphicFramePr>
         <p:xfrm>
-          <a:off x="6588125" y="1244600"/>
+          <a:off x="6689725" y="1185863"/>
           <a:ext cx="3444875" cy="3444875"/>
         </p:xfrm>
         <a:graphic>
@@ -7992,7 +8576,7 @@
         </p:nvSpPr>
         <p:spPr bwMode="gray">
           <a:xfrm>
-            <a:off x="7453313" y="1568450"/>
+            <a:off x="7554913" y="1509713"/>
             <a:ext cx="403225" cy="192088"/>
           </a:xfrm>
           <a:prstGeom prst="rect">
@@ -8197,10 +8781,10 @@
       </p:sp>
       <p:sp>
         <p:nvSpPr>
-          <p:cNvPr id="388" name="Text Placeholder 2">
+          <p:cNvPr id="390" name="Text Placeholder 2">
             <a:extLst>
               <a:ext uri="{FF2B5EF4-FFF2-40B4-BE49-F238E27FC236}">
-                <a16:creationId xmlns:a16="http://schemas.microsoft.com/office/drawing/2014/main" id="{1668D685-E39E-CA78-E994-97AB150EA2B8}"/>
+                <a16:creationId xmlns:a16="http://schemas.microsoft.com/office/drawing/2014/main" id="{5A361C12-95C9-5F06-4553-BA298A0D4878}"/>
               </a:ext>
             </a:extLst>
           </p:cNvPr>
@@ -8215,7 +8799,237 @@
         </p:nvSpPr>
         <p:spPr bwMode="gray">
           <a:xfrm>
-            <a:off x="7681913" y="1760538"/>
+            <a:off x="7966075" y="1336675"/>
+            <a:ext cx="403225" cy="192088"/>
+          </a:xfrm>
+          <a:prstGeom prst="rect">
+            <a:avLst/>
+          </a:prstGeom>
+          <a:solidFill>
+            <a:srgbClr val="C30C3E"/>
+          </a:solidFill>
+          <a:ln>
+            <a:noFill/>
+          </a:ln>
+          <a:effectLst/>
+        </p:spPr>
+        <p:txBody>
+          <a:bodyPr vert="horz" wrap="none" lIns="25400" tIns="0" rIns="25400" bIns="0" numCol="1" spcCol="0" rtlCol="0" anchor="ctr" anchorCtr="0">
+            <a:noAutofit/>
+          </a:bodyPr>
+          <a:lstStyle>
+            <a:lvl1pPr marL="228600" indent="-228600" algn="l" defTabSz="914400" rtl="0" eaLnBrk="1" latinLnBrk="0" hangingPunct="1">
+              <a:lnSpc>
+                <a:spcPct val="90000"/>
+              </a:lnSpc>
+              <a:spcBef>
+                <a:spcPts val="1000"/>
+              </a:spcBef>
+              <a:buFont typeface="Arial" panose="020B0604020202020204" pitchFamily="34" charset="0"/>
+              <a:buChar char="•"/>
+              <a:defRPr sz="2800" kern="1200">
+                <a:solidFill>
+                  <a:schemeClr val="tx1"/>
+                </a:solidFill>
+                <a:latin typeface="+mn-lt"/>
+                <a:ea typeface="+mn-ea"/>
+                <a:cs typeface="+mn-cs"/>
+              </a:defRPr>
+            </a:lvl1pPr>
+            <a:lvl2pPr marL="685800" indent="-228600" algn="l" defTabSz="914400" rtl="0" eaLnBrk="1" latinLnBrk="0" hangingPunct="1">
+              <a:lnSpc>
+                <a:spcPct val="90000"/>
+              </a:lnSpc>
+              <a:spcBef>
+                <a:spcPts val="500"/>
+              </a:spcBef>
+              <a:buFont typeface="Arial" panose="020B0604020202020204" pitchFamily="34" charset="0"/>
+              <a:buChar char="•"/>
+              <a:defRPr sz="2400" kern="1200">
+                <a:solidFill>
+                  <a:schemeClr val="tx1"/>
+                </a:solidFill>
+                <a:latin typeface="+mn-lt"/>
+                <a:ea typeface="+mn-ea"/>
+                <a:cs typeface="+mn-cs"/>
+              </a:defRPr>
+            </a:lvl2pPr>
+            <a:lvl3pPr marL="1143000" indent="-228600" algn="l" defTabSz="914400" rtl="0" eaLnBrk="1" latinLnBrk="0" hangingPunct="1">
+              <a:lnSpc>
+                <a:spcPct val="90000"/>
+              </a:lnSpc>
+              <a:spcBef>
+                <a:spcPts val="500"/>
+              </a:spcBef>
+              <a:buFont typeface="Arial" panose="020B0604020202020204" pitchFamily="34" charset="0"/>
+              <a:buChar char="•"/>
+              <a:defRPr sz="2000" kern="1200">
+                <a:solidFill>
+                  <a:schemeClr val="tx1"/>
+                </a:solidFill>
+                <a:latin typeface="+mn-lt"/>
+                <a:ea typeface="+mn-ea"/>
+                <a:cs typeface="+mn-cs"/>
+              </a:defRPr>
+            </a:lvl3pPr>
+            <a:lvl4pPr marL="1600200" indent="-228600" algn="l" defTabSz="914400" rtl="0" eaLnBrk="1" latinLnBrk="0" hangingPunct="1">
+              <a:lnSpc>
+                <a:spcPct val="90000"/>
+              </a:lnSpc>
+              <a:spcBef>
+                <a:spcPts val="500"/>
+              </a:spcBef>
+              <a:buFont typeface="Arial" panose="020B0604020202020204" pitchFamily="34" charset="0"/>
+              <a:buChar char="•"/>
+              <a:defRPr sz="1800" kern="1200">
+                <a:solidFill>
+                  <a:schemeClr val="tx1"/>
+                </a:solidFill>
+                <a:latin typeface="+mn-lt"/>
+                <a:ea typeface="+mn-ea"/>
+                <a:cs typeface="+mn-cs"/>
+              </a:defRPr>
+            </a:lvl4pPr>
+            <a:lvl5pPr marL="2057400" indent="-228600" algn="l" defTabSz="914400" rtl="0" eaLnBrk="1" latinLnBrk="0" hangingPunct="1">
+              <a:lnSpc>
+                <a:spcPct val="90000"/>
+              </a:lnSpc>
+              <a:spcBef>
+                <a:spcPts val="500"/>
+              </a:spcBef>
+              <a:buFont typeface="Arial" panose="020B0604020202020204" pitchFamily="34" charset="0"/>
+              <a:buChar char="•"/>
+              <a:defRPr sz="1800" kern="1200">
+                <a:solidFill>
+                  <a:schemeClr val="tx1"/>
+                </a:solidFill>
+                <a:latin typeface="+mn-lt"/>
+                <a:ea typeface="+mn-ea"/>
+                <a:cs typeface="+mn-cs"/>
+              </a:defRPr>
+            </a:lvl5pPr>
+            <a:lvl6pPr marL="2514600" indent="-228600" algn="l" defTabSz="914400" rtl="0" eaLnBrk="1" latinLnBrk="0" hangingPunct="1">
+              <a:lnSpc>
+                <a:spcPct val="90000"/>
+              </a:lnSpc>
+              <a:spcBef>
+                <a:spcPts val="500"/>
+              </a:spcBef>
+              <a:buFont typeface="Arial" panose="020B0604020202020204" pitchFamily="34" charset="0"/>
+              <a:buChar char="•"/>
+              <a:defRPr sz="1800" kern="1200">
+                <a:solidFill>
+                  <a:schemeClr val="tx1"/>
+                </a:solidFill>
+                <a:latin typeface="+mn-lt"/>
+                <a:ea typeface="+mn-ea"/>
+                <a:cs typeface="+mn-cs"/>
+              </a:defRPr>
+            </a:lvl6pPr>
+            <a:lvl7pPr marL="2971800" indent="-228600" algn="l" defTabSz="914400" rtl="0" eaLnBrk="1" latinLnBrk="0" hangingPunct="1">
+              <a:lnSpc>
+                <a:spcPct val="90000"/>
+              </a:lnSpc>
+              <a:spcBef>
+                <a:spcPts val="500"/>
+              </a:spcBef>
+              <a:buFont typeface="Arial" panose="020B0604020202020204" pitchFamily="34" charset="0"/>
+              <a:buChar char="•"/>
+              <a:defRPr sz="1800" kern="1200">
+                <a:solidFill>
+                  <a:schemeClr val="tx1"/>
+                </a:solidFill>
+                <a:latin typeface="+mn-lt"/>
+                <a:ea typeface="+mn-ea"/>
+                <a:cs typeface="+mn-cs"/>
+              </a:defRPr>
+            </a:lvl7pPr>
+            <a:lvl8pPr marL="3429000" indent="-228600" algn="l" defTabSz="914400" rtl="0" eaLnBrk="1" latinLnBrk="0" hangingPunct="1">
+              <a:lnSpc>
+                <a:spcPct val="90000"/>
+              </a:lnSpc>
+              <a:spcBef>
+                <a:spcPts val="500"/>
+              </a:spcBef>
+              <a:buFont typeface="Arial" panose="020B0604020202020204" pitchFamily="34" charset="0"/>
+              <a:buChar char="•"/>
+              <a:defRPr sz="1800" kern="1200">
+                <a:solidFill>
+                  <a:schemeClr val="tx1"/>
+                </a:solidFill>
+                <a:latin typeface="+mn-lt"/>
+                <a:ea typeface="+mn-ea"/>
+                <a:cs typeface="+mn-cs"/>
+              </a:defRPr>
+            </a:lvl8pPr>
+            <a:lvl9pPr marL="3886200" indent="-228600" algn="l" defTabSz="914400" rtl="0" eaLnBrk="1" latinLnBrk="0" hangingPunct="1">
+              <a:lnSpc>
+                <a:spcPct val="90000"/>
+              </a:lnSpc>
+              <a:spcBef>
+                <a:spcPts val="500"/>
+              </a:spcBef>
+              <a:buFont typeface="Arial" panose="020B0604020202020204" pitchFamily="34" charset="0"/>
+              <a:buChar char="•"/>
+              <a:defRPr sz="1800" kern="1200">
+                <a:solidFill>
+                  <a:schemeClr val="tx1"/>
+                </a:solidFill>
+                <a:latin typeface="+mn-lt"/>
+                <a:ea typeface="+mn-ea"/>
+                <a:cs typeface="+mn-cs"/>
+              </a:defRPr>
+            </a:lvl9pPr>
+          </a:lstStyle>
+          <a:p>
+            <a:pPr marL="0" indent="0" algn="ctr">
+              <a:spcBef>
+                <a:spcPct val="0"/>
+              </a:spcBef>
+              <a:spcAft>
+                <a:spcPct val="0"/>
+              </a:spcAft>
+              <a:buNone/>
+            </a:pPr>
+            <a:fld id="{776F9243-2302-4A0A-BAAC-07467FE57D56}" type="datetime'1''''.7''''''''''''''''''''''''''''''''''''''''''%'''">
+              <a:rPr lang="en-US" altLang="en-US" sz="1400" smtClean="0">
+                <a:solidFill>
+                  <a:schemeClr val="bg1"/>
+                </a:solidFill>
+                <a:effectLst/>
+              </a:rPr>
+              <a:pPr/>
+              <a:t>1.7%</a:t>
+            </a:fld>
+            <a:endParaRPr lang="en-US" sz="1400" dirty="0">
+              <a:solidFill>
+                <a:schemeClr val="bg1"/>
+              </a:solidFill>
+            </a:endParaRPr>
+          </a:p>
+        </p:txBody>
+      </p:sp>
+      <p:sp>
+        <p:nvSpPr>
+          <p:cNvPr id="388" name="Text Placeholder 2">
+            <a:extLst>
+              <a:ext uri="{FF2B5EF4-FFF2-40B4-BE49-F238E27FC236}">
+                <a16:creationId xmlns:a16="http://schemas.microsoft.com/office/drawing/2014/main" id="{1668D685-E39E-CA78-E994-97AB150EA2B8}"/>
+              </a:ext>
+            </a:extLst>
+          </p:cNvPr>
+          <p:cNvSpPr>
+            <a:spLocks noGrp="1"/>
+          </p:cNvSpPr>
+          <p:nvPr>
+            <p:custDataLst>
+              <p:tags r:id="rId24"/>
+            </p:custDataLst>
+          </p:nvPr>
+        </p:nvSpPr>
+        <p:spPr bwMode="gray">
+          <a:xfrm>
+            <a:off x="7783513" y="1701800"/>
             <a:ext cx="403225" cy="192088"/>
           </a:xfrm>
           <a:prstGeom prst="rect">
@@ -8420,6 +9234,236 @@
       </p:sp>
       <p:sp>
         <p:nvSpPr>
+          <p:cNvPr id="391" name="Text Placeholder 2">
+            <a:extLst>
+              <a:ext uri="{FF2B5EF4-FFF2-40B4-BE49-F238E27FC236}">
+                <a16:creationId xmlns:a16="http://schemas.microsoft.com/office/drawing/2014/main" id="{9D0C0292-A91B-A51A-422D-523D00681132}"/>
+              </a:ext>
+            </a:extLst>
+          </p:cNvPr>
+          <p:cNvSpPr>
+            <a:spLocks noGrp="1"/>
+          </p:cNvSpPr>
+          <p:nvPr>
+            <p:custDataLst>
+              <p:tags r:id="rId25"/>
+            </p:custDataLst>
+          </p:nvPr>
+        </p:nvSpPr>
+        <p:spPr bwMode="gray">
+          <a:xfrm>
+            <a:off x="8170863" y="2085975"/>
+            <a:ext cx="403225" cy="192088"/>
+          </a:xfrm>
+          <a:prstGeom prst="rect">
+            <a:avLst/>
+          </a:prstGeom>
+          <a:solidFill>
+            <a:schemeClr val="accent6"/>
+          </a:solidFill>
+          <a:ln>
+            <a:noFill/>
+          </a:ln>
+          <a:effectLst/>
+        </p:spPr>
+        <p:txBody>
+          <a:bodyPr vert="horz" wrap="none" lIns="25400" tIns="0" rIns="25400" bIns="0" numCol="1" spcCol="0" rtlCol="0" anchor="ctr" anchorCtr="0">
+            <a:noAutofit/>
+          </a:bodyPr>
+          <a:lstStyle>
+            <a:lvl1pPr marL="228600" indent="-228600" algn="l" defTabSz="914400" rtl="0" eaLnBrk="1" latinLnBrk="0" hangingPunct="1">
+              <a:lnSpc>
+                <a:spcPct val="90000"/>
+              </a:lnSpc>
+              <a:spcBef>
+                <a:spcPts val="1000"/>
+              </a:spcBef>
+              <a:buFont typeface="Arial" panose="020B0604020202020204" pitchFamily="34" charset="0"/>
+              <a:buChar char="•"/>
+              <a:defRPr sz="2800" kern="1200">
+                <a:solidFill>
+                  <a:schemeClr val="tx1"/>
+                </a:solidFill>
+                <a:latin typeface="+mn-lt"/>
+                <a:ea typeface="+mn-ea"/>
+                <a:cs typeface="+mn-cs"/>
+              </a:defRPr>
+            </a:lvl1pPr>
+            <a:lvl2pPr marL="685800" indent="-228600" algn="l" defTabSz="914400" rtl="0" eaLnBrk="1" latinLnBrk="0" hangingPunct="1">
+              <a:lnSpc>
+                <a:spcPct val="90000"/>
+              </a:lnSpc>
+              <a:spcBef>
+                <a:spcPts val="500"/>
+              </a:spcBef>
+              <a:buFont typeface="Arial" panose="020B0604020202020204" pitchFamily="34" charset="0"/>
+              <a:buChar char="•"/>
+              <a:defRPr sz="2400" kern="1200">
+                <a:solidFill>
+                  <a:schemeClr val="tx1"/>
+                </a:solidFill>
+                <a:latin typeface="+mn-lt"/>
+                <a:ea typeface="+mn-ea"/>
+                <a:cs typeface="+mn-cs"/>
+              </a:defRPr>
+            </a:lvl2pPr>
+            <a:lvl3pPr marL="1143000" indent="-228600" algn="l" defTabSz="914400" rtl="0" eaLnBrk="1" latinLnBrk="0" hangingPunct="1">
+              <a:lnSpc>
+                <a:spcPct val="90000"/>
+              </a:lnSpc>
+              <a:spcBef>
+                <a:spcPts val="500"/>
+              </a:spcBef>
+              <a:buFont typeface="Arial" panose="020B0604020202020204" pitchFamily="34" charset="0"/>
+              <a:buChar char="•"/>
+              <a:defRPr sz="2000" kern="1200">
+                <a:solidFill>
+                  <a:schemeClr val="tx1"/>
+                </a:solidFill>
+                <a:latin typeface="+mn-lt"/>
+                <a:ea typeface="+mn-ea"/>
+                <a:cs typeface="+mn-cs"/>
+              </a:defRPr>
+            </a:lvl3pPr>
+            <a:lvl4pPr marL="1600200" indent="-228600" algn="l" defTabSz="914400" rtl="0" eaLnBrk="1" latinLnBrk="0" hangingPunct="1">
+              <a:lnSpc>
+                <a:spcPct val="90000"/>
+              </a:lnSpc>
+              <a:spcBef>
+                <a:spcPts val="500"/>
+              </a:spcBef>
+              <a:buFont typeface="Arial" panose="020B0604020202020204" pitchFamily="34" charset="0"/>
+              <a:buChar char="•"/>
+              <a:defRPr sz="1800" kern="1200">
+                <a:solidFill>
+                  <a:schemeClr val="tx1"/>
+                </a:solidFill>
+                <a:latin typeface="+mn-lt"/>
+                <a:ea typeface="+mn-ea"/>
+                <a:cs typeface="+mn-cs"/>
+              </a:defRPr>
+            </a:lvl4pPr>
+            <a:lvl5pPr marL="2057400" indent="-228600" algn="l" defTabSz="914400" rtl="0" eaLnBrk="1" latinLnBrk="0" hangingPunct="1">
+              <a:lnSpc>
+                <a:spcPct val="90000"/>
+              </a:lnSpc>
+              <a:spcBef>
+                <a:spcPts val="500"/>
+              </a:spcBef>
+              <a:buFont typeface="Arial" panose="020B0604020202020204" pitchFamily="34" charset="0"/>
+              <a:buChar char="•"/>
+              <a:defRPr sz="1800" kern="1200">
+                <a:solidFill>
+                  <a:schemeClr val="tx1"/>
+                </a:solidFill>
+                <a:latin typeface="+mn-lt"/>
+                <a:ea typeface="+mn-ea"/>
+                <a:cs typeface="+mn-cs"/>
+              </a:defRPr>
+            </a:lvl5pPr>
+            <a:lvl6pPr marL="2514600" indent="-228600" algn="l" defTabSz="914400" rtl="0" eaLnBrk="1" latinLnBrk="0" hangingPunct="1">
+              <a:lnSpc>
+                <a:spcPct val="90000"/>
+              </a:lnSpc>
+              <a:spcBef>
+                <a:spcPts val="500"/>
+              </a:spcBef>
+              <a:buFont typeface="Arial" panose="020B0604020202020204" pitchFamily="34" charset="0"/>
+              <a:buChar char="•"/>
+              <a:defRPr sz="1800" kern="1200">
+                <a:solidFill>
+                  <a:schemeClr val="tx1"/>
+                </a:solidFill>
+                <a:latin typeface="+mn-lt"/>
+                <a:ea typeface="+mn-ea"/>
+                <a:cs typeface="+mn-cs"/>
+              </a:defRPr>
+            </a:lvl6pPr>
+            <a:lvl7pPr marL="2971800" indent="-228600" algn="l" defTabSz="914400" rtl="0" eaLnBrk="1" latinLnBrk="0" hangingPunct="1">
+              <a:lnSpc>
+                <a:spcPct val="90000"/>
+              </a:lnSpc>
+              <a:spcBef>
+                <a:spcPts val="500"/>
+              </a:spcBef>
+              <a:buFont typeface="Arial" panose="020B0604020202020204" pitchFamily="34" charset="0"/>
+              <a:buChar char="•"/>
+              <a:defRPr sz="1800" kern="1200">
+                <a:solidFill>
+                  <a:schemeClr val="tx1"/>
+                </a:solidFill>
+                <a:latin typeface="+mn-lt"/>
+                <a:ea typeface="+mn-ea"/>
+                <a:cs typeface="+mn-cs"/>
+              </a:defRPr>
+            </a:lvl7pPr>
+            <a:lvl8pPr marL="3429000" indent="-228600" algn="l" defTabSz="914400" rtl="0" eaLnBrk="1" latinLnBrk="0" hangingPunct="1">
+              <a:lnSpc>
+                <a:spcPct val="90000"/>
+              </a:lnSpc>
+              <a:spcBef>
+                <a:spcPts val="500"/>
+              </a:spcBef>
+              <a:buFont typeface="Arial" panose="020B0604020202020204" pitchFamily="34" charset="0"/>
+              <a:buChar char="•"/>
+              <a:defRPr sz="1800" kern="1200">
+                <a:solidFill>
+                  <a:schemeClr val="tx1"/>
+                </a:solidFill>
+                <a:latin typeface="+mn-lt"/>
+                <a:ea typeface="+mn-ea"/>
+                <a:cs typeface="+mn-cs"/>
+              </a:defRPr>
+            </a:lvl8pPr>
+            <a:lvl9pPr marL="3886200" indent="-228600" algn="l" defTabSz="914400" rtl="0" eaLnBrk="1" latinLnBrk="0" hangingPunct="1">
+              <a:lnSpc>
+                <a:spcPct val="90000"/>
+              </a:lnSpc>
+              <a:spcBef>
+                <a:spcPts val="500"/>
+              </a:spcBef>
+              <a:buFont typeface="Arial" panose="020B0604020202020204" pitchFamily="34" charset="0"/>
+              <a:buChar char="•"/>
+              <a:defRPr sz="1800" kern="1200">
+                <a:solidFill>
+                  <a:schemeClr val="tx1"/>
+                </a:solidFill>
+                <a:latin typeface="+mn-lt"/>
+                <a:ea typeface="+mn-ea"/>
+                <a:cs typeface="+mn-cs"/>
+              </a:defRPr>
+            </a:lvl9pPr>
+          </a:lstStyle>
+          <a:p>
+            <a:pPr marL="0" indent="0" algn="ctr">
+              <a:spcBef>
+                <a:spcPct val="0"/>
+              </a:spcBef>
+              <a:spcAft>
+                <a:spcPct val="0"/>
+              </a:spcAft>
+              <a:buNone/>
+            </a:pPr>
+            <a:fld id="{64105A3C-3918-4CA9-B467-72F78DA07DBB}" type="datetime'''''''''''''''''''''1''''''.''8''''%'''">
+              <a:rPr lang="en-US" altLang="en-US" sz="1400" smtClean="0">
+                <a:solidFill>
+                  <a:schemeClr val="bg1"/>
+                </a:solidFill>
+                <a:effectLst/>
+              </a:rPr>
+              <a:pPr/>
+              <a:t>1.8%</a:t>
+            </a:fld>
+            <a:endParaRPr lang="en-US" sz="1400" dirty="0">
+              <a:solidFill>
+                <a:schemeClr val="bg1"/>
+              </a:solidFill>
+            </a:endParaRPr>
+          </a:p>
+        </p:txBody>
+      </p:sp>
+      <p:sp>
+        <p:nvSpPr>
           <p:cNvPr id="389" name="Text Placeholder 2">
             <a:extLst>
               <a:ext uri="{FF2B5EF4-FFF2-40B4-BE49-F238E27FC236}">
@@ -8432,13 +9476,13 @@
           </p:cNvSpPr>
           <p:nvPr>
             <p:custDataLst>
-              <p:tags r:id="rId24"/>
+              <p:tags r:id="rId26"/>
             </p:custDataLst>
           </p:nvPr>
         </p:nvSpPr>
         <p:spPr bwMode="gray">
           <a:xfrm>
-            <a:off x="7858125" y="1952625"/>
+            <a:off x="7959725" y="1893888"/>
             <a:ext cx="403225" cy="192088"/>
           </a:xfrm>
           <a:prstGeom prst="rect">
@@ -8643,470 +9687,10 @@
       </p:sp>
       <p:sp>
         <p:nvSpPr>
-          <p:cNvPr id="390" name="Text Placeholder 2">
+          <p:cNvPr id="393" name="Rectangle 392">
             <a:extLst>
               <a:ext uri="{FF2B5EF4-FFF2-40B4-BE49-F238E27FC236}">
-                <a16:creationId xmlns:a16="http://schemas.microsoft.com/office/drawing/2014/main" id="{5A361C12-95C9-5F06-4553-BA298A0D4878}"/>
-              </a:ext>
-            </a:extLst>
-          </p:cNvPr>
-          <p:cNvSpPr>
-            <a:spLocks noGrp="1"/>
-          </p:cNvSpPr>
-          <p:nvPr>
-            <p:custDataLst>
-              <p:tags r:id="rId25"/>
-            </p:custDataLst>
-          </p:nvPr>
-        </p:nvSpPr>
-        <p:spPr bwMode="gray">
-          <a:xfrm>
-            <a:off x="7864475" y="1395413"/>
-            <a:ext cx="403225" cy="192088"/>
-          </a:xfrm>
-          <a:prstGeom prst="rect">
-            <a:avLst/>
-          </a:prstGeom>
-          <a:solidFill>
-            <a:srgbClr val="C30C3E"/>
-          </a:solidFill>
-          <a:ln>
-            <a:noFill/>
-          </a:ln>
-          <a:effectLst/>
-        </p:spPr>
-        <p:txBody>
-          <a:bodyPr vert="horz" wrap="none" lIns="25400" tIns="0" rIns="25400" bIns="0" numCol="1" spcCol="0" rtlCol="0" anchor="ctr" anchorCtr="0">
-            <a:noAutofit/>
-          </a:bodyPr>
-          <a:lstStyle>
-            <a:lvl1pPr marL="228600" indent="-228600" algn="l" defTabSz="914400" rtl="0" eaLnBrk="1" latinLnBrk="0" hangingPunct="1">
-              <a:lnSpc>
-                <a:spcPct val="90000"/>
-              </a:lnSpc>
-              <a:spcBef>
-                <a:spcPts val="1000"/>
-              </a:spcBef>
-              <a:buFont typeface="Arial" panose="020B0604020202020204" pitchFamily="34" charset="0"/>
-              <a:buChar char="•"/>
-              <a:defRPr sz="2800" kern="1200">
-                <a:solidFill>
-                  <a:schemeClr val="tx1"/>
-                </a:solidFill>
-                <a:latin typeface="+mn-lt"/>
-                <a:ea typeface="+mn-ea"/>
-                <a:cs typeface="+mn-cs"/>
-              </a:defRPr>
-            </a:lvl1pPr>
-            <a:lvl2pPr marL="685800" indent="-228600" algn="l" defTabSz="914400" rtl="0" eaLnBrk="1" latinLnBrk="0" hangingPunct="1">
-              <a:lnSpc>
-                <a:spcPct val="90000"/>
-              </a:lnSpc>
-              <a:spcBef>
-                <a:spcPts val="500"/>
-              </a:spcBef>
-              <a:buFont typeface="Arial" panose="020B0604020202020204" pitchFamily="34" charset="0"/>
-              <a:buChar char="•"/>
-              <a:defRPr sz="2400" kern="1200">
-                <a:solidFill>
-                  <a:schemeClr val="tx1"/>
-                </a:solidFill>
-                <a:latin typeface="+mn-lt"/>
-                <a:ea typeface="+mn-ea"/>
-                <a:cs typeface="+mn-cs"/>
-              </a:defRPr>
-            </a:lvl2pPr>
-            <a:lvl3pPr marL="1143000" indent="-228600" algn="l" defTabSz="914400" rtl="0" eaLnBrk="1" latinLnBrk="0" hangingPunct="1">
-              <a:lnSpc>
-                <a:spcPct val="90000"/>
-              </a:lnSpc>
-              <a:spcBef>
-                <a:spcPts val="500"/>
-              </a:spcBef>
-              <a:buFont typeface="Arial" panose="020B0604020202020204" pitchFamily="34" charset="0"/>
-              <a:buChar char="•"/>
-              <a:defRPr sz="2000" kern="1200">
-                <a:solidFill>
-                  <a:schemeClr val="tx1"/>
-                </a:solidFill>
-                <a:latin typeface="+mn-lt"/>
-                <a:ea typeface="+mn-ea"/>
-                <a:cs typeface="+mn-cs"/>
-              </a:defRPr>
-            </a:lvl3pPr>
-            <a:lvl4pPr marL="1600200" indent="-228600" algn="l" defTabSz="914400" rtl="0" eaLnBrk="1" latinLnBrk="0" hangingPunct="1">
-              <a:lnSpc>
-                <a:spcPct val="90000"/>
-              </a:lnSpc>
-              <a:spcBef>
-                <a:spcPts val="500"/>
-              </a:spcBef>
-              <a:buFont typeface="Arial" panose="020B0604020202020204" pitchFamily="34" charset="0"/>
-              <a:buChar char="•"/>
-              <a:defRPr sz="1800" kern="1200">
-                <a:solidFill>
-                  <a:schemeClr val="tx1"/>
-                </a:solidFill>
-                <a:latin typeface="+mn-lt"/>
-                <a:ea typeface="+mn-ea"/>
-                <a:cs typeface="+mn-cs"/>
-              </a:defRPr>
-            </a:lvl4pPr>
-            <a:lvl5pPr marL="2057400" indent="-228600" algn="l" defTabSz="914400" rtl="0" eaLnBrk="1" latinLnBrk="0" hangingPunct="1">
-              <a:lnSpc>
-                <a:spcPct val="90000"/>
-              </a:lnSpc>
-              <a:spcBef>
-                <a:spcPts val="500"/>
-              </a:spcBef>
-              <a:buFont typeface="Arial" panose="020B0604020202020204" pitchFamily="34" charset="0"/>
-              <a:buChar char="•"/>
-              <a:defRPr sz="1800" kern="1200">
-                <a:solidFill>
-                  <a:schemeClr val="tx1"/>
-                </a:solidFill>
-                <a:latin typeface="+mn-lt"/>
-                <a:ea typeface="+mn-ea"/>
-                <a:cs typeface="+mn-cs"/>
-              </a:defRPr>
-            </a:lvl5pPr>
-            <a:lvl6pPr marL="2514600" indent="-228600" algn="l" defTabSz="914400" rtl="0" eaLnBrk="1" latinLnBrk="0" hangingPunct="1">
-              <a:lnSpc>
-                <a:spcPct val="90000"/>
-              </a:lnSpc>
-              <a:spcBef>
-                <a:spcPts val="500"/>
-              </a:spcBef>
-              <a:buFont typeface="Arial" panose="020B0604020202020204" pitchFamily="34" charset="0"/>
-              <a:buChar char="•"/>
-              <a:defRPr sz="1800" kern="1200">
-                <a:solidFill>
-                  <a:schemeClr val="tx1"/>
-                </a:solidFill>
-                <a:latin typeface="+mn-lt"/>
-                <a:ea typeface="+mn-ea"/>
-                <a:cs typeface="+mn-cs"/>
-              </a:defRPr>
-            </a:lvl6pPr>
-            <a:lvl7pPr marL="2971800" indent="-228600" algn="l" defTabSz="914400" rtl="0" eaLnBrk="1" latinLnBrk="0" hangingPunct="1">
-              <a:lnSpc>
-                <a:spcPct val="90000"/>
-              </a:lnSpc>
-              <a:spcBef>
-                <a:spcPts val="500"/>
-              </a:spcBef>
-              <a:buFont typeface="Arial" panose="020B0604020202020204" pitchFamily="34" charset="0"/>
-              <a:buChar char="•"/>
-              <a:defRPr sz="1800" kern="1200">
-                <a:solidFill>
-                  <a:schemeClr val="tx1"/>
-                </a:solidFill>
-                <a:latin typeface="+mn-lt"/>
-                <a:ea typeface="+mn-ea"/>
-                <a:cs typeface="+mn-cs"/>
-              </a:defRPr>
-            </a:lvl7pPr>
-            <a:lvl8pPr marL="3429000" indent="-228600" algn="l" defTabSz="914400" rtl="0" eaLnBrk="1" latinLnBrk="0" hangingPunct="1">
-              <a:lnSpc>
-                <a:spcPct val="90000"/>
-              </a:lnSpc>
-              <a:spcBef>
-                <a:spcPts val="500"/>
-              </a:spcBef>
-              <a:buFont typeface="Arial" panose="020B0604020202020204" pitchFamily="34" charset="0"/>
-              <a:buChar char="•"/>
-              <a:defRPr sz="1800" kern="1200">
-                <a:solidFill>
-                  <a:schemeClr val="tx1"/>
-                </a:solidFill>
-                <a:latin typeface="+mn-lt"/>
-                <a:ea typeface="+mn-ea"/>
-                <a:cs typeface="+mn-cs"/>
-              </a:defRPr>
-            </a:lvl8pPr>
-            <a:lvl9pPr marL="3886200" indent="-228600" algn="l" defTabSz="914400" rtl="0" eaLnBrk="1" latinLnBrk="0" hangingPunct="1">
-              <a:lnSpc>
-                <a:spcPct val="90000"/>
-              </a:lnSpc>
-              <a:spcBef>
-                <a:spcPts val="500"/>
-              </a:spcBef>
-              <a:buFont typeface="Arial" panose="020B0604020202020204" pitchFamily="34" charset="0"/>
-              <a:buChar char="•"/>
-              <a:defRPr sz="1800" kern="1200">
-                <a:solidFill>
-                  <a:schemeClr val="tx1"/>
-                </a:solidFill>
-                <a:latin typeface="+mn-lt"/>
-                <a:ea typeface="+mn-ea"/>
-                <a:cs typeface="+mn-cs"/>
-              </a:defRPr>
-            </a:lvl9pPr>
-          </a:lstStyle>
-          <a:p>
-            <a:pPr marL="0" indent="0" algn="ctr">
-              <a:spcBef>
-                <a:spcPct val="0"/>
-              </a:spcBef>
-              <a:spcAft>
-                <a:spcPct val="0"/>
-              </a:spcAft>
-              <a:buNone/>
-            </a:pPr>
-            <a:fld id="{776F9243-2302-4A0A-BAAC-07467FE57D56}" type="datetime'1''''.7''''''''''''''''''''''''''''''''''''''''''%'''">
-              <a:rPr lang="en-US" altLang="en-US" sz="1400" smtClean="0">
-                <a:solidFill>
-                  <a:schemeClr val="bg1"/>
-                </a:solidFill>
-                <a:effectLst/>
-              </a:rPr>
-              <a:pPr/>
-              <a:t>1.7%</a:t>
-            </a:fld>
-            <a:endParaRPr lang="en-US" sz="1400" dirty="0">
-              <a:solidFill>
-                <a:schemeClr val="bg1"/>
-              </a:solidFill>
-            </a:endParaRPr>
-          </a:p>
-        </p:txBody>
-      </p:sp>
-      <p:sp>
-        <p:nvSpPr>
-          <p:cNvPr id="391" name="Text Placeholder 2">
-            <a:extLst>
-              <a:ext uri="{FF2B5EF4-FFF2-40B4-BE49-F238E27FC236}">
-                <a16:creationId xmlns:a16="http://schemas.microsoft.com/office/drawing/2014/main" id="{9D0C0292-A91B-A51A-422D-523D00681132}"/>
-              </a:ext>
-            </a:extLst>
-          </p:cNvPr>
-          <p:cNvSpPr>
-            <a:spLocks noGrp="1"/>
-          </p:cNvSpPr>
-          <p:nvPr>
-            <p:custDataLst>
-              <p:tags r:id="rId26"/>
-            </p:custDataLst>
-          </p:nvPr>
-        </p:nvSpPr>
-        <p:spPr bwMode="gray">
-          <a:xfrm>
-            <a:off x="8069263" y="2144713"/>
-            <a:ext cx="403225" cy="192088"/>
-          </a:xfrm>
-          <a:prstGeom prst="rect">
-            <a:avLst/>
-          </a:prstGeom>
-          <a:solidFill>
-            <a:schemeClr val="accent6"/>
-          </a:solidFill>
-          <a:ln>
-            <a:noFill/>
-          </a:ln>
-          <a:effectLst/>
-        </p:spPr>
-        <p:txBody>
-          <a:bodyPr vert="horz" wrap="none" lIns="25400" tIns="0" rIns="25400" bIns="0" numCol="1" spcCol="0" rtlCol="0" anchor="ctr" anchorCtr="0">
-            <a:noAutofit/>
-          </a:bodyPr>
-          <a:lstStyle>
-            <a:lvl1pPr marL="228600" indent="-228600" algn="l" defTabSz="914400" rtl="0" eaLnBrk="1" latinLnBrk="0" hangingPunct="1">
-              <a:lnSpc>
-                <a:spcPct val="90000"/>
-              </a:lnSpc>
-              <a:spcBef>
-                <a:spcPts val="1000"/>
-              </a:spcBef>
-              <a:buFont typeface="Arial" panose="020B0604020202020204" pitchFamily="34" charset="0"/>
-              <a:buChar char="•"/>
-              <a:defRPr sz="2800" kern="1200">
-                <a:solidFill>
-                  <a:schemeClr val="tx1"/>
-                </a:solidFill>
-                <a:latin typeface="+mn-lt"/>
-                <a:ea typeface="+mn-ea"/>
-                <a:cs typeface="+mn-cs"/>
-              </a:defRPr>
-            </a:lvl1pPr>
-            <a:lvl2pPr marL="685800" indent="-228600" algn="l" defTabSz="914400" rtl="0" eaLnBrk="1" latinLnBrk="0" hangingPunct="1">
-              <a:lnSpc>
-                <a:spcPct val="90000"/>
-              </a:lnSpc>
-              <a:spcBef>
-                <a:spcPts val="500"/>
-              </a:spcBef>
-              <a:buFont typeface="Arial" panose="020B0604020202020204" pitchFamily="34" charset="0"/>
-              <a:buChar char="•"/>
-              <a:defRPr sz="2400" kern="1200">
-                <a:solidFill>
-                  <a:schemeClr val="tx1"/>
-                </a:solidFill>
-                <a:latin typeface="+mn-lt"/>
-                <a:ea typeface="+mn-ea"/>
-                <a:cs typeface="+mn-cs"/>
-              </a:defRPr>
-            </a:lvl2pPr>
-            <a:lvl3pPr marL="1143000" indent="-228600" algn="l" defTabSz="914400" rtl="0" eaLnBrk="1" latinLnBrk="0" hangingPunct="1">
-              <a:lnSpc>
-                <a:spcPct val="90000"/>
-              </a:lnSpc>
-              <a:spcBef>
-                <a:spcPts val="500"/>
-              </a:spcBef>
-              <a:buFont typeface="Arial" panose="020B0604020202020204" pitchFamily="34" charset="0"/>
-              <a:buChar char="•"/>
-              <a:defRPr sz="2000" kern="1200">
-                <a:solidFill>
-                  <a:schemeClr val="tx1"/>
-                </a:solidFill>
-                <a:latin typeface="+mn-lt"/>
-                <a:ea typeface="+mn-ea"/>
-                <a:cs typeface="+mn-cs"/>
-              </a:defRPr>
-            </a:lvl3pPr>
-            <a:lvl4pPr marL="1600200" indent="-228600" algn="l" defTabSz="914400" rtl="0" eaLnBrk="1" latinLnBrk="0" hangingPunct="1">
-              <a:lnSpc>
-                <a:spcPct val="90000"/>
-              </a:lnSpc>
-              <a:spcBef>
-                <a:spcPts val="500"/>
-              </a:spcBef>
-              <a:buFont typeface="Arial" panose="020B0604020202020204" pitchFamily="34" charset="0"/>
-              <a:buChar char="•"/>
-              <a:defRPr sz="1800" kern="1200">
-                <a:solidFill>
-                  <a:schemeClr val="tx1"/>
-                </a:solidFill>
-                <a:latin typeface="+mn-lt"/>
-                <a:ea typeface="+mn-ea"/>
-                <a:cs typeface="+mn-cs"/>
-              </a:defRPr>
-            </a:lvl4pPr>
-            <a:lvl5pPr marL="2057400" indent="-228600" algn="l" defTabSz="914400" rtl="0" eaLnBrk="1" latinLnBrk="0" hangingPunct="1">
-              <a:lnSpc>
-                <a:spcPct val="90000"/>
-              </a:lnSpc>
-              <a:spcBef>
-                <a:spcPts val="500"/>
-              </a:spcBef>
-              <a:buFont typeface="Arial" panose="020B0604020202020204" pitchFamily="34" charset="0"/>
-              <a:buChar char="•"/>
-              <a:defRPr sz="1800" kern="1200">
-                <a:solidFill>
-                  <a:schemeClr val="tx1"/>
-                </a:solidFill>
-                <a:latin typeface="+mn-lt"/>
-                <a:ea typeface="+mn-ea"/>
-                <a:cs typeface="+mn-cs"/>
-              </a:defRPr>
-            </a:lvl5pPr>
-            <a:lvl6pPr marL="2514600" indent="-228600" algn="l" defTabSz="914400" rtl="0" eaLnBrk="1" latinLnBrk="0" hangingPunct="1">
-              <a:lnSpc>
-                <a:spcPct val="90000"/>
-              </a:lnSpc>
-              <a:spcBef>
-                <a:spcPts val="500"/>
-              </a:spcBef>
-              <a:buFont typeface="Arial" panose="020B0604020202020204" pitchFamily="34" charset="0"/>
-              <a:buChar char="•"/>
-              <a:defRPr sz="1800" kern="1200">
-                <a:solidFill>
-                  <a:schemeClr val="tx1"/>
-                </a:solidFill>
-                <a:latin typeface="+mn-lt"/>
-                <a:ea typeface="+mn-ea"/>
-                <a:cs typeface="+mn-cs"/>
-              </a:defRPr>
-            </a:lvl6pPr>
-            <a:lvl7pPr marL="2971800" indent="-228600" algn="l" defTabSz="914400" rtl="0" eaLnBrk="1" latinLnBrk="0" hangingPunct="1">
-              <a:lnSpc>
-                <a:spcPct val="90000"/>
-              </a:lnSpc>
-              <a:spcBef>
-                <a:spcPts val="500"/>
-              </a:spcBef>
-              <a:buFont typeface="Arial" panose="020B0604020202020204" pitchFamily="34" charset="0"/>
-              <a:buChar char="•"/>
-              <a:defRPr sz="1800" kern="1200">
-                <a:solidFill>
-                  <a:schemeClr val="tx1"/>
-                </a:solidFill>
-                <a:latin typeface="+mn-lt"/>
-                <a:ea typeface="+mn-ea"/>
-                <a:cs typeface="+mn-cs"/>
-              </a:defRPr>
-            </a:lvl7pPr>
-            <a:lvl8pPr marL="3429000" indent="-228600" algn="l" defTabSz="914400" rtl="0" eaLnBrk="1" latinLnBrk="0" hangingPunct="1">
-              <a:lnSpc>
-                <a:spcPct val="90000"/>
-              </a:lnSpc>
-              <a:spcBef>
-                <a:spcPts val="500"/>
-              </a:spcBef>
-              <a:buFont typeface="Arial" panose="020B0604020202020204" pitchFamily="34" charset="0"/>
-              <a:buChar char="•"/>
-              <a:defRPr sz="1800" kern="1200">
-                <a:solidFill>
-                  <a:schemeClr val="tx1"/>
-                </a:solidFill>
-                <a:latin typeface="+mn-lt"/>
-                <a:ea typeface="+mn-ea"/>
-                <a:cs typeface="+mn-cs"/>
-              </a:defRPr>
-            </a:lvl8pPr>
-            <a:lvl9pPr marL="3886200" indent="-228600" algn="l" defTabSz="914400" rtl="0" eaLnBrk="1" latinLnBrk="0" hangingPunct="1">
-              <a:lnSpc>
-                <a:spcPct val="90000"/>
-              </a:lnSpc>
-              <a:spcBef>
-                <a:spcPts val="500"/>
-              </a:spcBef>
-              <a:buFont typeface="Arial" panose="020B0604020202020204" pitchFamily="34" charset="0"/>
-              <a:buChar char="•"/>
-              <a:defRPr sz="1800" kern="1200">
-                <a:solidFill>
-                  <a:schemeClr val="tx1"/>
-                </a:solidFill>
-                <a:latin typeface="+mn-lt"/>
-                <a:ea typeface="+mn-ea"/>
-                <a:cs typeface="+mn-cs"/>
-              </a:defRPr>
-            </a:lvl9pPr>
-          </a:lstStyle>
-          <a:p>
-            <a:pPr marL="0" indent="0" algn="ctr">
-              <a:spcBef>
-                <a:spcPct val="0"/>
-              </a:spcBef>
-              <a:spcAft>
-                <a:spcPct val="0"/>
-              </a:spcAft>
-              <a:buNone/>
-            </a:pPr>
-            <a:fld id="{64105A3C-3918-4CA9-B467-72F78DA07DBB}" type="datetime'''''''''''''''''''''1''''''.''8''''%'''">
-              <a:rPr lang="en-US" altLang="en-US" sz="1400" smtClean="0">
-                <a:solidFill>
-                  <a:schemeClr val="bg1"/>
-                </a:solidFill>
-                <a:effectLst/>
-              </a:rPr>
-              <a:pPr/>
-              <a:t>1.8%</a:t>
-            </a:fld>
-            <a:endParaRPr lang="en-US" sz="1400" dirty="0">
-              <a:solidFill>
-                <a:schemeClr val="bg1"/>
-              </a:solidFill>
-            </a:endParaRPr>
-          </a:p>
-        </p:txBody>
-      </p:sp>
-      <p:sp>
-        <p:nvSpPr>
-          <p:cNvPr id="394" name="Rectangle 393">
-            <a:extLst>
-              <a:ext uri="{FF2B5EF4-FFF2-40B4-BE49-F238E27FC236}">
-                <a16:creationId xmlns:a16="http://schemas.microsoft.com/office/drawing/2014/main" id="{6862160E-83C3-739C-81C9-3F8FCCDA48C6}"/>
+                <a16:creationId xmlns:a16="http://schemas.microsoft.com/office/drawing/2014/main" id="{8E7815A4-5393-807F-919E-046A6C31D741}"/>
               </a:ext>
             </a:extLst>
           </p:cNvPr>
@@ -9119,159 +9703,7 @@
         </p:nvSpPr>
         <p:spPr bwMode="auto">
           <a:xfrm>
-            <a:off x="10207625" y="1906588"/>
-            <a:ext cx="250825" cy="187325"/>
-          </a:xfrm>
-          <a:prstGeom prst="rect">
-            <a:avLst/>
-          </a:prstGeom>
-          <a:solidFill>
-            <a:schemeClr val="accent4"/>
-          </a:solidFill>
-          <a:ln w="12700" cap="flat" cmpd="sng" algn="ctr">
-            <a:noFill/>
-            <a:prstDash val="solid"/>
-            <a:miter lim="800000"/>
-            <a:headEnd type="none" w="med" len="med"/>
-            <a:tailEnd type="none" w="med" len="med"/>
-          </a:ln>
-          <a:effectLst/>
-          <a:extLst>
-            <a:ext uri="{91240B29-F687-4F45-9708-019B960494DF}">
-              <a14:hiddenLine xmlns:a14="http://schemas.microsoft.com/office/drawing/2010/main" w="12700" cap="flat" cmpd="sng" algn="ctr">
-                <a:solidFill>
-                  <a:schemeClr val="accent1">
-                    <a:shade val="50000"/>
-                  </a:schemeClr>
-                </a:solidFill>
-                <a:prstDash val="solid"/>
-                <a:miter lim="800000"/>
-                <a:headEnd type="none" w="med" len="med"/>
-                <a:tailEnd type="none" w="med" len="med"/>
-              </a14:hiddenLine>
-            </a:ext>
-          </a:extLst>
-        </p:spPr>
-        <p:style>
-          <a:lnRef idx="2">
-            <a:schemeClr val="accent1">
-              <a:shade val="50000"/>
-            </a:schemeClr>
-          </a:lnRef>
-          <a:fillRef idx="1">
-            <a:schemeClr val="accent1"/>
-          </a:fillRef>
-          <a:effectRef idx="0">
-            <a:schemeClr val="accent1"/>
-          </a:effectRef>
-          <a:fontRef idx="minor">
-            <a:schemeClr val="lt1"/>
-          </a:fontRef>
-        </p:style>
-        <p:txBody>
-          <a:bodyPr rtlCol="0" anchor="ctr"/>
-          <a:lstStyle/>
-          <a:p>
-            <a:pPr algn="ctr"/>
-            <a:endParaRPr lang="en-US"/>
-          </a:p>
-        </p:txBody>
-      </p:sp>
-      <p:sp>
-        <p:nvSpPr>
-          <p:cNvPr id="392" name="Rectangle 391">
-            <a:extLst>
-              <a:ext uri="{FF2B5EF4-FFF2-40B4-BE49-F238E27FC236}">
-                <a16:creationId xmlns:a16="http://schemas.microsoft.com/office/drawing/2014/main" id="{AC2C9A98-FE6C-C979-12CC-1FDE567E04C6}"/>
-              </a:ext>
-            </a:extLst>
-          </p:cNvPr>
-          <p:cNvSpPr/>
-          <p:nvPr>
-            <p:custDataLst>
-              <p:tags r:id="rId28"/>
-            </p:custDataLst>
-          </p:nvPr>
-        </p:nvSpPr>
-        <p:spPr bwMode="auto">
-          <a:xfrm>
-            <a:off x="10207625" y="1398588"/>
-            <a:ext cx="250825" cy="187325"/>
-          </a:xfrm>
-          <a:prstGeom prst="rect">
-            <a:avLst/>
-          </a:prstGeom>
-          <a:solidFill>
-            <a:schemeClr val="accent6"/>
-          </a:solidFill>
-          <a:ln w="12700" cap="flat" cmpd="sng" algn="ctr">
-            <a:noFill/>
-            <a:prstDash val="solid"/>
-            <a:miter lim="800000"/>
-            <a:headEnd type="none" w="med" len="med"/>
-            <a:tailEnd type="none" w="med" len="med"/>
-          </a:ln>
-          <a:effectLst/>
-          <a:extLst>
-            <a:ext uri="{91240B29-F687-4F45-9708-019B960494DF}">
-              <a14:hiddenLine xmlns:a14="http://schemas.microsoft.com/office/drawing/2010/main" w="12700" cap="flat" cmpd="sng" algn="ctr">
-                <a:solidFill>
-                  <a:schemeClr val="accent1">
-                    <a:shade val="50000"/>
-                  </a:schemeClr>
-                </a:solidFill>
-                <a:prstDash val="solid"/>
-                <a:miter lim="800000"/>
-                <a:headEnd type="none" w="med" len="med"/>
-                <a:tailEnd type="none" w="med" len="med"/>
-              </a14:hiddenLine>
-            </a:ext>
-          </a:extLst>
-        </p:spPr>
-        <p:style>
-          <a:lnRef idx="2">
-            <a:schemeClr val="accent1">
-              <a:shade val="50000"/>
-            </a:schemeClr>
-          </a:lnRef>
-          <a:fillRef idx="1">
-            <a:schemeClr val="accent1"/>
-          </a:fillRef>
-          <a:effectRef idx="0">
-            <a:schemeClr val="accent1"/>
-          </a:effectRef>
-          <a:fontRef idx="minor">
-            <a:schemeClr val="lt1"/>
-          </a:fontRef>
-        </p:style>
-        <p:txBody>
-          <a:bodyPr rtlCol="0" anchor="ctr"/>
-          <a:lstStyle/>
-          <a:p>
-            <a:pPr algn="ctr"/>
-            <a:endParaRPr lang="en-US"/>
-          </a:p>
-        </p:txBody>
-      </p:sp>
-      <p:sp>
-        <p:nvSpPr>
-          <p:cNvPr id="393" name="Rectangle 392">
-            <a:extLst>
-              <a:ext uri="{FF2B5EF4-FFF2-40B4-BE49-F238E27FC236}">
-                <a16:creationId xmlns:a16="http://schemas.microsoft.com/office/drawing/2014/main" id="{8E7815A4-5393-807F-919E-046A6C31D741}"/>
-              </a:ext>
-            </a:extLst>
-          </p:cNvPr>
-          <p:cNvSpPr/>
-          <p:nvPr>
-            <p:custDataLst>
-              <p:tags r:id="rId29"/>
-            </p:custDataLst>
-          </p:nvPr>
-        </p:nvSpPr>
-        <p:spPr bwMode="auto">
-          <a:xfrm>
-            <a:off x="10207625" y="1652588"/>
+            <a:off x="10309225" y="1652588"/>
             <a:ext cx="250825" cy="187325"/>
           </a:xfrm>
           <a:prstGeom prst="rect">
@@ -9316,30 +9748,30 @@
       </p:sp>
       <p:sp>
         <p:nvSpPr>
-          <p:cNvPr id="395" name="Rectangle 394">
+          <p:cNvPr id="392" name="Rectangle 391">
             <a:extLst>
               <a:ext uri="{FF2B5EF4-FFF2-40B4-BE49-F238E27FC236}">
-                <a16:creationId xmlns:a16="http://schemas.microsoft.com/office/drawing/2014/main" id="{57391670-30A4-EAC2-32E2-D9315693A9AC}"/>
+                <a16:creationId xmlns:a16="http://schemas.microsoft.com/office/drawing/2014/main" id="{AC2C9A98-FE6C-C979-12CC-1FDE567E04C6}"/>
               </a:ext>
             </a:extLst>
           </p:cNvPr>
           <p:cNvSpPr/>
           <p:nvPr>
             <p:custDataLst>
-              <p:tags r:id="rId30"/>
+              <p:tags r:id="rId28"/>
             </p:custDataLst>
           </p:nvPr>
         </p:nvSpPr>
         <p:spPr bwMode="auto">
           <a:xfrm>
-            <a:off x="10207625" y="2160588"/>
+            <a:off x="10309225" y="1398588"/>
             <a:ext cx="250825" cy="187325"/>
           </a:xfrm>
           <a:prstGeom prst="rect">
             <a:avLst/>
           </a:prstGeom>
           <a:solidFill>
-            <a:schemeClr val="accent3"/>
+            <a:schemeClr val="accent6"/>
           </a:solidFill>
           <a:ln w="12700" cap="flat" cmpd="sng" algn="ctr">
             <a:noFill/>
@@ -9392,30 +9824,30 @@
       </p:sp>
       <p:sp>
         <p:nvSpPr>
-          <p:cNvPr id="396" name="Rectangle 395">
+          <p:cNvPr id="394" name="Rectangle 393">
             <a:extLst>
               <a:ext uri="{FF2B5EF4-FFF2-40B4-BE49-F238E27FC236}">
-                <a16:creationId xmlns:a16="http://schemas.microsoft.com/office/drawing/2014/main" id="{7E6EDAA4-3319-9A94-5A27-347D4BF81F7F}"/>
+                <a16:creationId xmlns:a16="http://schemas.microsoft.com/office/drawing/2014/main" id="{6862160E-83C3-739C-81C9-3F8FCCDA48C6}"/>
               </a:ext>
             </a:extLst>
           </p:cNvPr>
           <p:cNvSpPr/>
           <p:nvPr>
             <p:custDataLst>
-              <p:tags r:id="rId31"/>
+              <p:tags r:id="rId29"/>
             </p:custDataLst>
           </p:nvPr>
         </p:nvSpPr>
         <p:spPr bwMode="auto">
           <a:xfrm>
-            <a:off x="10207625" y="2414588"/>
+            <a:off x="10309225" y="1906588"/>
             <a:ext cx="250825" cy="187325"/>
           </a:xfrm>
           <a:prstGeom prst="rect">
             <a:avLst/>
           </a:prstGeom>
           <a:solidFill>
-            <a:schemeClr val="accent2"/>
+            <a:schemeClr val="accent4"/>
           </a:solidFill>
           <a:ln w="12700" cap="flat" cmpd="sng" algn="ctr">
             <a:noFill/>
@@ -9468,30 +9900,30 @@
       </p:sp>
       <p:sp>
         <p:nvSpPr>
-          <p:cNvPr id="397" name="Rectangle 396">
+          <p:cNvPr id="395" name="Rectangle 394">
             <a:extLst>
               <a:ext uri="{FF2B5EF4-FFF2-40B4-BE49-F238E27FC236}">
-                <a16:creationId xmlns:a16="http://schemas.microsoft.com/office/drawing/2014/main" id="{8F139A8E-8B69-16D8-FF4D-4485EEEA81BF}"/>
+                <a16:creationId xmlns:a16="http://schemas.microsoft.com/office/drawing/2014/main" id="{57391670-30A4-EAC2-32E2-D9315693A9AC}"/>
               </a:ext>
             </a:extLst>
           </p:cNvPr>
           <p:cNvSpPr/>
           <p:nvPr>
             <p:custDataLst>
-              <p:tags r:id="rId32"/>
+              <p:tags r:id="rId30"/>
             </p:custDataLst>
           </p:nvPr>
         </p:nvSpPr>
         <p:spPr bwMode="auto">
           <a:xfrm>
-            <a:off x="10207625" y="2668588"/>
+            <a:off x="10309225" y="2160588"/>
             <a:ext cx="250825" cy="187325"/>
           </a:xfrm>
           <a:prstGeom prst="rect">
             <a:avLst/>
           </a:prstGeom>
           <a:solidFill>
-            <a:schemeClr val="accent1"/>
+            <a:schemeClr val="accent3"/>
           </a:solidFill>
           <a:ln w="12700" cap="flat" cmpd="sng" algn="ctr">
             <a:noFill/>
@@ -9544,6 +9976,158 @@
       </p:sp>
       <p:sp>
         <p:nvSpPr>
+          <p:cNvPr id="396" name="Rectangle 395">
+            <a:extLst>
+              <a:ext uri="{FF2B5EF4-FFF2-40B4-BE49-F238E27FC236}">
+                <a16:creationId xmlns:a16="http://schemas.microsoft.com/office/drawing/2014/main" id="{7E6EDAA4-3319-9A94-5A27-347D4BF81F7F}"/>
+              </a:ext>
+            </a:extLst>
+          </p:cNvPr>
+          <p:cNvSpPr/>
+          <p:nvPr>
+            <p:custDataLst>
+              <p:tags r:id="rId31"/>
+            </p:custDataLst>
+          </p:nvPr>
+        </p:nvSpPr>
+        <p:spPr bwMode="auto">
+          <a:xfrm>
+            <a:off x="10309225" y="2414588"/>
+            <a:ext cx="250825" cy="187325"/>
+          </a:xfrm>
+          <a:prstGeom prst="rect">
+            <a:avLst/>
+          </a:prstGeom>
+          <a:solidFill>
+            <a:schemeClr val="accent2"/>
+          </a:solidFill>
+          <a:ln w="12700" cap="flat" cmpd="sng" algn="ctr">
+            <a:noFill/>
+            <a:prstDash val="solid"/>
+            <a:miter lim="800000"/>
+            <a:headEnd type="none" w="med" len="med"/>
+            <a:tailEnd type="none" w="med" len="med"/>
+          </a:ln>
+          <a:effectLst/>
+          <a:extLst>
+            <a:ext uri="{91240B29-F687-4F45-9708-019B960494DF}">
+              <a14:hiddenLine xmlns:a14="http://schemas.microsoft.com/office/drawing/2010/main" w="12700" cap="flat" cmpd="sng" algn="ctr">
+                <a:solidFill>
+                  <a:schemeClr val="accent1">
+                    <a:shade val="50000"/>
+                  </a:schemeClr>
+                </a:solidFill>
+                <a:prstDash val="solid"/>
+                <a:miter lim="800000"/>
+                <a:headEnd type="none" w="med" len="med"/>
+                <a:tailEnd type="none" w="med" len="med"/>
+              </a14:hiddenLine>
+            </a:ext>
+          </a:extLst>
+        </p:spPr>
+        <p:style>
+          <a:lnRef idx="2">
+            <a:schemeClr val="accent1">
+              <a:shade val="50000"/>
+            </a:schemeClr>
+          </a:lnRef>
+          <a:fillRef idx="1">
+            <a:schemeClr val="accent1"/>
+          </a:fillRef>
+          <a:effectRef idx="0">
+            <a:schemeClr val="accent1"/>
+          </a:effectRef>
+          <a:fontRef idx="minor">
+            <a:schemeClr val="lt1"/>
+          </a:fontRef>
+        </p:style>
+        <p:txBody>
+          <a:bodyPr rtlCol="0" anchor="ctr"/>
+          <a:lstStyle/>
+          <a:p>
+            <a:pPr algn="ctr"/>
+            <a:endParaRPr lang="en-US"/>
+          </a:p>
+        </p:txBody>
+      </p:sp>
+      <p:sp>
+        <p:nvSpPr>
+          <p:cNvPr id="397" name="Rectangle 396">
+            <a:extLst>
+              <a:ext uri="{FF2B5EF4-FFF2-40B4-BE49-F238E27FC236}">
+                <a16:creationId xmlns:a16="http://schemas.microsoft.com/office/drawing/2014/main" id="{8F139A8E-8B69-16D8-FF4D-4485EEEA81BF}"/>
+              </a:ext>
+            </a:extLst>
+          </p:cNvPr>
+          <p:cNvSpPr/>
+          <p:nvPr>
+            <p:custDataLst>
+              <p:tags r:id="rId32"/>
+            </p:custDataLst>
+          </p:nvPr>
+        </p:nvSpPr>
+        <p:spPr bwMode="auto">
+          <a:xfrm>
+            <a:off x="10309225" y="2668588"/>
+            <a:ext cx="250825" cy="187325"/>
+          </a:xfrm>
+          <a:prstGeom prst="rect">
+            <a:avLst/>
+          </a:prstGeom>
+          <a:solidFill>
+            <a:schemeClr val="accent1"/>
+          </a:solidFill>
+          <a:ln w="12700" cap="flat" cmpd="sng" algn="ctr">
+            <a:noFill/>
+            <a:prstDash val="solid"/>
+            <a:miter lim="800000"/>
+            <a:headEnd type="none" w="med" len="med"/>
+            <a:tailEnd type="none" w="med" len="med"/>
+          </a:ln>
+          <a:effectLst/>
+          <a:extLst>
+            <a:ext uri="{91240B29-F687-4F45-9708-019B960494DF}">
+              <a14:hiddenLine xmlns:a14="http://schemas.microsoft.com/office/drawing/2010/main" w="12700" cap="flat" cmpd="sng" algn="ctr">
+                <a:solidFill>
+                  <a:schemeClr val="accent1">
+                    <a:shade val="50000"/>
+                  </a:schemeClr>
+                </a:solidFill>
+                <a:prstDash val="solid"/>
+                <a:miter lim="800000"/>
+                <a:headEnd type="none" w="med" len="med"/>
+                <a:tailEnd type="none" w="med" len="med"/>
+              </a14:hiddenLine>
+            </a:ext>
+          </a:extLst>
+        </p:spPr>
+        <p:style>
+          <a:lnRef idx="2">
+            <a:schemeClr val="accent1">
+              <a:shade val="50000"/>
+            </a:schemeClr>
+          </a:lnRef>
+          <a:fillRef idx="1">
+            <a:schemeClr val="accent1"/>
+          </a:fillRef>
+          <a:effectRef idx="0">
+            <a:schemeClr val="accent1"/>
+          </a:effectRef>
+          <a:fontRef idx="minor">
+            <a:schemeClr val="lt1"/>
+          </a:fontRef>
+        </p:style>
+        <p:txBody>
+          <a:bodyPr rtlCol="0" anchor="ctr"/>
+          <a:lstStyle/>
+          <a:p>
+            <a:pPr algn="ctr"/>
+            <a:endParaRPr lang="en-US"/>
+          </a:p>
+        </p:txBody>
+      </p:sp>
+      <p:sp>
+        <p:nvSpPr>
           <p:cNvPr id="398" name="Text Placeholder 2">
             <a:extLst>
               <a:ext uri="{FF2B5EF4-FFF2-40B4-BE49-F238E27FC236}">
@@ -9562,7 +10146,7 @@
         </p:nvSpPr>
         <p:spPr bwMode="auto">
           <a:xfrm>
-            <a:off x="10509250" y="1409700"/>
+            <a:off x="10610850" y="1409700"/>
             <a:ext cx="1627188" cy="192088"/>
           </a:xfrm>
           <a:prstGeom prst="rect">
@@ -9790,7 +10374,7 @@
         </p:nvSpPr>
         <p:spPr bwMode="auto">
           <a:xfrm>
-            <a:off x="10509250" y="1663700"/>
+            <a:off x="10610850" y="1663700"/>
             <a:ext cx="955675" cy="192088"/>
           </a:xfrm>
           <a:prstGeom prst="rect">
@@ -10018,7 +10602,7 @@
         </p:nvSpPr>
         <p:spPr bwMode="auto">
           <a:xfrm>
-            <a:off x="10509250" y="1917700"/>
+            <a:off x="10610850" y="1917700"/>
             <a:ext cx="863600" cy="192088"/>
           </a:xfrm>
           <a:prstGeom prst="rect">
@@ -10246,7 +10830,7 @@
         </p:nvSpPr>
         <p:spPr bwMode="auto">
           <a:xfrm>
-            <a:off x="10509250" y="2171700"/>
+            <a:off x="10610850" y="2171700"/>
             <a:ext cx="1089025" cy="192088"/>
           </a:xfrm>
           <a:prstGeom prst="rect">
@@ -10474,7 +11058,7 @@
         </p:nvSpPr>
         <p:spPr bwMode="auto">
           <a:xfrm>
-            <a:off x="10509250" y="2425700"/>
+            <a:off x="10610850" y="2425700"/>
             <a:ext cx="974725" cy="192088"/>
           </a:xfrm>
           <a:prstGeom prst="rect">
@@ -10702,7 +11286,7 @@
         </p:nvSpPr>
         <p:spPr bwMode="auto">
           <a:xfrm>
-            <a:off x="10509250" y="2679700"/>
+            <a:off x="10610850" y="2679700"/>
             <a:ext cx="1917700" cy="192088"/>
           </a:xfrm>
           <a:prstGeom prst="rect">
@@ -10930,7 +11514,7 @@
         </p:nvSpPr>
         <p:spPr bwMode="auto">
           <a:xfrm>
-            <a:off x="8012113" y="2870200"/>
+            <a:off x="8113713" y="2870200"/>
             <a:ext cx="600075" cy="193675"/>
           </a:xfrm>
           <a:prstGeom prst="rect">
@@ -11176,7 +11760,7 @@
 
 <file path=ppt/tags/tag11.xml><?xml version="1.0" encoding="utf-8"?>
 <p:tagLst xmlns:a="http://schemas.openxmlformats.org/drawingml/2006/main" xmlns:r="http://schemas.openxmlformats.org/officeDocument/2006/relationships" xmlns:p="http://schemas.openxmlformats.org/presentationml/2006/main">
-  <p:tag name="THINKCELLSHAPEDONOTDELETE" val="tvdPJ2BK_KDRRTG8YJTFUtw"/>
+  <p:tag name="THINKCELLSHAPEDONOTDELETE" val="tD9L9gK2CGfz0AdCUjf4mbQ"/>
 </p:tagLst>
 </file>
 
@@ -11188,13 +11772,13 @@
 
 <file path=ppt/tags/tag13.xml><?xml version="1.0" encoding="utf-8"?>
 <p:tagLst xmlns:a="http://schemas.openxmlformats.org/drawingml/2006/main" xmlns:r="http://schemas.openxmlformats.org/officeDocument/2006/relationships" xmlns:p="http://schemas.openxmlformats.org/presentationml/2006/main">
-  <p:tag name="THINKCELLSHAPEDONOTDELETE" val="tD9L9gK2CGfz0AdCUjf4mbQ"/>
+  <p:tag name="THINKCELLSHAPEDONOTDELETE" val="tFkxyhVvpj08rEHZ6v406Qw"/>
 </p:tagLst>
 </file>
 
 <file path=ppt/tags/tag14.xml><?xml version="1.0" encoding="utf-8"?>
 <p:tagLst xmlns:a="http://schemas.openxmlformats.org/drawingml/2006/main" xmlns:r="http://schemas.openxmlformats.org/officeDocument/2006/relationships" xmlns:p="http://schemas.openxmlformats.org/presentationml/2006/main">
-  <p:tag name="THINKCELLSHAPEDONOTDELETE" val="tFkxyhVvpj08rEHZ6v406Qw"/>
+  <p:tag name="THINKCELLSHAPEDONOTDELETE" val="tvdPJ2BK_KDRRTG8YJTFUtw"/>
 </p:tagLst>
 </file>
 
@@ -11212,7 +11796,7 @@
 
 <file path=ppt/tags/tag17.xml><?xml version="1.0" encoding="utf-8"?>
 <p:tagLst xmlns:a="http://schemas.openxmlformats.org/drawingml/2006/main" xmlns:r="http://schemas.openxmlformats.org/officeDocument/2006/relationships" xmlns:p="http://schemas.openxmlformats.org/presentationml/2006/main">
-  <p:tag name="THINKCELLSHAPEDONOTDELETE" val="tyZE1tDnQd7FxTbiKg7kkZA"/>
+  <p:tag name="THINKCELLSHAPEDONOTDELETE" val="tzZ5CvW_zle8fF_ZRmVF2CA"/>
 </p:tagLst>
 </file>
 
@@ -11224,7 +11808,7 @@
 
 <file path=ppt/tags/tag19.xml><?xml version="1.0" encoding="utf-8"?>
 <p:tagLst xmlns:a="http://schemas.openxmlformats.org/drawingml/2006/main" xmlns:r="http://schemas.openxmlformats.org/officeDocument/2006/relationships" xmlns:p="http://schemas.openxmlformats.org/presentationml/2006/main">
-  <p:tag name="THINKCELLSHAPEDONOTDELETE" val="tzZ5CvW_zle8fF_ZRmVF2CA"/>
+  <p:tag name="THINKCELLSHAPEDONOTDELETE" val="tktWMyF0DecPPTK46OiubkA"/>
 </p:tagLst>
 </file>
 
@@ -11236,19 +11820,19 @@
 
 <file path=ppt/tags/tag20.xml><?xml version="1.0" encoding="utf-8"?>
 <p:tagLst xmlns:a="http://schemas.openxmlformats.org/drawingml/2006/main" xmlns:r="http://schemas.openxmlformats.org/officeDocument/2006/relationships" xmlns:p="http://schemas.openxmlformats.org/presentationml/2006/main">
-  <p:tag name="THINKCELLSHAPEDONOTDELETE" val="tBbNqyGvHEuy8wY.kgnWKLg"/>
+  <p:tag name="THINKCELLSHAPEDONOTDELETE" val="tyln1E3o3AIWKRuquQTi6xg"/>
 </p:tagLst>
 </file>
 
 <file path=ppt/tags/tag21.xml><?xml version="1.0" encoding="utf-8"?>
 <p:tagLst xmlns:a="http://schemas.openxmlformats.org/drawingml/2006/main" xmlns:r="http://schemas.openxmlformats.org/officeDocument/2006/relationships" xmlns:p="http://schemas.openxmlformats.org/presentationml/2006/main">
-  <p:tag name="THINKCELLSHAPEDONOTDELETE" val="tktWMyF0DecPPTK46OiubkA"/>
+  <p:tag name="THINKCELLSHAPEDONOTDELETE" val="tyZE1tDnQd7FxTbiKg7kkZA"/>
 </p:tagLst>
 </file>
 
 <file path=ppt/tags/tag22.xml><?xml version="1.0" encoding="utf-8"?>
 <p:tagLst xmlns:a="http://schemas.openxmlformats.org/drawingml/2006/main" xmlns:r="http://schemas.openxmlformats.org/officeDocument/2006/relationships" xmlns:p="http://schemas.openxmlformats.org/presentationml/2006/main">
-  <p:tag name="THINKCELLSHAPEDONOTDELETE" val="tyln1E3o3AIWKRuquQTi6xg"/>
+  <p:tag name="THINKCELLSHAPEDONOTDELETE" val="tBbNqyGvHEuy8wY.kgnWKLg"/>
 </p:tagLst>
 </file>
 
@@ -11266,31 +11850,31 @@
 
 <file path=ppt/tags/tag25.xml><?xml version="1.0" encoding="utf-8"?>
 <p:tagLst xmlns:a="http://schemas.openxmlformats.org/drawingml/2006/main" xmlns:r="http://schemas.openxmlformats.org/officeDocument/2006/relationships" xmlns:p="http://schemas.openxmlformats.org/presentationml/2006/main">
-  <p:tag name="THINKCELLSHAPEDONOTDELETE" val="tqrDDi9IDWQreswKEvcZYHQ"/>
+  <p:tag name="THINKCELLSHAPEDONOTDELETE" val="tvFJcEFCa6e7KuRyAfU_cAA"/>
 </p:tagLst>
 </file>
 
 <file path=ppt/tags/tag26.xml><?xml version="1.0" encoding="utf-8"?>
 <p:tagLst xmlns:a="http://schemas.openxmlformats.org/drawingml/2006/main" xmlns:r="http://schemas.openxmlformats.org/officeDocument/2006/relationships" xmlns:p="http://schemas.openxmlformats.org/presentationml/2006/main">
-  <p:tag name="THINKCELLSHAPEDONOTDELETE" val="tJj230LI.fgbdLzvwwPEIQw"/>
+  <p:tag name="THINKCELLSHAPEDONOTDELETE" val="tqrDDi9IDWQreswKEvcZYHQ"/>
 </p:tagLst>
 </file>
 
 <file path=ppt/tags/tag27.xml><?xml version="1.0" encoding="utf-8"?>
 <p:tagLst xmlns:a="http://schemas.openxmlformats.org/drawingml/2006/main" xmlns:r="http://schemas.openxmlformats.org/officeDocument/2006/relationships" xmlns:p="http://schemas.openxmlformats.org/presentationml/2006/main">
-  <p:tag name="THINKCELLSHAPEDONOTDELETE" val="tvFJcEFCa6e7KuRyAfU_cAA"/>
+  <p:tag name="THINKCELLSHAPEDONOTDELETE" val="t46twseCPXrfgiJebg.3kJQ"/>
 </p:tagLst>
 </file>
 
 <file path=ppt/tags/tag28.xml><?xml version="1.0" encoding="utf-8"?>
 <p:tagLst xmlns:a="http://schemas.openxmlformats.org/drawingml/2006/main" xmlns:r="http://schemas.openxmlformats.org/officeDocument/2006/relationships" xmlns:p="http://schemas.openxmlformats.org/presentationml/2006/main">
-  <p:tag name="THINKCELLSHAPEDONOTDELETE" val="t46twseCPXrfgiJebg.3kJQ"/>
+  <p:tag name="THINKCELLSHAPEDONOTDELETE" val="tJj230LI.fgbdLzvwwPEIQw"/>
 </p:tagLst>
 </file>
 
 <file path=ppt/tags/tag29.xml><?xml version="1.0" encoding="utf-8"?>
 <p:tagLst xmlns:a="http://schemas.openxmlformats.org/drawingml/2006/main" xmlns:r="http://schemas.openxmlformats.org/officeDocument/2006/relationships" xmlns:p="http://schemas.openxmlformats.org/presentationml/2006/main">
-  <p:tag name="THINKCELLSHAPEDONOTDELETE" val="tDkNdLW.GKmbF52DfGrZ6Kg"/>
+  <p:tag name="THINKCELLSHAPEDONOTDELETE" val="tdVnhjOCVIFBxw9bDKZpRWQ"/>
 </p:tagLst>
 </file>
 
@@ -11308,7 +11892,7 @@
 
 <file path=ppt/tags/tag31.xml><?xml version="1.0" encoding="utf-8"?>
 <p:tagLst xmlns:a="http://schemas.openxmlformats.org/drawingml/2006/main" xmlns:r="http://schemas.openxmlformats.org/officeDocument/2006/relationships" xmlns:p="http://schemas.openxmlformats.org/presentationml/2006/main">
-  <p:tag name="THINKCELLSHAPEDONOTDELETE" val="tdVnhjOCVIFBxw9bDKZpRWQ"/>
+  <p:tag name="THINKCELLSHAPEDONOTDELETE" val="tDkNdLW.GKmbF52DfGrZ6Kg"/>
 </p:tagLst>
 </file>
 
@@ -11380,13 +11964,13 @@
 
 <file path=ppt/tags/tag5.xml><?xml version="1.0" encoding="utf-8"?>
 <p:tagLst xmlns:a="http://schemas.openxmlformats.org/drawingml/2006/main" xmlns:r="http://schemas.openxmlformats.org/officeDocument/2006/relationships" xmlns:p="http://schemas.openxmlformats.org/presentationml/2006/main">
-  <p:tag name="THINKCELLSHAPEDONOTDELETE" val="t.o6Lm6qFyriJXzewWg3nRw"/>
+  <p:tag name="THINKCELLSHAPEDONOTDELETE" val="tQeM1bSm56yWwcBVqMHEtDg"/>
 </p:tagLst>
 </file>
 
 <file path=ppt/tags/tag6.xml><?xml version="1.0" encoding="utf-8"?>
 <p:tagLst xmlns:a="http://schemas.openxmlformats.org/drawingml/2006/main" xmlns:r="http://schemas.openxmlformats.org/officeDocument/2006/relationships" xmlns:p="http://schemas.openxmlformats.org/presentationml/2006/main">
-  <p:tag name="THINKCELLSHAPEDONOTDELETE" val="tQeM1bSm56yWwcBVqMHEtDg"/>
+  <p:tag name="THINKCELLSHAPEDONOTDELETE" val="t.o6Lm6qFyriJXzewWg3nRw"/>
 </p:tagLst>
 </file>
 

</xml_diff>